<commit_message>
6. Beware When Comparing Objects & Arrays for Equality!
</commit_message>
<xml_diff>
--- a/4. Working with Control Structures (if Statements, Loops, Error Handling)/docs/Introduction.pptx
+++ b/4. Working with Control Structures (if Statements, Loops, Error Handling)/docs/Introduction.pptx
@@ -247,7 +247,7 @@
           <a:p>
             <a:fld id="{3A16FB0B-203D-437B-9C92-84EB95E2527D}" type="datetimeFigureOut">
               <a:rPr lang="en-US" smtClean="0"/>
-              <a:t>9/7/2021</a:t>
+              <a:t>9/8/2021</a:t>
             </a:fld>
             <a:endParaRPr lang="en-US"/>
           </a:p>
@@ -417,7 +417,7 @@
           <a:p>
             <a:fld id="{3A16FB0B-203D-437B-9C92-84EB95E2527D}" type="datetimeFigureOut">
               <a:rPr lang="en-US" smtClean="0"/>
-              <a:t>9/7/2021</a:t>
+              <a:t>9/8/2021</a:t>
             </a:fld>
             <a:endParaRPr lang="en-US"/>
           </a:p>
@@ -597,7 +597,7 @@
           <a:p>
             <a:fld id="{3A16FB0B-203D-437B-9C92-84EB95E2527D}" type="datetimeFigureOut">
               <a:rPr lang="en-US" smtClean="0"/>
-              <a:t>9/7/2021</a:t>
+              <a:t>9/8/2021</a:t>
             </a:fld>
             <a:endParaRPr lang="en-US"/>
           </a:p>
@@ -767,7 +767,7 @@
           <a:p>
             <a:fld id="{3A16FB0B-203D-437B-9C92-84EB95E2527D}" type="datetimeFigureOut">
               <a:rPr lang="en-US" smtClean="0"/>
-              <a:t>9/7/2021</a:t>
+              <a:t>9/8/2021</a:t>
             </a:fld>
             <a:endParaRPr lang="en-US"/>
           </a:p>
@@ -1013,7 +1013,7 @@
           <a:p>
             <a:fld id="{3A16FB0B-203D-437B-9C92-84EB95E2527D}" type="datetimeFigureOut">
               <a:rPr lang="en-US" smtClean="0"/>
-              <a:t>9/7/2021</a:t>
+              <a:t>9/8/2021</a:t>
             </a:fld>
             <a:endParaRPr lang="en-US"/>
           </a:p>
@@ -1245,7 +1245,7 @@
           <a:p>
             <a:fld id="{3A16FB0B-203D-437B-9C92-84EB95E2527D}" type="datetimeFigureOut">
               <a:rPr lang="en-US" smtClean="0"/>
-              <a:t>9/7/2021</a:t>
+              <a:t>9/8/2021</a:t>
             </a:fld>
             <a:endParaRPr lang="en-US"/>
           </a:p>
@@ -1612,7 +1612,7 @@
           <a:p>
             <a:fld id="{3A16FB0B-203D-437B-9C92-84EB95E2527D}" type="datetimeFigureOut">
               <a:rPr lang="en-US" smtClean="0"/>
-              <a:t>9/7/2021</a:t>
+              <a:t>9/8/2021</a:t>
             </a:fld>
             <a:endParaRPr lang="en-US"/>
           </a:p>
@@ -1730,7 +1730,7 @@
           <a:p>
             <a:fld id="{3A16FB0B-203D-437B-9C92-84EB95E2527D}" type="datetimeFigureOut">
               <a:rPr lang="en-US" smtClean="0"/>
-              <a:t>9/7/2021</a:t>
+              <a:t>9/8/2021</a:t>
             </a:fld>
             <a:endParaRPr lang="en-US"/>
           </a:p>
@@ -1825,7 +1825,7 @@
           <a:p>
             <a:fld id="{3A16FB0B-203D-437B-9C92-84EB95E2527D}" type="datetimeFigureOut">
               <a:rPr lang="en-US" smtClean="0"/>
-              <a:t>9/7/2021</a:t>
+              <a:t>9/8/2021</a:t>
             </a:fld>
             <a:endParaRPr lang="en-US"/>
           </a:p>
@@ -2102,7 +2102,7 @@
           <a:p>
             <a:fld id="{3A16FB0B-203D-437B-9C92-84EB95E2527D}" type="datetimeFigureOut">
               <a:rPr lang="en-US" smtClean="0"/>
-              <a:t>9/7/2021</a:t>
+              <a:t>9/8/2021</a:t>
             </a:fld>
             <a:endParaRPr lang="en-US"/>
           </a:p>
@@ -2355,7 +2355,7 @@
           <a:p>
             <a:fld id="{3A16FB0B-203D-437B-9C92-84EB95E2527D}" type="datetimeFigureOut">
               <a:rPr lang="en-US" smtClean="0"/>
-              <a:t>9/7/2021</a:t>
+              <a:t>9/8/2021</a:t>
             </a:fld>
             <a:endParaRPr lang="en-US"/>
           </a:p>
@@ -2568,7 +2568,7 @@
           <a:p>
             <a:fld id="{3A16FB0B-203D-437B-9C92-84EB95E2527D}" type="datetimeFigureOut">
               <a:rPr lang="en-US" smtClean="0"/>
-              <a:t>9/7/2021</a:t>
+              <a:t>9/8/2021</a:t>
             </a:fld>
             <a:endParaRPr lang="en-US"/>
           </a:p>
@@ -4773,27 +4773,7 @@
                 <a:latin typeface="Calibri (Corps)"/>
                 <a:cs typeface="Segoe UI Light" panose="020B0502040204020203" pitchFamily="34" charset="0"/>
               </a:rPr>
-              <a:t>Check for value </a:t>
-            </a:r>
-            <a:r>
-              <a:rPr lang="en-US" dirty="0" smtClean="0">
-                <a:solidFill>
-                  <a:srgbClr val="660066"/>
-                </a:solidFill>
-                <a:latin typeface="Calibri (Corps)"/>
-                <a:cs typeface="Segoe UI Light" panose="020B0502040204020203" pitchFamily="34" charset="0"/>
-              </a:rPr>
-              <a:t>AND type </a:t>
-            </a:r>
-            <a:r>
-              <a:rPr lang="en-US" dirty="0" smtClean="0">
-                <a:solidFill>
-                  <a:srgbClr val="660066"/>
-                </a:solidFill>
-                <a:latin typeface="Calibri (Corps)"/>
-                <a:cs typeface="Segoe UI Light" panose="020B0502040204020203" pitchFamily="34" charset="0"/>
-              </a:rPr>
-              <a:t>equality</a:t>
+              <a:t>Check for value AND type equality</a:t>
             </a:r>
             <a:endParaRPr lang="en-US" dirty="0">
               <a:solidFill>
@@ -5092,10 +5072,6 @@
               </a:rPr>
               <a:t>&gt;</a:t>
             </a:r>
-            <a:endParaRPr lang="en-US" sz="2400" b="1" dirty="0">
-              <a:latin typeface="Calibri (Corps)"/>
-              <a:cs typeface="Segoe UI Light" panose="020B0502040204020203" pitchFamily="34" charset="0"/>
-            </a:endParaRPr>
           </a:p>
         </p:txBody>
       </p:sp>
@@ -6160,7 +6136,7 @@
                 <a:latin typeface="Calibri (Corps)"/>
                 <a:cs typeface="Segoe UI Light" panose="020B0502040204020203" pitchFamily="34" charset="0"/>
               </a:rPr>
-              <a:t>Write Code Efficiently</a:t>
+              <a:t>{name: ‘Max’}</a:t>
             </a:r>
             <a:endParaRPr lang="en-US" sz="2400" b="1" dirty="0">
               <a:latin typeface="Calibri (Corps)"/>
@@ -6178,7 +6154,7 @@
         <p:spPr>
           <a:xfrm>
             <a:off x="489527" y="193964"/>
-            <a:ext cx="6007526" cy="523220"/>
+            <a:ext cx="6909894" cy="523220"/>
           </a:xfrm>
           <a:prstGeom prst="rect">
             <a:avLst/>
@@ -6196,7 +6172,7 @@
                 <a:ea typeface="Segoe UI Black" panose="020B0A02040204020203" pitchFamily="34" charset="0"/>
                 <a:cs typeface="Segoe UI Semibold" panose="020B0702040204020203" pitchFamily="34" charset="0"/>
               </a:rPr>
-              <a:t>Mastering (JavaScript) Development</a:t>
+              <a:t>Beware of Objects &amp; Arrays in Comparisons</a:t>
             </a:r>
             <a:endParaRPr lang="en-US" sz="2800" b="1" dirty="0">
               <a:ea typeface="Segoe UI Black" panose="020B0A02040204020203" pitchFamily="34" charset="0"/>
@@ -6207,20 +6183,20 @@
       </p:sp>
       <p:sp>
         <p:nvSpPr>
-          <p:cNvPr id="8" name="Rectangle 7"/>
+          <p:cNvPr id="18" name="Rectangle 17"/>
           <p:cNvSpPr/>
           <p:nvPr/>
         </p:nvSpPr>
         <p:spPr>
           <a:xfrm>
-            <a:off x="8214163" y="980555"/>
+            <a:off x="8486880" y="990029"/>
             <a:ext cx="3460235" cy="748145"/>
           </a:xfrm>
           <a:prstGeom prst="rect">
             <a:avLst/>
           </a:prstGeom>
           <a:solidFill>
-            <a:schemeClr val="accent4"/>
+            <a:srgbClr val="660066"/>
           </a:solidFill>
           <a:ln>
             <a:noFill/>
@@ -6252,7 +6228,7 @@
                 <a:latin typeface="Calibri (Corps)"/>
                 <a:cs typeface="Segoe UI Light" panose="020B0502040204020203" pitchFamily="34" charset="0"/>
               </a:rPr>
-              <a:t>Debug Your Code</a:t>
+              <a:t>{name: ‘Max’}</a:t>
             </a:r>
             <a:endParaRPr lang="en-US" sz="2400" b="1" dirty="0">
               <a:latin typeface="Calibri (Corps)"/>
@@ -6263,13 +6239,13 @@
       </p:sp>
       <p:sp>
         <p:nvSpPr>
-          <p:cNvPr id="9" name="Rectangle 8"/>
+          <p:cNvPr id="19" name="Rectangle 18"/>
           <p:cNvSpPr/>
           <p:nvPr/>
         </p:nvSpPr>
         <p:spPr>
           <a:xfrm>
-            <a:off x="271072" y="1880916"/>
+            <a:off x="4378976" y="990029"/>
             <a:ext cx="3426389" cy="782585"/>
           </a:xfrm>
           <a:prstGeom prst="rect">
@@ -6315,7 +6291,7 @@
                 <a:latin typeface="Calibri (Corps)"/>
                 <a:cs typeface="Segoe UI Light" panose="020B0502040204020203" pitchFamily="34" charset="0"/>
               </a:rPr>
-              <a:t>Work in a productive environment (i.e. IDE, editor)</a:t>
+              <a:t>=== or ===</a:t>
             </a:r>
             <a:endParaRPr lang="en-US" dirty="0">
               <a:solidFill>
@@ -6329,16 +6305,16 @@
       </p:sp>
       <p:sp>
         <p:nvSpPr>
-          <p:cNvPr id="14" name="Rectangle 13"/>
+          <p:cNvPr id="28" name="Triangle isocèle 27"/>
           <p:cNvSpPr/>
           <p:nvPr/>
         </p:nvSpPr>
         <p:spPr>
-          <a:xfrm>
-            <a:off x="4225695" y="980555"/>
-            <a:ext cx="3460235" cy="748145"/>
-          </a:xfrm>
-          <a:prstGeom prst="rect">
+          <a:xfrm rot="10800000">
+            <a:off x="1267507" y="2045459"/>
+            <a:ext cx="9649326" cy="938463"/>
+          </a:xfrm>
+          <a:prstGeom prst="triangle">
             <a:avLst/>
           </a:prstGeom>
           <a:solidFill>
@@ -6369,37 +6345,30 @@
           <a:lstStyle/>
           <a:p>
             <a:pPr algn="ctr"/>
-            <a:r>
-              <a:rPr lang="en-US" sz="2400" b="1" dirty="0" smtClean="0">
-                <a:latin typeface="Calibri (Corps)"/>
-              </a:rPr>
-              <a:t>Find Help</a:t>
-            </a:r>
-          </a:p>
-        </p:txBody>
-      </p:sp>
-      <p:sp>
-        <p:nvSpPr>
-          <p:cNvPr id="16" name="Rectangle 15"/>
+            <a:endParaRPr lang="en-US" b="1" dirty="0"/>
+          </a:p>
+        </p:txBody>
+      </p:sp>
+      <p:sp>
+        <p:nvSpPr>
+          <p:cNvPr id="29" name="Rectangle 28"/>
           <p:cNvSpPr/>
           <p:nvPr/>
         </p:nvSpPr>
         <p:spPr>
           <a:xfrm>
-            <a:off x="4225695" y="1898135"/>
-            <a:ext cx="3460235" cy="748145"/>
+            <a:off x="4378975" y="3546527"/>
+            <a:ext cx="3426389" cy="628431"/>
           </a:xfrm>
           <a:prstGeom prst="rect">
             <a:avLst/>
           </a:prstGeom>
           <a:solidFill>
-            <a:srgbClr val="FF9900">
-              <a:alpha val="30196"/>
-            </a:srgbClr>
+            <a:schemeClr val="accent2"/>
           </a:solidFill>
           <a:ln w="28575">
             <a:solidFill>
-              <a:srgbClr val="FF9933"/>
+              <a:schemeClr val="tx1"/>
             </a:solidFill>
           </a:ln>
         </p:spPr>
@@ -6425,38 +6394,33 @@
           <a:p>
             <a:pPr algn="ctr"/>
             <a:r>
-              <a:rPr lang="en-US" dirty="0" smtClean="0">
-                <a:solidFill>
-                  <a:srgbClr val="FF9900"/>
-                </a:solidFill>
-              </a:rPr>
-              <a:t>Use MDN!</a:t>
-            </a:r>
-          </a:p>
-        </p:txBody>
-      </p:sp>
-      <p:sp>
-        <p:nvSpPr>
-          <p:cNvPr id="17" name="Rectangle 16"/>
+              <a:rPr lang="en-US" b="1" dirty="0" smtClean="0"/>
+              <a:t>If (some Condition)</a:t>
+            </a:r>
+            <a:endParaRPr lang="en-US" b="1" dirty="0"/>
+          </a:p>
+        </p:txBody>
+      </p:sp>
+      <p:sp>
+        <p:nvSpPr>
+          <p:cNvPr id="30" name="Rectangle 29"/>
           <p:cNvSpPr/>
           <p:nvPr/>
         </p:nvSpPr>
         <p:spPr>
           <a:xfrm>
-            <a:off x="8214163" y="1915356"/>
-            <a:ext cx="3460235" cy="748145"/>
+            <a:off x="4378975" y="4737562"/>
+            <a:ext cx="3426389" cy="628431"/>
           </a:xfrm>
           <a:prstGeom prst="rect">
             <a:avLst/>
           </a:prstGeom>
           <a:solidFill>
-            <a:srgbClr val="FFC000">
-              <a:alpha val="21176"/>
-            </a:srgbClr>
+            <a:schemeClr val="accent2"/>
           </a:solidFill>
           <a:ln w="19050">
             <a:solidFill>
-              <a:srgbClr val="FFC000"/>
+              <a:schemeClr val="tx1"/>
             </a:solidFill>
           </a:ln>
         </p:spPr>
@@ -6482,46 +6446,34 @@
           <a:p>
             <a:pPr algn="ctr"/>
             <a:r>
-              <a:rPr lang="en-US" sz="2000" dirty="0" smtClean="0">
-                <a:solidFill>
-                  <a:srgbClr val="FF9900"/>
-                </a:solidFill>
-                <a:latin typeface="Calibri (Corps)"/>
-              </a:rPr>
-              <a:t>Read and utilize error messages</a:t>
-            </a:r>
-            <a:r>
-              <a:rPr lang="en-US" sz="1600" dirty="0" smtClean="0">
-                <a:latin typeface="Calibri (Corps)"/>
-              </a:rPr>
-              <a:t>;</a:t>
-            </a:r>
-          </a:p>
-        </p:txBody>
-      </p:sp>
-      <p:sp>
-        <p:nvSpPr>
-          <p:cNvPr id="13" name="Rectangle 12"/>
+              <a:rPr lang="en-US" b="1" dirty="0" smtClean="0"/>
+              <a:t>false!</a:t>
+            </a:r>
+            <a:endParaRPr lang="en-US" b="1" dirty="0"/>
+          </a:p>
+        </p:txBody>
+      </p:sp>
+      <p:sp>
+        <p:nvSpPr>
+          <p:cNvPr id="4" name="Multiplication 3"/>
           <p:cNvSpPr/>
           <p:nvPr/>
         </p:nvSpPr>
         <p:spPr>
           <a:xfrm>
-            <a:off x="271072" y="2736048"/>
-            <a:ext cx="3426389" cy="764848"/>
-          </a:xfrm>
-          <a:prstGeom prst="rect">
+            <a:off x="2653232" y="1843967"/>
+            <a:ext cx="6877873" cy="2893595"/>
+          </a:xfrm>
+          <a:prstGeom prst="mathMultiply">
             <a:avLst/>
           </a:prstGeom>
           <a:solidFill>
-            <a:srgbClr val="CC3399">
-              <a:alpha val="29020"/>
-            </a:srgbClr>
+            <a:schemeClr val="accent2">
+              <a:lumMod val="50000"/>
+            </a:schemeClr>
           </a:solidFill>
-          <a:ln w="28575">
-            <a:solidFill>
-              <a:srgbClr val="660066"/>
-            </a:solidFill>
+          <a:ln>
+            <a:noFill/>
           </a:ln>
         </p:spPr>
         <p:style>
@@ -6545,48 +6497,32 @@
           <a:lstStyle/>
           <a:p>
             <a:pPr algn="ctr"/>
-            <a:r>
-              <a:rPr lang="en-US" dirty="0" smtClean="0">
-                <a:solidFill>
-                  <a:srgbClr val="660066"/>
-                </a:solidFill>
-                <a:latin typeface="Calibri (Corps)"/>
-                <a:cs typeface="Segoe UI Light" panose="020B0502040204020203" pitchFamily="34" charset="0"/>
-              </a:rPr>
-              <a:t>Auto-format code &amp; use shortcuts</a:t>
-            </a:r>
-            <a:endParaRPr lang="en-US" dirty="0">
-              <a:solidFill>
-                <a:srgbClr val="660066"/>
-              </a:solidFill>
-              <a:latin typeface="Calibri (Corps)"/>
-              <a:cs typeface="Segoe UI Light" panose="020B0502040204020203" pitchFamily="34" charset="0"/>
-            </a:endParaRPr>
-          </a:p>
-        </p:txBody>
-      </p:sp>
-      <p:sp>
-        <p:nvSpPr>
-          <p:cNvPr id="20" name="Rectangle 19"/>
+            <a:endParaRPr lang="en-US"/>
+          </a:p>
+        </p:txBody>
+      </p:sp>
+      <p:sp>
+        <p:nvSpPr>
+          <p:cNvPr id="32" name="Rectangle 31"/>
           <p:cNvSpPr/>
           <p:nvPr/>
         </p:nvSpPr>
         <p:spPr>
           <a:xfrm>
-            <a:off x="271072" y="3563867"/>
-            <a:ext cx="3426389" cy="774324"/>
+            <a:off x="1967344" y="5928597"/>
+            <a:ext cx="8410073" cy="689080"/>
           </a:xfrm>
           <a:prstGeom prst="rect">
             <a:avLst/>
           </a:prstGeom>
           <a:solidFill>
-            <a:srgbClr val="CC3399">
+            <a:srgbClr val="FCF600">
               <a:alpha val="29020"/>
             </a:srgbClr>
           </a:solidFill>
           <a:ln w="28575">
             <a:solidFill>
-              <a:srgbClr val="660066"/>
+              <a:schemeClr val="tx1"/>
             </a:solidFill>
           </a:ln>
         </p:spPr>
@@ -6612,441 +6548,21 @@
           <a:p>
             <a:pPr algn="ctr"/>
             <a:r>
-              <a:rPr lang="en-US" dirty="0" smtClean="0">
+              <a:rPr lang="en-US" sz="2000" dirty="0" smtClean="0">
                 <a:solidFill>
-                  <a:srgbClr val="660066"/>
+                  <a:sysClr val="windowText" lastClr="000000"/>
                 </a:solidFill>
                 <a:latin typeface="Calibri (Corps)"/>
                 <a:cs typeface="Segoe UI Light" panose="020B0502040204020203" pitchFamily="34" charset="0"/>
               </a:rPr>
-              <a:t>Use auto-completion and hints</a:t>
-            </a:r>
-            <a:endParaRPr lang="en-US" dirty="0">
+              <a:t>Objects and arrays are kind of special in JavaScript!</a:t>
+            </a:r>
+            <a:endParaRPr lang="en-US" sz="2000" dirty="0">
               <a:solidFill>
-                <a:srgbClr val="660066"/>
+                <a:sysClr val="windowText" lastClr="000000"/>
               </a:solidFill>
               <a:latin typeface="Calibri (Corps)"/>
               <a:cs typeface="Segoe UI Light" panose="020B0502040204020203" pitchFamily="34" charset="0"/>
-            </a:endParaRPr>
-          </a:p>
-        </p:txBody>
-      </p:sp>
-      <p:sp>
-        <p:nvSpPr>
-          <p:cNvPr id="21" name="Rectangle 20"/>
-          <p:cNvSpPr/>
-          <p:nvPr/>
-        </p:nvSpPr>
-        <p:spPr>
-          <a:xfrm>
-            <a:off x="254149" y="4401162"/>
-            <a:ext cx="3426389" cy="774324"/>
-          </a:xfrm>
-          <a:prstGeom prst="rect">
-            <a:avLst/>
-          </a:prstGeom>
-          <a:solidFill>
-            <a:srgbClr val="CC3399">
-              <a:alpha val="29020"/>
-            </a:srgbClr>
-          </a:solidFill>
-          <a:ln w="28575">
-            <a:solidFill>
-              <a:srgbClr val="660066"/>
-            </a:solidFill>
-          </a:ln>
-        </p:spPr>
-        <p:style>
-          <a:lnRef idx="2">
-            <a:schemeClr val="accent1">
-              <a:shade val="50000"/>
-            </a:schemeClr>
-          </a:lnRef>
-          <a:fillRef idx="1">
-            <a:schemeClr val="accent1"/>
-          </a:fillRef>
-          <a:effectRef idx="0">
-            <a:schemeClr val="accent1"/>
-          </a:effectRef>
-          <a:fontRef idx="minor">
-            <a:schemeClr val="lt1"/>
-          </a:fontRef>
-        </p:style>
-        <p:txBody>
-          <a:bodyPr rtlCol="0" anchor="ctr"/>
-          <a:lstStyle/>
-          <a:p>
-            <a:pPr algn="ctr"/>
-            <a:r>
-              <a:rPr lang="en-US" dirty="0" smtClean="0">
-                <a:solidFill>
-                  <a:srgbClr val="660066"/>
-                </a:solidFill>
-                <a:latin typeface="Calibri (Corps)"/>
-                <a:cs typeface="Segoe UI Light" panose="020B0502040204020203" pitchFamily="34" charset="0"/>
-              </a:rPr>
-              <a:t>Explore extensions &amp; settings</a:t>
-            </a:r>
-            <a:endParaRPr lang="en-US" dirty="0">
-              <a:solidFill>
-                <a:srgbClr val="660066"/>
-              </a:solidFill>
-              <a:latin typeface="Calibri (Corps)"/>
-              <a:cs typeface="Segoe UI Light" panose="020B0502040204020203" pitchFamily="34" charset="0"/>
-            </a:endParaRPr>
-          </a:p>
-        </p:txBody>
-      </p:sp>
-      <p:sp>
-        <p:nvSpPr>
-          <p:cNvPr id="22" name="Rectangle 21"/>
-          <p:cNvSpPr/>
-          <p:nvPr/>
-        </p:nvSpPr>
-        <p:spPr>
-          <a:xfrm>
-            <a:off x="4225695" y="2752751"/>
-            <a:ext cx="3460235" cy="748145"/>
-          </a:xfrm>
-          <a:prstGeom prst="rect">
-            <a:avLst/>
-          </a:prstGeom>
-          <a:solidFill>
-            <a:srgbClr val="FF9900">
-              <a:alpha val="30196"/>
-            </a:srgbClr>
-          </a:solidFill>
-          <a:ln w="28575">
-            <a:solidFill>
-              <a:srgbClr val="FF9933"/>
-            </a:solidFill>
-          </a:ln>
-        </p:spPr>
-        <p:style>
-          <a:lnRef idx="2">
-            <a:schemeClr val="accent1">
-              <a:shade val="50000"/>
-            </a:schemeClr>
-          </a:lnRef>
-          <a:fillRef idx="1">
-            <a:schemeClr val="accent1"/>
-          </a:fillRef>
-          <a:effectRef idx="0">
-            <a:schemeClr val="accent1"/>
-          </a:effectRef>
-          <a:fontRef idx="minor">
-            <a:schemeClr val="lt1"/>
-          </a:fontRef>
-        </p:style>
-        <p:txBody>
-          <a:bodyPr rtlCol="0" anchor="ctr"/>
-          <a:lstStyle/>
-          <a:p>
-            <a:pPr algn="ctr"/>
-            <a:r>
-              <a:rPr lang="en-US" dirty="0" smtClean="0">
-                <a:solidFill>
-                  <a:srgbClr val="FF9900"/>
-                </a:solidFill>
-              </a:rPr>
-              <a:t>Learn how to google (seriously!)</a:t>
-            </a:r>
-          </a:p>
-        </p:txBody>
-      </p:sp>
-      <p:sp>
-        <p:nvSpPr>
-          <p:cNvPr id="23" name="Rectangle 22"/>
-          <p:cNvSpPr/>
-          <p:nvPr/>
-        </p:nvSpPr>
-        <p:spPr>
-          <a:xfrm>
-            <a:off x="4225695" y="3607744"/>
-            <a:ext cx="3460235" cy="748145"/>
-          </a:xfrm>
-          <a:prstGeom prst="rect">
-            <a:avLst/>
-          </a:prstGeom>
-          <a:solidFill>
-            <a:srgbClr val="FF9900">
-              <a:alpha val="30196"/>
-            </a:srgbClr>
-          </a:solidFill>
-          <a:ln w="28575">
-            <a:solidFill>
-              <a:srgbClr val="FF9933"/>
-            </a:solidFill>
-          </a:ln>
-        </p:spPr>
-        <p:style>
-          <a:lnRef idx="2">
-            <a:schemeClr val="accent1">
-              <a:shade val="50000"/>
-            </a:schemeClr>
-          </a:lnRef>
-          <a:fillRef idx="1">
-            <a:schemeClr val="accent1"/>
-          </a:fillRef>
-          <a:effectRef idx="0">
-            <a:schemeClr val="accent1"/>
-          </a:effectRef>
-          <a:fontRef idx="minor">
-            <a:schemeClr val="lt1"/>
-          </a:fontRef>
-        </p:style>
-        <p:txBody>
-          <a:bodyPr rtlCol="0" anchor="ctr"/>
-          <a:lstStyle/>
-          <a:p>
-            <a:pPr algn="ctr"/>
-            <a:r>
-              <a:rPr lang="en-US" dirty="0" smtClean="0">
-                <a:solidFill>
-                  <a:srgbClr val="FF9900"/>
-                </a:solidFill>
-              </a:rPr>
-              <a:t>Ask proper questions, help others</a:t>
-            </a:r>
-          </a:p>
-        </p:txBody>
-      </p:sp>
-      <p:sp>
-        <p:nvSpPr>
-          <p:cNvPr id="24" name="Rectangle 23"/>
-          <p:cNvSpPr/>
-          <p:nvPr/>
-        </p:nvSpPr>
-        <p:spPr>
-          <a:xfrm>
-            <a:off x="4225694" y="4427341"/>
-            <a:ext cx="3460235" cy="748145"/>
-          </a:xfrm>
-          <a:prstGeom prst="rect">
-            <a:avLst/>
-          </a:prstGeom>
-          <a:solidFill>
-            <a:srgbClr val="FF9900">
-              <a:alpha val="30196"/>
-            </a:srgbClr>
-          </a:solidFill>
-          <a:ln w="28575">
-            <a:solidFill>
-              <a:srgbClr val="FF9933"/>
-            </a:solidFill>
-          </a:ln>
-        </p:spPr>
-        <p:style>
-          <a:lnRef idx="2">
-            <a:schemeClr val="accent1">
-              <a:shade val="50000"/>
-            </a:schemeClr>
-          </a:lnRef>
-          <a:fillRef idx="1">
-            <a:schemeClr val="accent1"/>
-          </a:fillRef>
-          <a:effectRef idx="0">
-            <a:schemeClr val="accent1"/>
-          </a:effectRef>
-          <a:fontRef idx="minor">
-            <a:schemeClr val="lt1"/>
-          </a:fontRef>
-        </p:style>
-        <p:txBody>
-          <a:bodyPr rtlCol="0" anchor="ctr"/>
-          <a:lstStyle/>
-          <a:p>
-            <a:pPr algn="ctr"/>
-            <a:r>
-              <a:rPr lang="en-US" dirty="0" smtClean="0">
-                <a:solidFill>
-                  <a:srgbClr val="FF9900"/>
-                </a:solidFill>
-              </a:rPr>
-              <a:t>Trial &amp; Error</a:t>
-            </a:r>
-          </a:p>
-        </p:txBody>
-      </p:sp>
-      <p:sp>
-        <p:nvSpPr>
-          <p:cNvPr id="25" name="Rectangle 24"/>
-          <p:cNvSpPr/>
-          <p:nvPr/>
-        </p:nvSpPr>
-        <p:spPr>
-          <a:xfrm>
-            <a:off x="8214162" y="2781287"/>
-            <a:ext cx="3460235" cy="748145"/>
-          </a:xfrm>
-          <a:prstGeom prst="rect">
-            <a:avLst/>
-          </a:prstGeom>
-          <a:solidFill>
-            <a:srgbClr val="FFC000">
-              <a:alpha val="21176"/>
-            </a:srgbClr>
-          </a:solidFill>
-          <a:ln w="19050">
-            <a:solidFill>
-              <a:srgbClr val="FFC000"/>
-            </a:solidFill>
-          </a:ln>
-        </p:spPr>
-        <p:style>
-          <a:lnRef idx="2">
-            <a:schemeClr val="accent1">
-              <a:shade val="50000"/>
-            </a:schemeClr>
-          </a:lnRef>
-          <a:fillRef idx="1">
-            <a:schemeClr val="accent1"/>
-          </a:fillRef>
-          <a:effectRef idx="0">
-            <a:schemeClr val="accent1"/>
-          </a:effectRef>
-          <a:fontRef idx="minor">
-            <a:schemeClr val="lt1"/>
-          </a:fontRef>
-        </p:style>
-        <p:txBody>
-          <a:bodyPr rtlCol="0" anchor="ctr"/>
-          <a:lstStyle/>
-          <a:p>
-            <a:pPr algn="ctr"/>
-            <a:r>
-              <a:rPr lang="en-US" sz="2000" dirty="0" smtClean="0">
-                <a:solidFill>
-                  <a:srgbClr val="FF9900"/>
-                </a:solidFill>
-                <a:latin typeface="Calibri (Corps)"/>
-              </a:rPr>
-              <a:t>Use console.log() to gain insights into your code (flow)</a:t>
-            </a:r>
-            <a:endParaRPr lang="en-US" sz="1600" dirty="0" smtClean="0">
-              <a:latin typeface="Calibri (Corps)"/>
-            </a:endParaRPr>
-          </a:p>
-        </p:txBody>
-      </p:sp>
-      <p:sp>
-        <p:nvSpPr>
-          <p:cNvPr id="26" name="Rectangle 25"/>
-          <p:cNvSpPr/>
-          <p:nvPr/>
-        </p:nvSpPr>
-        <p:spPr>
-          <a:xfrm>
-            <a:off x="8214161" y="3607744"/>
-            <a:ext cx="3460235" cy="748145"/>
-          </a:xfrm>
-          <a:prstGeom prst="rect">
-            <a:avLst/>
-          </a:prstGeom>
-          <a:solidFill>
-            <a:srgbClr val="FFC000">
-              <a:alpha val="21176"/>
-            </a:srgbClr>
-          </a:solidFill>
-          <a:ln w="19050">
-            <a:solidFill>
-              <a:srgbClr val="FFC000"/>
-            </a:solidFill>
-          </a:ln>
-        </p:spPr>
-        <p:style>
-          <a:lnRef idx="2">
-            <a:schemeClr val="accent1">
-              <a:shade val="50000"/>
-            </a:schemeClr>
-          </a:lnRef>
-          <a:fillRef idx="1">
-            <a:schemeClr val="accent1"/>
-          </a:fillRef>
-          <a:effectRef idx="0">
-            <a:schemeClr val="accent1"/>
-          </a:effectRef>
-          <a:fontRef idx="minor">
-            <a:schemeClr val="lt1"/>
-          </a:fontRef>
-        </p:style>
-        <p:txBody>
-          <a:bodyPr rtlCol="0" anchor="ctr"/>
-          <a:lstStyle/>
-          <a:p>
-            <a:pPr algn="ctr"/>
-            <a:r>
-              <a:rPr lang="en-US" sz="2000" dirty="0" smtClean="0">
-                <a:solidFill>
-                  <a:srgbClr val="FF9900"/>
-                </a:solidFill>
-                <a:latin typeface="Calibri (Corps)"/>
-              </a:rPr>
-              <a:t>Use the (Chrome) debugging tools</a:t>
-            </a:r>
-            <a:endParaRPr lang="en-US" sz="1600" dirty="0" smtClean="0">
-              <a:latin typeface="Calibri (Corps)"/>
-            </a:endParaRPr>
-          </a:p>
-        </p:txBody>
-      </p:sp>
-      <p:sp>
-        <p:nvSpPr>
-          <p:cNvPr id="27" name="Rectangle 26"/>
-          <p:cNvSpPr/>
-          <p:nvPr/>
-        </p:nvSpPr>
-        <p:spPr>
-          <a:xfrm>
-            <a:off x="8214160" y="4427340"/>
-            <a:ext cx="3460235" cy="748145"/>
-          </a:xfrm>
-          <a:prstGeom prst="rect">
-            <a:avLst/>
-          </a:prstGeom>
-          <a:solidFill>
-            <a:srgbClr val="FFC000">
-              <a:alpha val="21176"/>
-            </a:srgbClr>
-          </a:solidFill>
-          <a:ln w="19050">
-            <a:solidFill>
-              <a:srgbClr val="FFC000"/>
-            </a:solidFill>
-          </a:ln>
-        </p:spPr>
-        <p:style>
-          <a:lnRef idx="2">
-            <a:schemeClr val="accent1">
-              <a:shade val="50000"/>
-            </a:schemeClr>
-          </a:lnRef>
-          <a:fillRef idx="1">
-            <a:schemeClr val="accent1"/>
-          </a:fillRef>
-          <a:effectRef idx="0">
-            <a:schemeClr val="accent1"/>
-          </a:effectRef>
-          <a:fontRef idx="minor">
-            <a:schemeClr val="lt1"/>
-          </a:fontRef>
-        </p:style>
-        <p:txBody>
-          <a:bodyPr rtlCol="0" anchor="ctr"/>
-          <a:lstStyle/>
-          <a:p>
-            <a:pPr algn="ctr"/>
-            <a:r>
-              <a:rPr lang="en-US" sz="2000" dirty="0" smtClean="0">
-                <a:solidFill>
-                  <a:srgbClr val="FF9900"/>
-                </a:solidFill>
-                <a:latin typeface="Calibri (Corps)"/>
-              </a:rPr>
-              <a:t>Use your IDEs debugging capabilities</a:t>
-            </a:r>
-            <a:endParaRPr lang="en-US" sz="1600" dirty="0" smtClean="0">
-              <a:latin typeface="Calibri (Corps)"/>
             </a:endParaRPr>
           </a:p>
         </p:txBody>

</xml_diff>

<commit_message>
7. The Logical AND and OR Operators 8. Understanding Operator Precedence
</commit_message>
<xml_diff>
--- a/4. Working with Control Structures (if Statements, Loops, Error Handling)/docs/Introduction.pptx
+++ b/4. Working with Control Structures (if Statements, Loops, Error Handling)/docs/Introduction.pptx
@@ -10,6 +10,7 @@
     <p:sldId id="260" r:id="rId4"/>
     <p:sldId id="261" r:id="rId5"/>
     <p:sldId id="258" r:id="rId6"/>
+    <p:sldId id="263" r:id="rId7"/>
   </p:sldIdLst>
   <p:sldSz cx="12192000" cy="6858000"/>
   <p:notesSz cx="6858000" cy="9144000"/>
@@ -6580,6 +6581,1026 @@
 </p:sld>
 </file>
 
+<file path=ppt/slides/slide6.xml><?xml version="1.0" encoding="utf-8"?>
+<p:sld xmlns:a="http://schemas.openxmlformats.org/drawingml/2006/main" xmlns:r="http://schemas.openxmlformats.org/officeDocument/2006/relationships" xmlns:p="http://schemas.openxmlformats.org/presentationml/2006/main">
+  <p:cSld>
+    <p:spTree>
+      <p:nvGrpSpPr>
+        <p:cNvPr id="1" name=""/>
+        <p:cNvGrpSpPr/>
+        <p:nvPr/>
+      </p:nvGrpSpPr>
+      <p:grpSpPr>
+        <a:xfrm>
+          <a:off x="0" y="0"/>
+          <a:ext cx="0" cy="0"/>
+          <a:chOff x="0" y="0"/>
+          <a:chExt cx="0" cy="0"/>
+        </a:xfrm>
+      </p:grpSpPr>
+      <p:sp>
+        <p:nvSpPr>
+          <p:cNvPr id="4" name="ZoneTexte 3"/>
+          <p:cNvSpPr txBox="1"/>
+          <p:nvPr/>
+        </p:nvSpPr>
+        <p:spPr>
+          <a:xfrm>
+            <a:off x="489527" y="193964"/>
+            <a:ext cx="6007526" cy="523220"/>
+          </a:xfrm>
+          <a:prstGeom prst="rect">
+            <a:avLst/>
+          </a:prstGeom>
+          <a:noFill/>
+        </p:spPr>
+        <p:txBody>
+          <a:bodyPr wrap="square" rtlCol="0">
+            <a:spAutoFit/>
+          </a:bodyPr>
+          <a:lstStyle/>
+          <a:p>
+            <a:r>
+              <a:rPr lang="en-US" sz="2800" b="1" dirty="0" smtClean="0">
+                <a:ea typeface="Segoe UI Black" panose="020B0A02040204020203" pitchFamily="34" charset="0"/>
+                <a:cs typeface="Segoe UI Semibold" panose="020B0702040204020203" pitchFamily="34" charset="0"/>
+              </a:rPr>
+              <a:t>Combining Conditions</a:t>
+            </a:r>
+            <a:endParaRPr lang="en-US" sz="2800" b="1" dirty="0" smtClean="0">
+              <a:ea typeface="Segoe UI Black" panose="020B0A02040204020203" pitchFamily="34" charset="0"/>
+              <a:cs typeface="Segoe UI Semibold" panose="020B0702040204020203" pitchFamily="34" charset="0"/>
+            </a:endParaRPr>
+          </a:p>
+        </p:txBody>
+      </p:sp>
+      <p:sp>
+        <p:nvSpPr>
+          <p:cNvPr id="10" name="Rectangle 9"/>
+          <p:cNvSpPr/>
+          <p:nvPr/>
+        </p:nvSpPr>
+        <p:spPr>
+          <a:xfrm>
+            <a:off x="152641" y="717184"/>
+            <a:ext cx="3156041" cy="622945"/>
+          </a:xfrm>
+          <a:prstGeom prst="rect">
+            <a:avLst/>
+          </a:prstGeom>
+          <a:solidFill>
+            <a:srgbClr val="660066"/>
+          </a:solidFill>
+          <a:ln>
+            <a:noFill/>
+          </a:ln>
+        </p:spPr>
+        <p:style>
+          <a:lnRef idx="2">
+            <a:schemeClr val="accent1">
+              <a:shade val="50000"/>
+            </a:schemeClr>
+          </a:lnRef>
+          <a:fillRef idx="1">
+            <a:schemeClr val="accent1"/>
+          </a:fillRef>
+          <a:effectRef idx="0">
+            <a:schemeClr val="accent1"/>
+          </a:effectRef>
+          <a:fontRef idx="minor">
+            <a:schemeClr val="lt1"/>
+          </a:fontRef>
+        </p:style>
+        <p:txBody>
+          <a:bodyPr rtlCol="0" anchor="ctr"/>
+          <a:lstStyle/>
+          <a:p>
+            <a:pPr algn="ctr"/>
+            <a:r>
+              <a:rPr lang="en-US" sz="2400" b="1" dirty="0" smtClean="0">
+                <a:latin typeface="Calibri (Corps)"/>
+                <a:cs typeface="Segoe UI Light" panose="020B0502040204020203" pitchFamily="34" charset="0"/>
+              </a:rPr>
+              <a:t>Condition A</a:t>
+            </a:r>
+            <a:endParaRPr lang="en-US" sz="2400" b="1" dirty="0">
+              <a:latin typeface="Calibri (Corps)"/>
+              <a:cs typeface="Segoe UI Light" panose="020B0502040204020203" pitchFamily="34" charset="0"/>
+            </a:endParaRPr>
+          </a:p>
+        </p:txBody>
+      </p:sp>
+      <p:sp>
+        <p:nvSpPr>
+          <p:cNvPr id="7" name="Rectangle 6"/>
+          <p:cNvSpPr/>
+          <p:nvPr/>
+        </p:nvSpPr>
+        <p:spPr>
+          <a:xfrm>
+            <a:off x="4528125" y="717186"/>
+            <a:ext cx="3156041" cy="622945"/>
+          </a:xfrm>
+          <a:prstGeom prst="rect">
+            <a:avLst/>
+          </a:prstGeom>
+          <a:solidFill>
+            <a:srgbClr val="660066"/>
+          </a:solidFill>
+          <a:ln>
+            <a:noFill/>
+          </a:ln>
+        </p:spPr>
+        <p:style>
+          <a:lnRef idx="2">
+            <a:schemeClr val="accent1">
+              <a:shade val="50000"/>
+            </a:schemeClr>
+          </a:lnRef>
+          <a:fillRef idx="1">
+            <a:schemeClr val="accent1"/>
+          </a:fillRef>
+          <a:effectRef idx="0">
+            <a:schemeClr val="accent1"/>
+          </a:effectRef>
+          <a:fontRef idx="minor">
+            <a:schemeClr val="lt1"/>
+          </a:fontRef>
+        </p:style>
+        <p:txBody>
+          <a:bodyPr rtlCol="0" anchor="ctr"/>
+          <a:lstStyle/>
+          <a:p>
+            <a:pPr algn="ctr"/>
+            <a:r>
+              <a:rPr lang="en-US" sz="2400" b="1" dirty="0" smtClean="0">
+                <a:latin typeface="Calibri (Corps)"/>
+                <a:cs typeface="Segoe UI Light" panose="020B0502040204020203" pitchFamily="34" charset="0"/>
+              </a:rPr>
+              <a:t>Condition B</a:t>
+            </a:r>
+            <a:endParaRPr lang="en-US" sz="2400" b="1" dirty="0">
+              <a:latin typeface="Calibri (Corps)"/>
+              <a:cs typeface="Segoe UI Light" panose="020B0502040204020203" pitchFamily="34" charset="0"/>
+            </a:endParaRPr>
+          </a:p>
+        </p:txBody>
+      </p:sp>
+      <p:sp>
+        <p:nvSpPr>
+          <p:cNvPr id="8" name="Rectangle 7"/>
+          <p:cNvSpPr/>
+          <p:nvPr/>
+        </p:nvSpPr>
+        <p:spPr>
+          <a:xfrm>
+            <a:off x="8903609" y="717184"/>
+            <a:ext cx="3156041" cy="622945"/>
+          </a:xfrm>
+          <a:prstGeom prst="rect">
+            <a:avLst/>
+          </a:prstGeom>
+          <a:solidFill>
+            <a:srgbClr val="660066"/>
+          </a:solidFill>
+          <a:ln>
+            <a:noFill/>
+          </a:ln>
+        </p:spPr>
+        <p:style>
+          <a:lnRef idx="2">
+            <a:schemeClr val="accent1">
+              <a:shade val="50000"/>
+            </a:schemeClr>
+          </a:lnRef>
+          <a:fillRef idx="1">
+            <a:schemeClr val="accent1"/>
+          </a:fillRef>
+          <a:effectRef idx="0">
+            <a:schemeClr val="accent1"/>
+          </a:effectRef>
+          <a:fontRef idx="minor">
+            <a:schemeClr val="lt1"/>
+          </a:fontRef>
+        </p:style>
+        <p:txBody>
+          <a:bodyPr rtlCol="0" anchor="ctr"/>
+          <a:lstStyle/>
+          <a:p>
+            <a:pPr algn="ctr"/>
+            <a:r>
+              <a:rPr lang="en-US" sz="2400" b="1" dirty="0" smtClean="0">
+                <a:latin typeface="Calibri (Corps)"/>
+                <a:cs typeface="Segoe UI Light" panose="020B0502040204020203" pitchFamily="34" charset="0"/>
+              </a:rPr>
+              <a:t>Condition C</a:t>
+            </a:r>
+            <a:endParaRPr lang="en-US" sz="2400" b="1" dirty="0">
+              <a:latin typeface="Calibri (Corps)"/>
+              <a:cs typeface="Segoe UI Light" panose="020B0502040204020203" pitchFamily="34" charset="0"/>
+            </a:endParaRPr>
+          </a:p>
+        </p:txBody>
+      </p:sp>
+      <p:sp>
+        <p:nvSpPr>
+          <p:cNvPr id="12" name="Rectangle 11"/>
+          <p:cNvSpPr/>
+          <p:nvPr/>
+        </p:nvSpPr>
+        <p:spPr>
+          <a:xfrm>
+            <a:off x="152641" y="1563838"/>
+            <a:ext cx="3156041" cy="684903"/>
+          </a:xfrm>
+          <a:prstGeom prst="rect">
+            <a:avLst/>
+          </a:prstGeom>
+          <a:solidFill>
+            <a:srgbClr val="660066"/>
+          </a:solidFill>
+          <a:ln>
+            <a:noFill/>
+          </a:ln>
+        </p:spPr>
+        <p:style>
+          <a:lnRef idx="2">
+            <a:schemeClr val="accent1">
+              <a:shade val="50000"/>
+            </a:schemeClr>
+          </a:lnRef>
+          <a:fillRef idx="1">
+            <a:schemeClr val="accent1"/>
+          </a:fillRef>
+          <a:effectRef idx="0">
+            <a:schemeClr val="accent1"/>
+          </a:effectRef>
+          <a:fontRef idx="minor">
+            <a:schemeClr val="lt1"/>
+          </a:fontRef>
+        </p:style>
+        <p:txBody>
+          <a:bodyPr rtlCol="0" anchor="ctr"/>
+          <a:lstStyle/>
+          <a:p>
+            <a:pPr algn="ctr"/>
+            <a:r>
+              <a:rPr lang="en-US" sz="2400" b="1" dirty="0" smtClean="0">
+                <a:latin typeface="Calibri (Corps)"/>
+                <a:cs typeface="Segoe UI Light" panose="020B0502040204020203" pitchFamily="34" charset="0"/>
+              </a:rPr>
+              <a:t>name === ‘Max’</a:t>
+            </a:r>
+            <a:endParaRPr lang="en-US" sz="2400" b="1" dirty="0">
+              <a:latin typeface="Calibri (Corps)"/>
+              <a:cs typeface="Segoe UI Light" panose="020B0502040204020203" pitchFamily="34" charset="0"/>
+            </a:endParaRPr>
+          </a:p>
+        </p:txBody>
+      </p:sp>
+      <p:sp>
+        <p:nvSpPr>
+          <p:cNvPr id="13" name="Rectangle 12"/>
+          <p:cNvSpPr/>
+          <p:nvPr/>
+        </p:nvSpPr>
+        <p:spPr>
+          <a:xfrm>
+            <a:off x="4528125" y="1563839"/>
+            <a:ext cx="3156041" cy="684903"/>
+          </a:xfrm>
+          <a:prstGeom prst="rect">
+            <a:avLst/>
+          </a:prstGeom>
+          <a:solidFill>
+            <a:srgbClr val="660066"/>
+          </a:solidFill>
+          <a:ln>
+            <a:noFill/>
+          </a:ln>
+        </p:spPr>
+        <p:style>
+          <a:lnRef idx="2">
+            <a:schemeClr val="accent1">
+              <a:shade val="50000"/>
+            </a:schemeClr>
+          </a:lnRef>
+          <a:fillRef idx="1">
+            <a:schemeClr val="accent1"/>
+          </a:fillRef>
+          <a:effectRef idx="0">
+            <a:schemeClr val="accent1"/>
+          </a:effectRef>
+          <a:fontRef idx="minor">
+            <a:schemeClr val="lt1"/>
+          </a:fontRef>
+        </p:style>
+        <p:txBody>
+          <a:bodyPr rtlCol="0" anchor="ctr"/>
+          <a:lstStyle/>
+          <a:p>
+            <a:pPr algn="ctr"/>
+            <a:r>
+              <a:rPr lang="en-US" sz="2400" b="1" dirty="0" smtClean="0">
+                <a:latin typeface="Calibri (Corps)"/>
+                <a:cs typeface="Segoe UI Light" panose="020B0502040204020203" pitchFamily="34" charset="0"/>
+              </a:rPr>
+              <a:t>name === 30</a:t>
+            </a:r>
+            <a:endParaRPr lang="en-US" sz="2400" b="1" dirty="0">
+              <a:latin typeface="Calibri (Corps)"/>
+              <a:cs typeface="Segoe UI Light" panose="020B0502040204020203" pitchFamily="34" charset="0"/>
+            </a:endParaRPr>
+          </a:p>
+        </p:txBody>
+      </p:sp>
+      <p:sp>
+        <p:nvSpPr>
+          <p:cNvPr id="14" name="Rectangle 13"/>
+          <p:cNvSpPr/>
+          <p:nvPr/>
+        </p:nvSpPr>
+        <p:spPr>
+          <a:xfrm>
+            <a:off x="8903609" y="1563838"/>
+            <a:ext cx="3156041" cy="684903"/>
+          </a:xfrm>
+          <a:prstGeom prst="rect">
+            <a:avLst/>
+          </a:prstGeom>
+          <a:solidFill>
+            <a:srgbClr val="660066"/>
+          </a:solidFill>
+          <a:ln>
+            <a:noFill/>
+          </a:ln>
+        </p:spPr>
+        <p:style>
+          <a:lnRef idx="2">
+            <a:schemeClr val="accent1">
+              <a:shade val="50000"/>
+            </a:schemeClr>
+          </a:lnRef>
+          <a:fillRef idx="1">
+            <a:schemeClr val="accent1"/>
+          </a:fillRef>
+          <a:effectRef idx="0">
+            <a:schemeClr val="accent1"/>
+          </a:effectRef>
+          <a:fontRef idx="minor">
+            <a:schemeClr val="lt1"/>
+          </a:fontRef>
+        </p:style>
+        <p:txBody>
+          <a:bodyPr rtlCol="0" anchor="ctr"/>
+          <a:lstStyle/>
+          <a:p>
+            <a:pPr algn="ctr"/>
+            <a:r>
+              <a:rPr lang="en-US" sz="2400" b="1" dirty="0" smtClean="0">
+                <a:latin typeface="Calibri (Corps)"/>
+                <a:cs typeface="Segoe UI Light" panose="020B0502040204020203" pitchFamily="34" charset="0"/>
+              </a:rPr>
+              <a:t>isAdmin</a:t>
+            </a:r>
+            <a:endParaRPr lang="en-US" sz="2400" b="1" dirty="0">
+              <a:latin typeface="Calibri (Corps)"/>
+              <a:cs typeface="Segoe UI Light" panose="020B0502040204020203" pitchFamily="34" charset="0"/>
+            </a:endParaRPr>
+          </a:p>
+        </p:txBody>
+      </p:sp>
+      <p:sp>
+        <p:nvSpPr>
+          <p:cNvPr id="15" name="Rectangle 14"/>
+          <p:cNvSpPr/>
+          <p:nvPr/>
+        </p:nvSpPr>
+        <p:spPr>
+          <a:xfrm>
+            <a:off x="3416965" y="717184"/>
+            <a:ext cx="998621" cy="622945"/>
+          </a:xfrm>
+          <a:prstGeom prst="rect">
+            <a:avLst/>
+          </a:prstGeom>
+          <a:solidFill>
+            <a:schemeClr val="accent2"/>
+          </a:solidFill>
+          <a:ln w="28575">
+            <a:solidFill>
+              <a:schemeClr val="tx1"/>
+            </a:solidFill>
+          </a:ln>
+        </p:spPr>
+        <p:style>
+          <a:lnRef idx="2">
+            <a:schemeClr val="accent1">
+              <a:shade val="50000"/>
+            </a:schemeClr>
+          </a:lnRef>
+          <a:fillRef idx="1">
+            <a:schemeClr val="accent1"/>
+          </a:fillRef>
+          <a:effectRef idx="0">
+            <a:schemeClr val="accent1"/>
+          </a:effectRef>
+          <a:fontRef idx="minor">
+            <a:schemeClr val="lt1"/>
+          </a:fontRef>
+        </p:style>
+        <p:txBody>
+          <a:bodyPr rtlCol="0" anchor="ctr"/>
+          <a:lstStyle/>
+          <a:p>
+            <a:pPr algn="ctr"/>
+            <a:r>
+              <a:rPr lang="en-US" sz="3200" dirty="0" smtClean="0"/>
+              <a:t>AND</a:t>
+            </a:r>
+            <a:endParaRPr lang="en-US" sz="3200" dirty="0"/>
+          </a:p>
+        </p:txBody>
+      </p:sp>
+      <p:sp>
+        <p:nvSpPr>
+          <p:cNvPr id="16" name="Rectangle 15"/>
+          <p:cNvSpPr/>
+          <p:nvPr/>
+        </p:nvSpPr>
+        <p:spPr>
+          <a:xfrm>
+            <a:off x="7794577" y="721195"/>
+            <a:ext cx="998621" cy="618934"/>
+          </a:xfrm>
+          <a:prstGeom prst="rect">
+            <a:avLst/>
+          </a:prstGeom>
+          <a:solidFill>
+            <a:schemeClr val="accent2"/>
+          </a:solidFill>
+          <a:ln w="28575">
+            <a:solidFill>
+              <a:schemeClr val="tx1"/>
+            </a:solidFill>
+          </a:ln>
+        </p:spPr>
+        <p:style>
+          <a:lnRef idx="2">
+            <a:schemeClr val="accent1">
+              <a:shade val="50000"/>
+            </a:schemeClr>
+          </a:lnRef>
+          <a:fillRef idx="1">
+            <a:schemeClr val="accent1"/>
+          </a:fillRef>
+          <a:effectRef idx="0">
+            <a:schemeClr val="accent1"/>
+          </a:effectRef>
+          <a:fontRef idx="minor">
+            <a:schemeClr val="lt1"/>
+          </a:fontRef>
+        </p:style>
+        <p:txBody>
+          <a:bodyPr rtlCol="0" anchor="ctr"/>
+          <a:lstStyle/>
+          <a:p>
+            <a:pPr algn="ctr"/>
+            <a:r>
+              <a:rPr lang="en-US" sz="3200" dirty="0" smtClean="0"/>
+              <a:t>OR</a:t>
+            </a:r>
+            <a:endParaRPr lang="en-US" sz="3200" dirty="0"/>
+          </a:p>
+        </p:txBody>
+      </p:sp>
+      <p:sp>
+        <p:nvSpPr>
+          <p:cNvPr id="17" name="Rectangle 16"/>
+          <p:cNvSpPr/>
+          <p:nvPr/>
+        </p:nvSpPr>
+        <p:spPr>
+          <a:xfrm>
+            <a:off x="3422979" y="1563838"/>
+            <a:ext cx="998621" cy="684903"/>
+          </a:xfrm>
+          <a:prstGeom prst="rect">
+            <a:avLst/>
+          </a:prstGeom>
+          <a:solidFill>
+            <a:schemeClr val="accent2"/>
+          </a:solidFill>
+          <a:ln w="28575">
+            <a:solidFill>
+              <a:schemeClr val="tx1"/>
+            </a:solidFill>
+          </a:ln>
+        </p:spPr>
+        <p:style>
+          <a:lnRef idx="2">
+            <a:schemeClr val="accent1">
+              <a:shade val="50000"/>
+            </a:schemeClr>
+          </a:lnRef>
+          <a:fillRef idx="1">
+            <a:schemeClr val="accent1"/>
+          </a:fillRef>
+          <a:effectRef idx="0">
+            <a:schemeClr val="accent1"/>
+          </a:effectRef>
+          <a:fontRef idx="minor">
+            <a:schemeClr val="lt1"/>
+          </a:fontRef>
+        </p:style>
+        <p:txBody>
+          <a:bodyPr rtlCol="0" anchor="ctr"/>
+          <a:lstStyle/>
+          <a:p>
+            <a:pPr algn="ctr"/>
+            <a:r>
+              <a:rPr lang="en-US" sz="3200" dirty="0" smtClean="0"/>
+              <a:t>&amp;&amp;</a:t>
+            </a:r>
+            <a:endParaRPr lang="en-US" sz="3200" dirty="0"/>
+          </a:p>
+        </p:txBody>
+      </p:sp>
+      <p:sp>
+        <p:nvSpPr>
+          <p:cNvPr id="18" name="Rectangle 17"/>
+          <p:cNvSpPr/>
+          <p:nvPr/>
+        </p:nvSpPr>
+        <p:spPr>
+          <a:xfrm>
+            <a:off x="7772398" y="1563838"/>
+            <a:ext cx="998621" cy="684903"/>
+          </a:xfrm>
+          <a:prstGeom prst="rect">
+            <a:avLst/>
+          </a:prstGeom>
+          <a:solidFill>
+            <a:schemeClr val="accent2"/>
+          </a:solidFill>
+          <a:ln w="28575">
+            <a:solidFill>
+              <a:schemeClr val="tx1"/>
+            </a:solidFill>
+          </a:ln>
+        </p:spPr>
+        <p:style>
+          <a:lnRef idx="2">
+            <a:schemeClr val="accent1">
+              <a:shade val="50000"/>
+            </a:schemeClr>
+          </a:lnRef>
+          <a:fillRef idx="1">
+            <a:schemeClr val="accent1"/>
+          </a:fillRef>
+          <a:effectRef idx="0">
+            <a:schemeClr val="accent1"/>
+          </a:effectRef>
+          <a:fontRef idx="minor">
+            <a:schemeClr val="lt1"/>
+          </a:fontRef>
+        </p:style>
+        <p:txBody>
+          <a:bodyPr rtlCol="0" anchor="ctr"/>
+          <a:lstStyle/>
+          <a:p>
+            <a:pPr algn="ctr"/>
+            <a:r>
+              <a:rPr lang="en-US" sz="3200" dirty="0" smtClean="0"/>
+              <a:t>||</a:t>
+            </a:r>
+            <a:endParaRPr lang="en-US" sz="3200" dirty="0"/>
+          </a:p>
+        </p:txBody>
+      </p:sp>
+      <p:grpSp>
+        <p:nvGrpSpPr>
+          <p:cNvPr id="3" name="Groupe 2"/>
+          <p:cNvGrpSpPr/>
+          <p:nvPr/>
+        </p:nvGrpSpPr>
+        <p:grpSpPr>
+          <a:xfrm>
+            <a:off x="152642" y="2472449"/>
+            <a:ext cx="6187999" cy="984894"/>
+            <a:chOff x="152643" y="4218004"/>
+            <a:chExt cx="6187999" cy="984894"/>
+          </a:xfrm>
+        </p:grpSpPr>
+        <p:sp>
+          <p:nvSpPr>
+            <p:cNvPr id="11" name="Rectangle 10"/>
+            <p:cNvSpPr/>
+            <p:nvPr/>
+          </p:nvSpPr>
+          <p:spPr>
+            <a:xfrm>
+              <a:off x="152643" y="4218004"/>
+              <a:ext cx="2854889" cy="371285"/>
+            </a:xfrm>
+            <a:prstGeom prst="rect">
+              <a:avLst/>
+            </a:prstGeom>
+            <a:solidFill>
+              <a:srgbClr val="660066"/>
+            </a:solidFill>
+            <a:ln w="28575">
+              <a:solidFill>
+                <a:srgbClr val="660066"/>
+              </a:solidFill>
+            </a:ln>
+          </p:spPr>
+          <p:style>
+            <a:lnRef idx="2">
+              <a:schemeClr val="accent1">
+                <a:shade val="50000"/>
+              </a:schemeClr>
+            </a:lnRef>
+            <a:fillRef idx="1">
+              <a:schemeClr val="accent1"/>
+            </a:fillRef>
+            <a:effectRef idx="0">
+              <a:schemeClr val="accent1"/>
+            </a:effectRef>
+            <a:fontRef idx="minor">
+              <a:schemeClr val="lt1"/>
+            </a:fontRef>
+          </p:style>
+          <p:txBody>
+            <a:bodyPr rtlCol="0" anchor="ctr"/>
+            <a:lstStyle/>
+            <a:p>
+              <a:pPr algn="ctr"/>
+              <a:r>
+                <a:rPr lang="en-US" sz="2400" b="1" dirty="0" smtClean="0">
+                  <a:latin typeface="Calibri (Corps)"/>
+                  <a:cs typeface="Segoe UI Light" panose="020B0502040204020203" pitchFamily="34" charset="0"/>
+                </a:rPr>
+                <a:t>Part 1</a:t>
+              </a:r>
+              <a:endParaRPr lang="en-US" sz="2400" b="1" dirty="0">
+                <a:latin typeface="Calibri (Corps)"/>
+                <a:cs typeface="Segoe UI Light" panose="020B0502040204020203" pitchFamily="34" charset="0"/>
+              </a:endParaRPr>
+            </a:p>
+          </p:txBody>
+        </p:sp>
+        <p:sp>
+          <p:nvSpPr>
+            <p:cNvPr id="19" name="Rectangle 18"/>
+            <p:cNvSpPr/>
+            <p:nvPr/>
+          </p:nvSpPr>
+          <p:spPr>
+            <a:xfrm>
+              <a:off x="152643" y="4589288"/>
+              <a:ext cx="6187999" cy="613610"/>
+            </a:xfrm>
+            <a:prstGeom prst="rect">
+              <a:avLst/>
+            </a:prstGeom>
+            <a:solidFill>
+              <a:srgbClr val="CC3399">
+                <a:alpha val="29020"/>
+              </a:srgbClr>
+            </a:solidFill>
+            <a:ln w="28575">
+              <a:solidFill>
+                <a:srgbClr val="660066"/>
+              </a:solidFill>
+            </a:ln>
+          </p:spPr>
+          <p:style>
+            <a:lnRef idx="2">
+              <a:schemeClr val="accent1">
+                <a:shade val="50000"/>
+              </a:schemeClr>
+            </a:lnRef>
+            <a:fillRef idx="1">
+              <a:schemeClr val="accent1"/>
+            </a:fillRef>
+            <a:effectRef idx="0">
+              <a:schemeClr val="accent1"/>
+            </a:effectRef>
+            <a:fontRef idx="minor">
+              <a:schemeClr val="lt1"/>
+            </a:fontRef>
+          </p:style>
+          <p:txBody>
+            <a:bodyPr rtlCol="0" anchor="ctr"/>
+            <a:lstStyle/>
+            <a:p>
+              <a:pPr algn="ctr"/>
+              <a:r>
+                <a:rPr lang="en-US" dirty="0" smtClean="0">
+                  <a:solidFill>
+                    <a:srgbClr val="660066"/>
+                  </a:solidFill>
+                  <a:latin typeface="Calibri (Corps)"/>
+                  <a:cs typeface="Segoe UI Light" panose="020B0502040204020203" pitchFamily="34" charset="0"/>
+                </a:rPr>
+                <a:t>Evaluated together (yields true if each condition yields true)</a:t>
+              </a:r>
+              <a:endParaRPr lang="en-US" dirty="0">
+                <a:solidFill>
+                  <a:srgbClr val="660066"/>
+                </a:solidFill>
+                <a:latin typeface="Calibri (Corps)"/>
+                <a:cs typeface="Segoe UI Light" panose="020B0502040204020203" pitchFamily="34" charset="0"/>
+              </a:endParaRPr>
+            </a:p>
+          </p:txBody>
+        </p:sp>
+      </p:grpSp>
+      <p:grpSp>
+        <p:nvGrpSpPr>
+          <p:cNvPr id="20" name="Groupe 19"/>
+          <p:cNvGrpSpPr/>
+          <p:nvPr/>
+        </p:nvGrpSpPr>
+        <p:grpSpPr>
+          <a:xfrm>
+            <a:off x="152641" y="3731606"/>
+            <a:ext cx="6187999" cy="984894"/>
+            <a:chOff x="152643" y="4218004"/>
+            <a:chExt cx="6187999" cy="984894"/>
+          </a:xfrm>
+        </p:grpSpPr>
+        <p:sp>
+          <p:nvSpPr>
+            <p:cNvPr id="21" name="Rectangle 20"/>
+            <p:cNvSpPr/>
+            <p:nvPr/>
+          </p:nvSpPr>
+          <p:spPr>
+            <a:xfrm>
+              <a:off x="152643" y="4218004"/>
+              <a:ext cx="2854889" cy="371285"/>
+            </a:xfrm>
+            <a:prstGeom prst="rect">
+              <a:avLst/>
+            </a:prstGeom>
+            <a:solidFill>
+              <a:srgbClr val="660066"/>
+            </a:solidFill>
+            <a:ln w="28575">
+              <a:solidFill>
+                <a:srgbClr val="660066"/>
+              </a:solidFill>
+            </a:ln>
+          </p:spPr>
+          <p:style>
+            <a:lnRef idx="2">
+              <a:schemeClr val="accent1">
+                <a:shade val="50000"/>
+              </a:schemeClr>
+            </a:lnRef>
+            <a:fillRef idx="1">
+              <a:schemeClr val="accent1"/>
+            </a:fillRef>
+            <a:effectRef idx="0">
+              <a:schemeClr val="accent1"/>
+            </a:effectRef>
+            <a:fontRef idx="minor">
+              <a:schemeClr val="lt1"/>
+            </a:fontRef>
+          </p:style>
+          <p:txBody>
+            <a:bodyPr rtlCol="0" anchor="ctr"/>
+            <a:lstStyle/>
+            <a:p>
+              <a:pPr algn="ctr"/>
+              <a:r>
+                <a:rPr lang="en-US" sz="2400" b="1" dirty="0" smtClean="0">
+                  <a:latin typeface="Calibri (Corps)"/>
+                  <a:cs typeface="Segoe UI Light" panose="020B0502040204020203" pitchFamily="34" charset="0"/>
+                </a:rPr>
+                <a:t>Part 2</a:t>
+              </a:r>
+              <a:endParaRPr lang="en-US" sz="2400" b="1" dirty="0">
+                <a:latin typeface="Calibri (Corps)"/>
+                <a:cs typeface="Segoe UI Light" panose="020B0502040204020203" pitchFamily="34" charset="0"/>
+              </a:endParaRPr>
+            </a:p>
+          </p:txBody>
+        </p:sp>
+        <p:sp>
+          <p:nvSpPr>
+            <p:cNvPr id="22" name="Rectangle 21"/>
+            <p:cNvSpPr/>
+            <p:nvPr/>
+          </p:nvSpPr>
+          <p:spPr>
+            <a:xfrm>
+              <a:off x="152643" y="4589288"/>
+              <a:ext cx="6187999" cy="613610"/>
+            </a:xfrm>
+            <a:prstGeom prst="rect">
+              <a:avLst/>
+            </a:prstGeom>
+            <a:solidFill>
+              <a:srgbClr val="CC3399">
+                <a:alpha val="29020"/>
+              </a:srgbClr>
+            </a:solidFill>
+            <a:ln w="28575">
+              <a:solidFill>
+                <a:srgbClr val="660066"/>
+              </a:solidFill>
+            </a:ln>
+          </p:spPr>
+          <p:style>
+            <a:lnRef idx="2">
+              <a:schemeClr val="accent1">
+                <a:shade val="50000"/>
+              </a:schemeClr>
+            </a:lnRef>
+            <a:fillRef idx="1">
+              <a:schemeClr val="accent1"/>
+            </a:fillRef>
+            <a:effectRef idx="0">
+              <a:schemeClr val="accent1"/>
+            </a:effectRef>
+            <a:fontRef idx="minor">
+              <a:schemeClr val="lt1"/>
+            </a:fontRef>
+          </p:style>
+          <p:txBody>
+            <a:bodyPr rtlCol="0" anchor="ctr"/>
+            <a:lstStyle/>
+            <a:p>
+              <a:pPr algn="ctr"/>
+              <a:r>
+                <a:rPr lang="en-US" dirty="0" smtClean="0">
+                  <a:solidFill>
+                    <a:srgbClr val="660066"/>
+                  </a:solidFill>
+                  <a:latin typeface="Calibri (Corps)"/>
+                  <a:cs typeface="Segoe UI Light" panose="020B0502040204020203" pitchFamily="34" charset="0"/>
+                </a:rPr>
+                <a:t>Evaluated as an alternative</a:t>
+              </a:r>
+              <a:endParaRPr lang="en-US" dirty="0">
+                <a:solidFill>
+                  <a:srgbClr val="660066"/>
+                </a:solidFill>
+                <a:latin typeface="Calibri (Corps)"/>
+                <a:cs typeface="Segoe UI Light" panose="020B0502040204020203" pitchFamily="34" charset="0"/>
+              </a:endParaRPr>
+            </a:p>
+          </p:txBody>
+        </p:sp>
+      </p:grpSp>
+      <p:sp>
+        <p:nvSpPr>
+          <p:cNvPr id="23" name="Rectangle 22"/>
+          <p:cNvSpPr/>
+          <p:nvPr/>
+        </p:nvSpPr>
+        <p:spPr>
+          <a:xfrm>
+            <a:off x="2176891" y="5796135"/>
+            <a:ext cx="7858507" cy="622947"/>
+          </a:xfrm>
+          <a:prstGeom prst="rect">
+            <a:avLst/>
+          </a:prstGeom>
+          <a:solidFill>
+            <a:srgbClr val="FCF600">
+              <a:alpha val="29020"/>
+            </a:srgbClr>
+          </a:solidFill>
+          <a:ln w="28575">
+            <a:solidFill>
+              <a:schemeClr val="tx1"/>
+            </a:solidFill>
+          </a:ln>
+        </p:spPr>
+        <p:style>
+          <a:lnRef idx="2">
+            <a:schemeClr val="accent1">
+              <a:shade val="50000"/>
+            </a:schemeClr>
+          </a:lnRef>
+          <a:fillRef idx="1">
+            <a:schemeClr val="accent1"/>
+          </a:fillRef>
+          <a:effectRef idx="0">
+            <a:schemeClr val="accent1"/>
+          </a:effectRef>
+          <a:fontRef idx="minor">
+            <a:schemeClr val="lt1"/>
+          </a:fontRef>
+        </p:style>
+        <p:txBody>
+          <a:bodyPr rtlCol="0" anchor="ctr"/>
+          <a:lstStyle/>
+          <a:p>
+            <a:pPr algn="ctr"/>
+            <a:r>
+              <a:rPr lang="en-US" sz="2000" dirty="0" smtClean="0">
+                <a:solidFill>
+                  <a:sysClr val="windowText" lastClr="000000"/>
+                </a:solidFill>
+                <a:latin typeface="Calibri (Corps)"/>
+                <a:cs typeface="Segoe UI Light" panose="020B0502040204020203" pitchFamily="34" charset="0"/>
+              </a:rPr>
+              <a:t>You can use parentheses to control what’s evaluated together</a:t>
+            </a:r>
+            <a:endParaRPr lang="en-US" sz="2000" dirty="0">
+              <a:solidFill>
+                <a:sysClr val="windowText" lastClr="000000"/>
+              </a:solidFill>
+              <a:latin typeface="Calibri (Corps)"/>
+              <a:cs typeface="Segoe UI Light" panose="020B0502040204020203" pitchFamily="34" charset="0"/>
+            </a:endParaRPr>
+          </a:p>
+        </p:txBody>
+      </p:sp>
+      <p:sp>
+        <p:nvSpPr>
+          <p:cNvPr id="24" name="Rectangle 23"/>
+          <p:cNvSpPr/>
+          <p:nvPr/>
+        </p:nvSpPr>
+        <p:spPr>
+          <a:xfrm>
+            <a:off x="152641" y="4990763"/>
+            <a:ext cx="11907010" cy="622947"/>
+          </a:xfrm>
+          <a:prstGeom prst="rect">
+            <a:avLst/>
+          </a:prstGeom>
+          <a:solidFill>
+            <a:srgbClr val="FCF600">
+              <a:alpha val="29020"/>
+            </a:srgbClr>
+          </a:solidFill>
+          <a:ln w="28575">
+            <a:solidFill>
+              <a:schemeClr val="tx1"/>
+            </a:solidFill>
+          </a:ln>
+        </p:spPr>
+        <p:style>
+          <a:lnRef idx="2">
+            <a:schemeClr val="accent1">
+              <a:shade val="50000"/>
+            </a:schemeClr>
+          </a:lnRef>
+          <a:fillRef idx="1">
+            <a:schemeClr val="accent1"/>
+          </a:fillRef>
+          <a:effectRef idx="0">
+            <a:schemeClr val="accent1"/>
+          </a:effectRef>
+          <a:fontRef idx="minor">
+            <a:schemeClr val="lt1"/>
+          </a:fontRef>
+        </p:style>
+        <p:txBody>
+          <a:bodyPr rtlCol="0" anchor="ctr"/>
+          <a:lstStyle/>
+          <a:p>
+            <a:pPr algn="ctr"/>
+            <a:r>
+              <a:rPr lang="en-US" sz="2000" dirty="0" smtClean="0">
+                <a:solidFill>
+                  <a:sysClr val="windowText" lastClr="000000"/>
+                </a:solidFill>
+                <a:latin typeface="Calibri (Corps)"/>
+                <a:cs typeface="Segoe UI Light" panose="020B0502040204020203" pitchFamily="34" charset="0"/>
+              </a:rPr>
+              <a:t>Yields true if Part 1 OR Part 2 yields true</a:t>
+            </a:r>
+            <a:endParaRPr lang="en-US" sz="2000" dirty="0">
+              <a:solidFill>
+                <a:sysClr val="windowText" lastClr="000000"/>
+              </a:solidFill>
+              <a:latin typeface="Calibri (Corps)"/>
+              <a:cs typeface="Segoe UI Light" panose="020B0502040204020203" pitchFamily="34" charset="0"/>
+            </a:endParaRPr>
+          </a:p>
+        </p:txBody>
+      </p:sp>
+    </p:spTree>
+    <p:extLst>
+      <p:ext uri="{BB962C8B-B14F-4D97-AF65-F5344CB8AC3E}">
+        <p14:creationId xmlns:p14="http://schemas.microsoft.com/office/powerpoint/2010/main" val="954540010"/>
+      </p:ext>
+    </p:extLst>
+  </p:cSld>
+  <p:clrMapOvr>
+    <a:masterClrMapping/>
+  </p:clrMapOvr>
+</p:sld>
+</file>
+
 <file path=ppt/theme/theme1.xml><?xml version="1.0" encoding="utf-8"?>
 <a:theme xmlns:a="http://schemas.openxmlformats.org/drawingml/2006/main" name="Thème Office">
   <a:themeElements>

</xml_diff>

<commit_message>
10. Beyond true false Truthy and Falsy Values
</commit_message>
<xml_diff>
--- a/4. Working with Control Structures (if Statements, Loops, Error Handling)/docs/Introduction.pptx
+++ b/4. Working with Control Structures (if Statements, Loops, Error Handling)/docs/Introduction.pptx
@@ -10,7 +10,9 @@
     <p:sldId id="260" r:id="rId4"/>
     <p:sldId id="261" r:id="rId5"/>
     <p:sldId id="258" r:id="rId6"/>
-    <p:sldId id="263" r:id="rId7"/>
+    <p:sldId id="264" r:id="rId7"/>
+    <p:sldId id="263" r:id="rId8"/>
+    <p:sldId id="265" r:id="rId9"/>
   </p:sldIdLst>
   <p:sldSz cx="12192000" cy="6858000"/>
   <p:notesSz cx="6858000" cy="9144000"/>
@@ -110,6 +112,22 @@
     </a:lvl9pPr>
   </p:defaultTextStyle>
   <p:extLst>
+    <p:ext uri="{521415D9-36F7-43E2-AB2F-B90AF26B5E84}">
+      <p14:sectionLst xmlns:p14="http://schemas.microsoft.com/office/powerpoint/2010/main">
+        <p14:section name="Section par défaut" id="{87F592A3-39DE-43F0-8DBD-D4C1529E6111}">
+          <p14:sldIdLst>
+            <p14:sldId id="256"/>
+            <p14:sldId id="259"/>
+            <p14:sldId id="260"/>
+            <p14:sldId id="261"/>
+            <p14:sldId id="258"/>
+            <p14:sldId id="264"/>
+            <p14:sldId id="263"/>
+            <p14:sldId id="265"/>
+          </p14:sldIdLst>
+        </p14:section>
+      </p14:sectionLst>
+    </p:ext>
     <p:ext uri="{EFAFB233-063F-42B5-8137-9DF3F51BA10A}">
       <p15:sldGuideLst xmlns:p15="http://schemas.microsoft.com/office/powerpoint/2012/main"/>
     </p:ext>
@@ -6600,42 +6618,6 @@
       </p:grpSpPr>
       <p:sp>
         <p:nvSpPr>
-          <p:cNvPr id="4" name="ZoneTexte 3"/>
-          <p:cNvSpPr txBox="1"/>
-          <p:nvPr/>
-        </p:nvSpPr>
-        <p:spPr>
-          <a:xfrm>
-            <a:off x="489527" y="193964"/>
-            <a:ext cx="6007526" cy="523220"/>
-          </a:xfrm>
-          <a:prstGeom prst="rect">
-            <a:avLst/>
-          </a:prstGeom>
-          <a:noFill/>
-        </p:spPr>
-        <p:txBody>
-          <a:bodyPr wrap="square" rtlCol="0">
-            <a:spAutoFit/>
-          </a:bodyPr>
-          <a:lstStyle/>
-          <a:p>
-            <a:r>
-              <a:rPr lang="en-US" sz="2800" b="1" dirty="0" smtClean="0">
-                <a:ea typeface="Segoe UI Black" panose="020B0A02040204020203" pitchFamily="34" charset="0"/>
-                <a:cs typeface="Segoe UI Semibold" panose="020B0702040204020203" pitchFamily="34" charset="0"/>
-              </a:rPr>
-              <a:t>Combining Conditions</a:t>
-            </a:r>
-            <a:endParaRPr lang="en-US" sz="2800" b="1" dirty="0" smtClean="0">
-              <a:ea typeface="Segoe UI Black" panose="020B0A02040204020203" pitchFamily="34" charset="0"/>
-              <a:cs typeface="Segoe UI Semibold" panose="020B0702040204020203" pitchFamily="34" charset="0"/>
-            </a:endParaRPr>
-          </a:p>
-        </p:txBody>
-      </p:sp>
-      <p:sp>
-        <p:nvSpPr>
           <p:cNvPr id="10" name="Rectangle 9"/>
           <p:cNvSpPr/>
           <p:nvPr/>
@@ -7588,10 +7570,2300 @@
           </a:p>
         </p:txBody>
       </p:sp>
+      <p:sp>
+        <p:nvSpPr>
+          <p:cNvPr id="25" name="ZoneTexte 24"/>
+          <p:cNvSpPr txBox="1"/>
+          <p:nvPr/>
+        </p:nvSpPr>
+        <p:spPr>
+          <a:xfrm>
+            <a:off x="242877" y="37576"/>
+            <a:ext cx="6007526" cy="523220"/>
+          </a:xfrm>
+          <a:prstGeom prst="rect">
+            <a:avLst/>
+          </a:prstGeom>
+          <a:noFill/>
+        </p:spPr>
+        <p:txBody>
+          <a:bodyPr wrap="square" rtlCol="0">
+            <a:spAutoFit/>
+          </a:bodyPr>
+          <a:lstStyle/>
+          <a:p>
+            <a:r>
+              <a:rPr lang="en-US" sz="2800" b="1" dirty="0" smtClean="0">
+                <a:ea typeface="Segoe UI Black" panose="020B0A02040204020203" pitchFamily="34" charset="0"/>
+                <a:cs typeface="Segoe UI Semibold" panose="020B0702040204020203" pitchFamily="34" charset="0"/>
+              </a:rPr>
+              <a:t>Combining Conditions</a:t>
+            </a:r>
+          </a:p>
+        </p:txBody>
+      </p:sp>
+    </p:spTree>
+    <p:extLst>
+      <p:ext uri="{BB962C8B-B14F-4D97-AF65-F5344CB8AC3E}">
+        <p14:creationId xmlns:p14="http://schemas.microsoft.com/office/powerpoint/2010/main" val="2640651730"/>
+      </p:ext>
+    </p:extLst>
+  </p:cSld>
+  <p:clrMapOvr>
+    <a:masterClrMapping/>
+  </p:clrMapOvr>
+</p:sld>
+</file>
+
+<file path=ppt/slides/slide7.xml><?xml version="1.0" encoding="utf-8"?>
+<p:sld xmlns:a="http://schemas.openxmlformats.org/drawingml/2006/main" xmlns:r="http://schemas.openxmlformats.org/officeDocument/2006/relationships" xmlns:p="http://schemas.openxmlformats.org/presentationml/2006/main">
+  <p:cSld>
+    <p:spTree>
+      <p:nvGrpSpPr>
+        <p:cNvPr id="1" name=""/>
+        <p:cNvGrpSpPr/>
+        <p:nvPr/>
+      </p:nvGrpSpPr>
+      <p:grpSpPr>
+        <a:xfrm>
+          <a:off x="0" y="0"/>
+          <a:ext cx="0" cy="0"/>
+          <a:chOff x="0" y="0"/>
+          <a:chExt cx="0" cy="0"/>
+        </a:xfrm>
+      </p:grpSpPr>
+      <p:sp>
+        <p:nvSpPr>
+          <p:cNvPr id="15" name="Rectangle 14"/>
+          <p:cNvSpPr/>
+          <p:nvPr/>
+        </p:nvSpPr>
+        <p:spPr>
+          <a:xfrm>
+            <a:off x="50246" y="1893817"/>
+            <a:ext cx="1669439" cy="1341413"/>
+          </a:xfrm>
+          <a:prstGeom prst="rect">
+            <a:avLst/>
+          </a:prstGeom>
+          <a:solidFill>
+            <a:schemeClr val="accent2"/>
+          </a:solidFill>
+          <a:ln w="28575">
+            <a:solidFill>
+              <a:schemeClr val="tx1"/>
+            </a:solidFill>
+          </a:ln>
+        </p:spPr>
+        <p:style>
+          <a:lnRef idx="2">
+            <a:schemeClr val="accent1">
+              <a:shade val="50000"/>
+            </a:schemeClr>
+          </a:lnRef>
+          <a:fillRef idx="1">
+            <a:schemeClr val="accent1"/>
+          </a:fillRef>
+          <a:effectRef idx="0">
+            <a:schemeClr val="accent1"/>
+          </a:effectRef>
+          <a:fontRef idx="minor">
+            <a:schemeClr val="lt1"/>
+          </a:fontRef>
+        </p:style>
+        <p:txBody>
+          <a:bodyPr rtlCol="0" anchor="ctr"/>
+          <a:lstStyle/>
+          <a:p>
+            <a:pPr algn="ctr"/>
+            <a:r>
+              <a:rPr lang="en-US" sz="2000" dirty="0" smtClean="0"/>
+              <a:t>Yields </a:t>
+            </a:r>
+            <a:r>
+              <a:rPr lang="en-US" sz="2000" b="1" dirty="0" smtClean="0"/>
+              <a:t>true </a:t>
+            </a:r>
+            <a:r>
+              <a:rPr lang="en-US" sz="2000" dirty="0" smtClean="0"/>
+              <a:t>(i.e. a Boolean value) </a:t>
+            </a:r>
+            <a:endParaRPr lang="en-US" sz="2000" dirty="0"/>
+          </a:p>
+        </p:txBody>
+      </p:sp>
+      <p:sp>
+        <p:nvSpPr>
+          <p:cNvPr id="25" name="ZoneTexte 24"/>
+          <p:cNvSpPr txBox="1"/>
+          <p:nvPr/>
+        </p:nvSpPr>
+        <p:spPr>
+          <a:xfrm>
+            <a:off x="242877" y="102752"/>
+            <a:ext cx="6007526" cy="523220"/>
+          </a:xfrm>
+          <a:prstGeom prst="rect">
+            <a:avLst/>
+          </a:prstGeom>
+          <a:noFill/>
+        </p:spPr>
+        <p:txBody>
+          <a:bodyPr wrap="square" rtlCol="0">
+            <a:spAutoFit/>
+          </a:bodyPr>
+          <a:lstStyle/>
+          <a:p>
+            <a:r>
+              <a:rPr lang="en-US" sz="2800" b="1" dirty="0" smtClean="0">
+                <a:ea typeface="Segoe UI Black" panose="020B0A02040204020203" pitchFamily="34" charset="0"/>
+                <a:cs typeface="Segoe UI Semibold" panose="020B0702040204020203" pitchFamily="34" charset="0"/>
+              </a:rPr>
+              <a:t>Falsy and Truthy Values </a:t>
+            </a:r>
+            <a:endParaRPr lang="en-US" sz="2800" b="1" dirty="0" smtClean="0">
+              <a:ea typeface="Segoe UI Black" panose="020B0A02040204020203" pitchFamily="34" charset="0"/>
+              <a:cs typeface="Segoe UI Semibold" panose="020B0702040204020203" pitchFamily="34" charset="0"/>
+            </a:endParaRPr>
+          </a:p>
+        </p:txBody>
+      </p:sp>
+      <p:sp>
+        <p:nvSpPr>
+          <p:cNvPr id="26" name="Rectangle 25"/>
+          <p:cNvSpPr/>
+          <p:nvPr/>
+        </p:nvSpPr>
+        <p:spPr>
+          <a:xfrm>
+            <a:off x="1842955" y="1893817"/>
+            <a:ext cx="4100646" cy="1679563"/>
+          </a:xfrm>
+          <a:prstGeom prst="rect">
+            <a:avLst/>
+          </a:prstGeom>
+          <a:solidFill>
+            <a:srgbClr val="CC3399">
+              <a:alpha val="29020"/>
+            </a:srgbClr>
+          </a:solidFill>
+          <a:ln w="28575">
+            <a:solidFill>
+              <a:srgbClr val="660066"/>
+            </a:solidFill>
+          </a:ln>
+        </p:spPr>
+        <p:style>
+          <a:lnRef idx="2">
+            <a:schemeClr val="accent1">
+              <a:shade val="50000"/>
+            </a:schemeClr>
+          </a:lnRef>
+          <a:fillRef idx="1">
+            <a:schemeClr val="accent1"/>
+          </a:fillRef>
+          <a:effectRef idx="0">
+            <a:schemeClr val="accent1"/>
+          </a:effectRef>
+          <a:fontRef idx="minor">
+            <a:schemeClr val="lt1"/>
+          </a:fontRef>
+        </p:style>
+        <p:txBody>
+          <a:bodyPr rtlCol="0" anchor="ctr"/>
+          <a:lstStyle/>
+          <a:p>
+            <a:pPr algn="ctr"/>
+            <a:r>
+              <a:rPr lang="en-US" sz="2000" dirty="0" smtClean="0">
+                <a:solidFill>
+                  <a:srgbClr val="660066"/>
+                </a:solidFill>
+                <a:latin typeface="Calibri (Corps)"/>
+                <a:cs typeface="Segoe UI Light" panose="020B0502040204020203" pitchFamily="34" charset="0"/>
+              </a:rPr>
+              <a:t>const nameInupt = ‘Max’;</a:t>
+            </a:r>
+          </a:p>
+          <a:p>
+            <a:pPr algn="ctr"/>
+            <a:endParaRPr lang="en-US" sz="2000" dirty="0">
+              <a:solidFill>
+                <a:srgbClr val="660066"/>
+              </a:solidFill>
+              <a:latin typeface="Calibri (Corps)"/>
+              <a:cs typeface="Segoe UI Light" panose="020B0502040204020203" pitchFamily="34" charset="0"/>
+            </a:endParaRPr>
+          </a:p>
+          <a:p>
+            <a:pPr algn="ctr"/>
+            <a:r>
+              <a:rPr lang="en-US" sz="2000" dirty="0" smtClean="0">
+                <a:solidFill>
+                  <a:srgbClr val="660066"/>
+                </a:solidFill>
+                <a:latin typeface="Calibri (Corps)"/>
+                <a:cs typeface="Segoe UI Light" panose="020B0502040204020203" pitchFamily="34" charset="0"/>
+              </a:rPr>
+              <a:t>If (</a:t>
+            </a:r>
+            <a:r>
+              <a:rPr lang="en-US" sz="2000" dirty="0" err="1" smtClean="0">
+                <a:solidFill>
+                  <a:srgbClr val="660066"/>
+                </a:solidFill>
+                <a:latin typeface="Calibri (Corps)"/>
+                <a:cs typeface="Segoe UI Light" panose="020B0502040204020203" pitchFamily="34" charset="0"/>
+              </a:rPr>
+              <a:t>nameInput</a:t>
+            </a:r>
+            <a:r>
+              <a:rPr lang="en-US" sz="2000" dirty="0" smtClean="0">
+                <a:solidFill>
+                  <a:srgbClr val="660066"/>
+                </a:solidFill>
+                <a:latin typeface="Calibri (Corps)"/>
+                <a:cs typeface="Segoe UI Light" panose="020B0502040204020203" pitchFamily="34" charset="0"/>
+              </a:rPr>
+              <a:t> === ‘Max’) { … }</a:t>
+            </a:r>
+          </a:p>
+        </p:txBody>
+      </p:sp>
+      <p:sp>
+        <p:nvSpPr>
+          <p:cNvPr id="29" name="Flèche vers le haut 28"/>
+          <p:cNvSpPr/>
+          <p:nvPr/>
+        </p:nvSpPr>
+        <p:spPr>
+          <a:xfrm rot="10800000">
+            <a:off x="3450527" y="3666547"/>
+            <a:ext cx="885501" cy="1679565"/>
+          </a:xfrm>
+          <a:prstGeom prst="upArrow">
+            <a:avLst/>
+          </a:prstGeom>
+          <a:solidFill>
+            <a:schemeClr val="accent2"/>
+          </a:solidFill>
+          <a:ln w="28575">
+            <a:solidFill>
+              <a:schemeClr val="tx1"/>
+            </a:solidFill>
+          </a:ln>
+        </p:spPr>
+        <p:style>
+          <a:lnRef idx="2">
+            <a:schemeClr val="accent1">
+              <a:shade val="50000"/>
+            </a:schemeClr>
+          </a:lnRef>
+          <a:fillRef idx="1">
+            <a:schemeClr val="accent1"/>
+          </a:fillRef>
+          <a:effectRef idx="0">
+            <a:schemeClr val="accent1"/>
+          </a:effectRef>
+          <a:fontRef idx="minor">
+            <a:schemeClr val="lt1"/>
+          </a:fontRef>
+        </p:style>
+        <p:txBody>
+          <a:bodyPr rtlCol="0" anchor="ctr"/>
+          <a:lstStyle/>
+          <a:p>
+            <a:pPr algn="ctr"/>
+            <a:r>
+              <a:rPr lang="en-US" sz="2800" dirty="0" smtClean="0"/>
+              <a:t> </a:t>
+            </a:r>
+            <a:endParaRPr lang="en-US" sz="2800" dirty="0"/>
+          </a:p>
+        </p:txBody>
+      </p:sp>
+      <p:sp>
+        <p:nvSpPr>
+          <p:cNvPr id="30" name="Rectangle 29"/>
+          <p:cNvSpPr/>
+          <p:nvPr/>
+        </p:nvSpPr>
+        <p:spPr>
+          <a:xfrm>
+            <a:off x="1842955" y="5466936"/>
+            <a:ext cx="4100646" cy="884166"/>
+          </a:xfrm>
+          <a:prstGeom prst="rect">
+            <a:avLst/>
+          </a:prstGeom>
+          <a:solidFill>
+            <a:schemeClr val="accent2"/>
+          </a:solidFill>
+          <a:ln w="28575">
+            <a:solidFill>
+              <a:schemeClr val="tx1"/>
+            </a:solidFill>
+          </a:ln>
+        </p:spPr>
+        <p:style>
+          <a:lnRef idx="2">
+            <a:schemeClr val="accent1">
+              <a:shade val="50000"/>
+            </a:schemeClr>
+          </a:lnRef>
+          <a:fillRef idx="1">
+            <a:schemeClr val="accent1"/>
+          </a:fillRef>
+          <a:effectRef idx="0">
+            <a:schemeClr val="accent1"/>
+          </a:effectRef>
+          <a:fontRef idx="minor">
+            <a:schemeClr val="lt1"/>
+          </a:fontRef>
+        </p:style>
+        <p:txBody>
+          <a:bodyPr rtlCol="0" anchor="ctr"/>
+          <a:lstStyle/>
+          <a:p>
+            <a:pPr algn="ctr"/>
+            <a:r>
+              <a:rPr lang="en-US" sz="2800" dirty="0" smtClean="0"/>
+              <a:t>Works!</a:t>
+            </a:r>
+            <a:endParaRPr lang="en-US" sz="2800" dirty="0"/>
+          </a:p>
+        </p:txBody>
+      </p:sp>
+      <p:sp>
+        <p:nvSpPr>
+          <p:cNvPr id="31" name="Rectangle 30"/>
+          <p:cNvSpPr/>
+          <p:nvPr/>
+        </p:nvSpPr>
+        <p:spPr>
+          <a:xfrm>
+            <a:off x="1842955" y="791833"/>
+            <a:ext cx="9276936" cy="967251"/>
+          </a:xfrm>
+          <a:prstGeom prst="rect">
+            <a:avLst/>
+          </a:prstGeom>
+          <a:solidFill>
+            <a:srgbClr val="FCF600">
+              <a:alpha val="29020"/>
+            </a:srgbClr>
+          </a:solidFill>
+          <a:ln w="28575">
+            <a:solidFill>
+              <a:schemeClr val="tx1"/>
+            </a:solidFill>
+          </a:ln>
+        </p:spPr>
+        <p:style>
+          <a:lnRef idx="2">
+            <a:schemeClr val="accent1">
+              <a:shade val="50000"/>
+            </a:schemeClr>
+          </a:lnRef>
+          <a:fillRef idx="1">
+            <a:schemeClr val="accent1"/>
+          </a:fillRef>
+          <a:effectRef idx="0">
+            <a:schemeClr val="accent1"/>
+          </a:effectRef>
+          <a:fontRef idx="minor">
+            <a:schemeClr val="lt1"/>
+          </a:fontRef>
+        </p:style>
+        <p:txBody>
+          <a:bodyPr rtlCol="0" anchor="ctr"/>
+          <a:lstStyle/>
+          <a:p>
+            <a:pPr algn="ctr"/>
+            <a:r>
+              <a:rPr lang="en-US" sz="2000" dirty="0" smtClean="0">
+                <a:solidFill>
+                  <a:sysClr val="windowText" lastClr="000000"/>
+                </a:solidFill>
+                <a:latin typeface="Calibri (Corps)"/>
+                <a:cs typeface="Segoe UI Light" panose="020B0502040204020203" pitchFamily="34" charset="0"/>
+              </a:rPr>
+              <a:t>JavaScript Conditions work with Booleans (true/false) OR with “falsy” / “truthy” values</a:t>
+            </a:r>
+            <a:endParaRPr lang="en-US" sz="2000" dirty="0">
+              <a:solidFill>
+                <a:sysClr val="windowText" lastClr="000000"/>
+              </a:solidFill>
+              <a:latin typeface="Calibri (Corps)"/>
+              <a:cs typeface="Segoe UI Light" panose="020B0502040204020203" pitchFamily="34" charset="0"/>
+            </a:endParaRPr>
+          </a:p>
+        </p:txBody>
+      </p:sp>
+      <p:grpSp>
+        <p:nvGrpSpPr>
+          <p:cNvPr id="37" name="Groupe 36"/>
+          <p:cNvGrpSpPr/>
+          <p:nvPr/>
+        </p:nvGrpSpPr>
+        <p:grpSpPr>
+          <a:xfrm>
+            <a:off x="884966" y="2733598"/>
+            <a:ext cx="4391822" cy="501633"/>
+            <a:chOff x="884966" y="2733598"/>
+            <a:chExt cx="4391822" cy="501633"/>
+          </a:xfrm>
+        </p:grpSpPr>
+        <p:sp>
+          <p:nvSpPr>
+            <p:cNvPr id="2" name="Rectangle 1"/>
+            <p:cNvSpPr/>
+            <p:nvPr/>
+          </p:nvSpPr>
+          <p:spPr>
+            <a:xfrm>
+              <a:off x="2172641" y="2733598"/>
+              <a:ext cx="3104147" cy="437706"/>
+            </a:xfrm>
+            <a:prstGeom prst="rect">
+              <a:avLst/>
+            </a:prstGeom>
+            <a:noFill/>
+            <a:ln w="57150">
+              <a:solidFill>
+                <a:schemeClr val="accent2"/>
+              </a:solidFill>
+            </a:ln>
+          </p:spPr>
+          <p:style>
+            <a:lnRef idx="2">
+              <a:schemeClr val="accent1">
+                <a:shade val="50000"/>
+              </a:schemeClr>
+            </a:lnRef>
+            <a:fillRef idx="1">
+              <a:schemeClr val="accent1"/>
+            </a:fillRef>
+            <a:effectRef idx="0">
+              <a:schemeClr val="accent1"/>
+            </a:effectRef>
+            <a:fontRef idx="minor">
+              <a:schemeClr val="lt1"/>
+            </a:fontRef>
+          </p:style>
+          <p:txBody>
+            <a:bodyPr rtlCol="0" anchor="ctr"/>
+            <a:lstStyle/>
+            <a:p>
+              <a:pPr algn="ctr"/>
+              <a:endParaRPr lang="en-US"/>
+            </a:p>
+          </p:txBody>
+        </p:sp>
+        <p:cxnSp>
+          <p:nvCxnSpPr>
+            <p:cNvPr id="6" name="Connecteur en angle 5"/>
+            <p:cNvCxnSpPr>
+              <a:stCxn id="2" idx="2"/>
+              <a:endCxn id="15" idx="2"/>
+            </p:cNvCxnSpPr>
+            <p:nvPr/>
+          </p:nvCxnSpPr>
+          <p:spPr>
+            <a:xfrm rot="5400000">
+              <a:off x="2272878" y="1783393"/>
+              <a:ext cx="63926" cy="2839749"/>
+            </a:xfrm>
+            <a:prstGeom prst="bentConnector3">
+              <a:avLst>
+                <a:gd name="adj1" fmla="val 457601"/>
+              </a:avLst>
+            </a:prstGeom>
+            <a:ln w="57150">
+              <a:solidFill>
+                <a:schemeClr val="accent2"/>
+              </a:solidFill>
+              <a:tailEnd type="triangle"/>
+            </a:ln>
+          </p:spPr>
+          <p:style>
+            <a:lnRef idx="1">
+              <a:schemeClr val="accent1"/>
+            </a:lnRef>
+            <a:fillRef idx="0">
+              <a:schemeClr val="accent1"/>
+            </a:fillRef>
+            <a:effectRef idx="0">
+              <a:schemeClr val="accent1"/>
+            </a:effectRef>
+            <a:fontRef idx="minor">
+              <a:schemeClr val="tx1"/>
+            </a:fontRef>
+          </p:style>
+        </p:cxnSp>
+      </p:grpSp>
+      <p:cxnSp>
+        <p:nvCxnSpPr>
+          <p:cNvPr id="41" name="Connecteur en angle 40"/>
+          <p:cNvCxnSpPr>
+            <a:stCxn id="45" idx="2"/>
+            <a:endCxn id="49" idx="2"/>
+          </p:cNvCxnSpPr>
+          <p:nvPr/>
+        </p:nvCxnSpPr>
+        <p:spPr>
+          <a:xfrm rot="5400000" flipH="1" flipV="1">
+            <a:off x="9616913" y="1568856"/>
+            <a:ext cx="1" cy="3332749"/>
+          </a:xfrm>
+          <a:prstGeom prst="bentConnector3">
+            <a:avLst>
+              <a:gd name="adj1" fmla="val -22860000000"/>
+            </a:avLst>
+          </a:prstGeom>
+          <a:ln w="57150">
+            <a:solidFill>
+              <a:schemeClr val="accent2"/>
+            </a:solidFill>
+            <a:tailEnd type="triangle"/>
+          </a:ln>
+        </p:spPr>
+        <p:style>
+          <a:lnRef idx="1">
+            <a:schemeClr val="accent1"/>
+          </a:lnRef>
+          <a:fillRef idx="0">
+            <a:schemeClr val="accent1"/>
+          </a:fillRef>
+          <a:effectRef idx="0">
+            <a:schemeClr val="accent1"/>
+          </a:effectRef>
+          <a:fontRef idx="minor">
+            <a:schemeClr val="tx1"/>
+          </a:fontRef>
+        </p:style>
+      </p:cxnSp>
+      <p:grpSp>
+        <p:nvGrpSpPr>
+          <p:cNvPr id="47" name="Groupe 46"/>
+          <p:cNvGrpSpPr/>
+          <p:nvPr/>
+        </p:nvGrpSpPr>
+        <p:grpSpPr>
+          <a:xfrm>
+            <a:off x="6250403" y="1893816"/>
+            <a:ext cx="4083777" cy="1679564"/>
+            <a:chOff x="6552139" y="1893817"/>
+            <a:chExt cx="4083777" cy="1679564"/>
+          </a:xfrm>
+        </p:grpSpPr>
+        <p:sp>
+          <p:nvSpPr>
+            <p:cNvPr id="28" name="Rectangle 27"/>
+            <p:cNvSpPr/>
+            <p:nvPr/>
+          </p:nvSpPr>
+          <p:spPr>
+            <a:xfrm>
+              <a:off x="6552139" y="1893817"/>
+              <a:ext cx="4083777" cy="1679564"/>
+            </a:xfrm>
+            <a:prstGeom prst="rect">
+              <a:avLst/>
+            </a:prstGeom>
+            <a:solidFill>
+              <a:srgbClr val="CC3399">
+                <a:alpha val="29020"/>
+              </a:srgbClr>
+            </a:solidFill>
+            <a:ln w="28575">
+              <a:solidFill>
+                <a:srgbClr val="660066"/>
+              </a:solidFill>
+            </a:ln>
+          </p:spPr>
+          <p:style>
+            <a:lnRef idx="2">
+              <a:schemeClr val="accent1">
+                <a:shade val="50000"/>
+              </a:schemeClr>
+            </a:lnRef>
+            <a:fillRef idx="1">
+              <a:schemeClr val="accent1"/>
+            </a:fillRef>
+            <a:effectRef idx="0">
+              <a:schemeClr val="accent1"/>
+            </a:effectRef>
+            <a:fontRef idx="minor">
+              <a:schemeClr val="lt1"/>
+            </a:fontRef>
+          </p:style>
+          <p:txBody>
+            <a:bodyPr rtlCol="0" anchor="ctr"/>
+            <a:lstStyle/>
+            <a:p>
+              <a:pPr algn="ctr"/>
+              <a:r>
+                <a:rPr lang="en-US" sz="2000" dirty="0" smtClean="0">
+                  <a:solidFill>
+                    <a:srgbClr val="660066"/>
+                  </a:solidFill>
+                  <a:latin typeface="Calibri (Corps)"/>
+                  <a:cs typeface="Segoe UI Light" panose="020B0502040204020203" pitchFamily="34" charset="0"/>
+                </a:rPr>
+                <a:t>const nameInupt = ‘Max’;</a:t>
+              </a:r>
+            </a:p>
+            <a:p>
+              <a:pPr algn="ctr"/>
+              <a:endParaRPr lang="en-US" sz="2000" dirty="0">
+                <a:solidFill>
+                  <a:srgbClr val="660066"/>
+                </a:solidFill>
+                <a:latin typeface="Calibri (Corps)"/>
+                <a:cs typeface="Segoe UI Light" panose="020B0502040204020203" pitchFamily="34" charset="0"/>
+              </a:endParaRPr>
+            </a:p>
+            <a:p>
+              <a:pPr algn="ctr"/>
+              <a:r>
+                <a:rPr lang="en-US" sz="2000" dirty="0" smtClean="0">
+                  <a:solidFill>
+                    <a:srgbClr val="660066"/>
+                  </a:solidFill>
+                  <a:latin typeface="Calibri (Corps)"/>
+                  <a:cs typeface="Segoe UI Light" panose="020B0502040204020203" pitchFamily="34" charset="0"/>
+                </a:rPr>
+                <a:t>If(</a:t>
+              </a:r>
+              <a:r>
+                <a:rPr lang="en-US" sz="2000" dirty="0" err="1" smtClean="0">
+                  <a:solidFill>
+                    <a:srgbClr val="660066"/>
+                  </a:solidFill>
+                  <a:latin typeface="Calibri (Corps)"/>
+                  <a:cs typeface="Segoe UI Light" panose="020B0502040204020203" pitchFamily="34" charset="0"/>
+                </a:rPr>
+                <a:t>nameInput</a:t>
+              </a:r>
+              <a:r>
+                <a:rPr lang="en-US" sz="2000" dirty="0" smtClean="0">
+                  <a:solidFill>
+                    <a:srgbClr val="660066"/>
+                  </a:solidFill>
+                  <a:latin typeface="Calibri (Corps)"/>
+                  <a:cs typeface="Segoe UI Light" panose="020B0502040204020203" pitchFamily="34" charset="0"/>
+                </a:rPr>
+                <a:t>) { … }</a:t>
+              </a:r>
+            </a:p>
+          </p:txBody>
+        </p:sp>
+        <p:sp>
+          <p:nvSpPr>
+            <p:cNvPr id="45" name="Rectangle 44"/>
+            <p:cNvSpPr/>
+            <p:nvPr/>
+          </p:nvSpPr>
+          <p:spPr>
+            <a:xfrm>
+              <a:off x="7414399" y="2797526"/>
+              <a:ext cx="1675754" cy="437706"/>
+            </a:xfrm>
+            <a:prstGeom prst="rect">
+              <a:avLst/>
+            </a:prstGeom>
+            <a:noFill/>
+            <a:ln w="57150">
+              <a:solidFill>
+                <a:schemeClr val="accent2"/>
+              </a:solidFill>
+            </a:ln>
+          </p:spPr>
+          <p:style>
+            <a:lnRef idx="2">
+              <a:schemeClr val="accent1">
+                <a:shade val="50000"/>
+              </a:schemeClr>
+            </a:lnRef>
+            <a:fillRef idx="1">
+              <a:schemeClr val="accent1"/>
+            </a:fillRef>
+            <a:effectRef idx="0">
+              <a:schemeClr val="accent1"/>
+            </a:effectRef>
+            <a:fontRef idx="minor">
+              <a:schemeClr val="lt1"/>
+            </a:fontRef>
+          </p:style>
+          <p:txBody>
+            <a:bodyPr rtlCol="0" anchor="ctr"/>
+            <a:lstStyle/>
+            <a:p>
+              <a:pPr algn="ctr"/>
+              <a:endParaRPr lang="en-US"/>
+            </a:p>
+          </p:txBody>
+        </p:sp>
+      </p:grpSp>
+      <p:sp>
+        <p:nvSpPr>
+          <p:cNvPr id="49" name="Rectangle 48"/>
+          <p:cNvSpPr/>
+          <p:nvPr/>
+        </p:nvSpPr>
+        <p:spPr>
+          <a:xfrm>
+            <a:off x="10448569" y="1893816"/>
+            <a:ext cx="1669439" cy="1341414"/>
+          </a:xfrm>
+          <a:prstGeom prst="rect">
+            <a:avLst/>
+          </a:prstGeom>
+          <a:solidFill>
+            <a:schemeClr val="accent2"/>
+          </a:solidFill>
+          <a:ln w="28575">
+            <a:solidFill>
+              <a:schemeClr val="tx1"/>
+            </a:solidFill>
+          </a:ln>
+        </p:spPr>
+        <p:style>
+          <a:lnRef idx="2">
+            <a:schemeClr val="accent1">
+              <a:shade val="50000"/>
+            </a:schemeClr>
+          </a:lnRef>
+          <a:fillRef idx="1">
+            <a:schemeClr val="accent1"/>
+          </a:fillRef>
+          <a:effectRef idx="0">
+            <a:schemeClr val="accent1"/>
+          </a:effectRef>
+          <a:fontRef idx="minor">
+            <a:schemeClr val="lt1"/>
+          </a:fontRef>
+        </p:style>
+        <p:txBody>
+          <a:bodyPr rtlCol="0" anchor="ctr"/>
+          <a:lstStyle/>
+          <a:p>
+            <a:pPr algn="ctr"/>
+            <a:r>
+              <a:rPr lang="en-US" sz="2000" dirty="0" smtClean="0"/>
+              <a:t>Yields a string, NOT a </a:t>
+            </a:r>
+            <a:r>
+              <a:rPr lang="en-US" sz="2000" dirty="0" err="1" smtClean="0"/>
+              <a:t>boolean</a:t>
+            </a:r>
+            <a:endParaRPr lang="en-US" sz="2000" dirty="0"/>
+          </a:p>
+        </p:txBody>
+      </p:sp>
+      <p:sp>
+        <p:nvSpPr>
+          <p:cNvPr id="51" name="Rectangle 50"/>
+          <p:cNvSpPr/>
+          <p:nvPr/>
+        </p:nvSpPr>
+        <p:spPr>
+          <a:xfrm>
+            <a:off x="6250403" y="5466936"/>
+            <a:ext cx="4083777" cy="884166"/>
+          </a:xfrm>
+          <a:prstGeom prst="rect">
+            <a:avLst/>
+          </a:prstGeom>
+          <a:solidFill>
+            <a:schemeClr val="accent2"/>
+          </a:solidFill>
+          <a:ln w="28575">
+            <a:solidFill>
+              <a:schemeClr val="tx1"/>
+            </a:solidFill>
+          </a:ln>
+        </p:spPr>
+        <p:style>
+          <a:lnRef idx="2">
+            <a:schemeClr val="accent1">
+              <a:shade val="50000"/>
+            </a:schemeClr>
+          </a:lnRef>
+          <a:fillRef idx="1">
+            <a:schemeClr val="accent1"/>
+          </a:fillRef>
+          <a:effectRef idx="0">
+            <a:schemeClr val="accent1"/>
+          </a:effectRef>
+          <a:fontRef idx="minor">
+            <a:schemeClr val="lt1"/>
+          </a:fontRef>
+        </p:style>
+        <p:txBody>
+          <a:bodyPr rtlCol="0" anchor="ctr"/>
+          <a:lstStyle/>
+          <a:p>
+            <a:pPr algn="ctr"/>
+            <a:r>
+              <a:rPr lang="en-US" sz="2800" dirty="0" smtClean="0"/>
+              <a:t>Works!</a:t>
+            </a:r>
+            <a:endParaRPr lang="en-US" sz="2800" dirty="0"/>
+          </a:p>
+        </p:txBody>
+      </p:sp>
+      <p:sp>
+        <p:nvSpPr>
+          <p:cNvPr id="52" name="Flèche vers le haut 51"/>
+          <p:cNvSpPr/>
+          <p:nvPr/>
+        </p:nvSpPr>
+        <p:spPr>
+          <a:xfrm rot="10800000">
+            <a:off x="7849540" y="3708112"/>
+            <a:ext cx="885501" cy="1679565"/>
+          </a:xfrm>
+          <a:prstGeom prst="upArrow">
+            <a:avLst/>
+          </a:prstGeom>
+          <a:solidFill>
+            <a:schemeClr val="accent2"/>
+          </a:solidFill>
+          <a:ln w="28575">
+            <a:solidFill>
+              <a:schemeClr val="tx1"/>
+            </a:solidFill>
+          </a:ln>
+        </p:spPr>
+        <p:style>
+          <a:lnRef idx="2">
+            <a:schemeClr val="accent1">
+              <a:shade val="50000"/>
+            </a:schemeClr>
+          </a:lnRef>
+          <a:fillRef idx="1">
+            <a:schemeClr val="accent1"/>
+          </a:fillRef>
+          <a:effectRef idx="0">
+            <a:schemeClr val="accent1"/>
+          </a:effectRef>
+          <a:fontRef idx="minor">
+            <a:schemeClr val="lt1"/>
+          </a:fontRef>
+        </p:style>
+        <p:txBody>
+          <a:bodyPr rtlCol="0" anchor="ctr"/>
+          <a:lstStyle/>
+          <a:p>
+            <a:pPr algn="ctr"/>
+            <a:r>
+              <a:rPr lang="en-US" sz="2800" dirty="0" smtClean="0"/>
+              <a:t> </a:t>
+            </a:r>
+            <a:endParaRPr lang="en-US" sz="2800" dirty="0"/>
+          </a:p>
+        </p:txBody>
+      </p:sp>
+      <p:sp>
+        <p:nvSpPr>
+          <p:cNvPr id="57" name="Rectangle 56"/>
+          <p:cNvSpPr/>
+          <p:nvPr/>
+        </p:nvSpPr>
+        <p:spPr>
+          <a:xfrm>
+            <a:off x="6012779" y="3871510"/>
+            <a:ext cx="4559022" cy="959145"/>
+          </a:xfrm>
+          <a:prstGeom prst="rect">
+            <a:avLst/>
+          </a:prstGeom>
+          <a:solidFill>
+            <a:srgbClr val="FCF600"/>
+          </a:solidFill>
+          <a:ln w="28575">
+            <a:solidFill>
+              <a:schemeClr val="tx1"/>
+            </a:solidFill>
+          </a:ln>
+        </p:spPr>
+        <p:style>
+          <a:lnRef idx="2">
+            <a:schemeClr val="accent1">
+              <a:shade val="50000"/>
+            </a:schemeClr>
+          </a:lnRef>
+          <a:fillRef idx="1">
+            <a:schemeClr val="accent1"/>
+          </a:fillRef>
+          <a:effectRef idx="0">
+            <a:schemeClr val="accent1"/>
+          </a:effectRef>
+          <a:fontRef idx="minor">
+            <a:schemeClr val="lt1"/>
+          </a:fontRef>
+        </p:style>
+        <p:txBody>
+          <a:bodyPr rtlCol="0" anchor="ctr"/>
+          <a:lstStyle/>
+          <a:p>
+            <a:pPr algn="ctr"/>
+            <a:r>
+              <a:rPr lang="en-US" sz="2000" dirty="0" smtClean="0">
+                <a:solidFill>
+                  <a:sysClr val="windowText" lastClr="000000"/>
+                </a:solidFill>
+                <a:latin typeface="Calibri (Corps)"/>
+                <a:cs typeface="Segoe UI Light" panose="020B0502040204020203" pitchFamily="34" charset="0"/>
+              </a:rPr>
+              <a:t>JavaScript tires to coerce values to a Boolean value if a Boolean is required!</a:t>
+            </a:r>
+            <a:endParaRPr lang="en-US" sz="2000" dirty="0">
+              <a:solidFill>
+                <a:sysClr val="windowText" lastClr="000000"/>
+              </a:solidFill>
+              <a:latin typeface="Calibri (Corps)"/>
+              <a:cs typeface="Segoe UI Light" panose="020B0502040204020203" pitchFamily="34" charset="0"/>
+            </a:endParaRPr>
+          </a:p>
+        </p:txBody>
+      </p:sp>
     </p:spTree>
     <p:extLst>
       <p:ext uri="{BB962C8B-B14F-4D97-AF65-F5344CB8AC3E}">
         <p14:creationId xmlns:p14="http://schemas.microsoft.com/office/powerpoint/2010/main" val="954540010"/>
+      </p:ext>
+    </p:extLst>
+  </p:cSld>
+  <p:clrMapOvr>
+    <a:masterClrMapping/>
+  </p:clrMapOvr>
+</p:sld>
+</file>
+
+<file path=ppt/slides/slide8.xml><?xml version="1.0" encoding="utf-8"?>
+<p:sld xmlns:a="http://schemas.openxmlformats.org/drawingml/2006/main" xmlns:r="http://schemas.openxmlformats.org/officeDocument/2006/relationships" xmlns:p="http://schemas.openxmlformats.org/presentationml/2006/main">
+  <p:cSld>
+    <p:spTree>
+      <p:nvGrpSpPr>
+        <p:cNvPr id="1" name=""/>
+        <p:cNvGrpSpPr/>
+        <p:nvPr/>
+      </p:nvGrpSpPr>
+      <p:grpSpPr>
+        <a:xfrm>
+          <a:off x="0" y="0"/>
+          <a:ext cx="0" cy="0"/>
+          <a:chOff x="0" y="0"/>
+          <a:chExt cx="0" cy="0"/>
+        </a:xfrm>
+      </p:grpSpPr>
+      <p:sp>
+        <p:nvSpPr>
+          <p:cNvPr id="4" name="ZoneTexte 3"/>
+          <p:cNvSpPr txBox="1"/>
+          <p:nvPr/>
+        </p:nvSpPr>
+        <p:spPr>
+          <a:xfrm>
+            <a:off x="489527" y="193964"/>
+            <a:ext cx="6007526" cy="523220"/>
+          </a:xfrm>
+          <a:prstGeom prst="rect">
+            <a:avLst/>
+          </a:prstGeom>
+          <a:noFill/>
+        </p:spPr>
+        <p:txBody>
+          <a:bodyPr wrap="square" rtlCol="0">
+            <a:spAutoFit/>
+          </a:bodyPr>
+          <a:lstStyle/>
+          <a:p>
+            <a:r>
+              <a:rPr lang="en-US" sz="2800" b="1" dirty="0" smtClean="0">
+                <a:ea typeface="Segoe UI Black" panose="020B0A02040204020203" pitchFamily="34" charset="0"/>
+                <a:cs typeface="Segoe UI Semibold" panose="020B0702040204020203" pitchFamily="34" charset="0"/>
+              </a:rPr>
+              <a:t>Falsy and Truthy Values</a:t>
+            </a:r>
+            <a:endParaRPr lang="en-US" sz="2800" b="1" dirty="0" smtClean="0">
+              <a:ea typeface="Segoe UI Black" panose="020B0A02040204020203" pitchFamily="34" charset="0"/>
+              <a:cs typeface="Segoe UI Semibold" panose="020B0702040204020203" pitchFamily="34" charset="0"/>
+            </a:endParaRPr>
+          </a:p>
+        </p:txBody>
+      </p:sp>
+      <p:sp>
+        <p:nvSpPr>
+          <p:cNvPr id="8" name="Rectangle 7"/>
+          <p:cNvSpPr/>
+          <p:nvPr/>
+        </p:nvSpPr>
+        <p:spPr>
+          <a:xfrm>
+            <a:off x="489527" y="1620984"/>
+            <a:ext cx="5502199" cy="689080"/>
+          </a:xfrm>
+          <a:prstGeom prst="rect">
+            <a:avLst/>
+          </a:prstGeom>
+          <a:solidFill>
+            <a:srgbClr val="660066"/>
+          </a:solidFill>
+          <a:ln>
+            <a:noFill/>
+          </a:ln>
+        </p:spPr>
+        <p:style>
+          <a:lnRef idx="2">
+            <a:schemeClr val="accent1">
+              <a:shade val="50000"/>
+            </a:schemeClr>
+          </a:lnRef>
+          <a:fillRef idx="1">
+            <a:schemeClr val="accent1"/>
+          </a:fillRef>
+          <a:effectRef idx="0">
+            <a:schemeClr val="accent1"/>
+          </a:effectRef>
+          <a:fontRef idx="minor">
+            <a:schemeClr val="lt1"/>
+          </a:fontRef>
+        </p:style>
+        <p:txBody>
+          <a:bodyPr rtlCol="0" anchor="ctr"/>
+          <a:lstStyle/>
+          <a:p>
+            <a:pPr algn="ctr"/>
+            <a:r>
+              <a:rPr lang="en-US" sz="2000" b="1" dirty="0" smtClean="0">
+                <a:latin typeface="Calibri (Corps)"/>
+                <a:cs typeface="Segoe UI Light" panose="020B0502040204020203" pitchFamily="34" charset="0"/>
+              </a:rPr>
+              <a:t>0</a:t>
+            </a:r>
+            <a:endParaRPr lang="en-US" sz="2000" b="1" dirty="0">
+              <a:latin typeface="Calibri (Corps)"/>
+              <a:cs typeface="Segoe UI Light" panose="020B0502040204020203" pitchFamily="34" charset="0"/>
+            </a:endParaRPr>
+          </a:p>
+        </p:txBody>
+      </p:sp>
+      <p:sp>
+        <p:nvSpPr>
+          <p:cNvPr id="19" name="Flèche droite 18"/>
+          <p:cNvSpPr/>
+          <p:nvPr/>
+        </p:nvSpPr>
+        <p:spPr>
+          <a:xfrm>
+            <a:off x="6497052" y="2460252"/>
+            <a:ext cx="1171379" cy="689080"/>
+          </a:xfrm>
+          <a:prstGeom prst="rightArrow">
+            <a:avLst/>
+          </a:prstGeom>
+          <a:solidFill>
+            <a:schemeClr val="accent2"/>
+          </a:solidFill>
+          <a:ln w="28575">
+            <a:solidFill>
+              <a:schemeClr val="tx1"/>
+            </a:solidFill>
+          </a:ln>
+        </p:spPr>
+        <p:style>
+          <a:lnRef idx="2">
+            <a:schemeClr val="accent1">
+              <a:shade val="50000"/>
+            </a:schemeClr>
+          </a:lnRef>
+          <a:fillRef idx="1">
+            <a:schemeClr val="accent1"/>
+          </a:fillRef>
+          <a:effectRef idx="0">
+            <a:schemeClr val="accent1"/>
+          </a:effectRef>
+          <a:fontRef idx="minor">
+            <a:schemeClr val="lt1"/>
+          </a:fontRef>
+        </p:style>
+        <p:txBody>
+          <a:bodyPr rtlCol="0" anchor="ctr"/>
+          <a:lstStyle/>
+          <a:p>
+            <a:pPr algn="ctr"/>
+            <a:endParaRPr lang="en-US" b="1" dirty="0"/>
+          </a:p>
+        </p:txBody>
+      </p:sp>
+      <p:sp>
+        <p:nvSpPr>
+          <p:cNvPr id="15" name="Rectangle 14"/>
+          <p:cNvSpPr/>
+          <p:nvPr/>
+        </p:nvSpPr>
+        <p:spPr>
+          <a:xfrm>
+            <a:off x="489527" y="2460252"/>
+            <a:ext cx="5502199" cy="689080"/>
+          </a:xfrm>
+          <a:prstGeom prst="rect">
+            <a:avLst/>
+          </a:prstGeom>
+          <a:solidFill>
+            <a:srgbClr val="660066"/>
+          </a:solidFill>
+          <a:ln>
+            <a:noFill/>
+          </a:ln>
+        </p:spPr>
+        <p:style>
+          <a:lnRef idx="2">
+            <a:schemeClr val="accent1">
+              <a:shade val="50000"/>
+            </a:schemeClr>
+          </a:lnRef>
+          <a:fillRef idx="1">
+            <a:schemeClr val="accent1"/>
+          </a:fillRef>
+          <a:effectRef idx="0">
+            <a:schemeClr val="accent1"/>
+          </a:effectRef>
+          <a:fontRef idx="minor">
+            <a:schemeClr val="lt1"/>
+          </a:fontRef>
+        </p:style>
+        <p:txBody>
+          <a:bodyPr rtlCol="0" anchor="ctr"/>
+          <a:lstStyle/>
+          <a:p>
+            <a:pPr algn="ctr"/>
+            <a:r>
+              <a:rPr lang="en-US" sz="2000" b="1" dirty="0" smtClean="0">
+                <a:latin typeface="Calibri (Corps)"/>
+                <a:cs typeface="Segoe UI Light" panose="020B0502040204020203" pitchFamily="34" charset="0"/>
+              </a:rPr>
+              <a:t>ANY other number (incl. negative numbers)</a:t>
+            </a:r>
+            <a:endParaRPr lang="en-US" sz="2000" b="1" dirty="0">
+              <a:latin typeface="Calibri (Corps)"/>
+              <a:cs typeface="Segoe UI Light" panose="020B0502040204020203" pitchFamily="34" charset="0"/>
+            </a:endParaRPr>
+          </a:p>
+        </p:txBody>
+      </p:sp>
+      <p:sp>
+        <p:nvSpPr>
+          <p:cNvPr id="16" name="Flèche droite 15"/>
+          <p:cNvSpPr/>
+          <p:nvPr/>
+        </p:nvSpPr>
+        <p:spPr>
+          <a:xfrm>
+            <a:off x="6497053" y="1620984"/>
+            <a:ext cx="1171379" cy="689080"/>
+          </a:xfrm>
+          <a:prstGeom prst="rightArrow">
+            <a:avLst/>
+          </a:prstGeom>
+          <a:solidFill>
+            <a:schemeClr val="accent2"/>
+          </a:solidFill>
+          <a:ln w="28575">
+            <a:solidFill>
+              <a:schemeClr val="tx1"/>
+            </a:solidFill>
+          </a:ln>
+        </p:spPr>
+        <p:style>
+          <a:lnRef idx="2">
+            <a:schemeClr val="accent1">
+              <a:shade val="50000"/>
+            </a:schemeClr>
+          </a:lnRef>
+          <a:fillRef idx="1">
+            <a:schemeClr val="accent1"/>
+          </a:fillRef>
+          <a:effectRef idx="0">
+            <a:schemeClr val="accent1"/>
+          </a:effectRef>
+          <a:fontRef idx="minor">
+            <a:schemeClr val="lt1"/>
+          </a:fontRef>
+        </p:style>
+        <p:txBody>
+          <a:bodyPr rtlCol="0" anchor="ctr"/>
+          <a:lstStyle/>
+          <a:p>
+            <a:pPr algn="ctr"/>
+            <a:endParaRPr lang="en-US" b="1" dirty="0"/>
+          </a:p>
+        </p:txBody>
+      </p:sp>
+      <p:sp>
+        <p:nvSpPr>
+          <p:cNvPr id="17" name="Rectangle 16"/>
+          <p:cNvSpPr/>
+          <p:nvPr/>
+        </p:nvSpPr>
+        <p:spPr>
+          <a:xfrm>
+            <a:off x="8173759" y="1620984"/>
+            <a:ext cx="2871294" cy="689080"/>
+          </a:xfrm>
+          <a:prstGeom prst="rect">
+            <a:avLst/>
+          </a:prstGeom>
+          <a:solidFill>
+            <a:schemeClr val="accent2">
+              <a:lumMod val="50000"/>
+            </a:schemeClr>
+          </a:solidFill>
+          <a:ln>
+            <a:solidFill>
+              <a:schemeClr val="tx1"/>
+            </a:solidFill>
+          </a:ln>
+        </p:spPr>
+        <p:style>
+          <a:lnRef idx="2">
+            <a:schemeClr val="accent1">
+              <a:shade val="50000"/>
+            </a:schemeClr>
+          </a:lnRef>
+          <a:fillRef idx="1">
+            <a:schemeClr val="accent1"/>
+          </a:fillRef>
+          <a:effectRef idx="0">
+            <a:schemeClr val="accent1"/>
+          </a:effectRef>
+          <a:fontRef idx="minor">
+            <a:schemeClr val="lt1"/>
+          </a:fontRef>
+        </p:style>
+        <p:txBody>
+          <a:bodyPr rtlCol="0" anchor="ctr"/>
+          <a:lstStyle/>
+          <a:p>
+            <a:pPr algn="ctr"/>
+            <a:r>
+              <a:rPr lang="en-US" sz="2000" dirty="0" smtClean="0">
+                <a:latin typeface="Calibri (Corps)"/>
+                <a:cs typeface="Segoe UI Light" panose="020B0502040204020203" pitchFamily="34" charset="0"/>
+              </a:rPr>
+              <a:t>false</a:t>
+            </a:r>
+            <a:endParaRPr lang="en-US" sz="2000" dirty="0">
+              <a:latin typeface="Calibri (Corps)"/>
+              <a:cs typeface="Segoe UI Light" panose="020B0502040204020203" pitchFamily="34" charset="0"/>
+            </a:endParaRPr>
+          </a:p>
+        </p:txBody>
+      </p:sp>
+      <p:sp>
+        <p:nvSpPr>
+          <p:cNvPr id="18" name="Rectangle 17"/>
+          <p:cNvSpPr/>
+          <p:nvPr/>
+        </p:nvSpPr>
+        <p:spPr>
+          <a:xfrm>
+            <a:off x="8173759" y="2460252"/>
+            <a:ext cx="2871294" cy="689080"/>
+          </a:xfrm>
+          <a:prstGeom prst="rect">
+            <a:avLst/>
+          </a:prstGeom>
+          <a:solidFill>
+            <a:schemeClr val="accent6"/>
+          </a:solidFill>
+          <a:ln>
+            <a:solidFill>
+              <a:schemeClr val="tx1"/>
+            </a:solidFill>
+          </a:ln>
+        </p:spPr>
+        <p:style>
+          <a:lnRef idx="2">
+            <a:schemeClr val="accent1">
+              <a:shade val="50000"/>
+            </a:schemeClr>
+          </a:lnRef>
+          <a:fillRef idx="1">
+            <a:schemeClr val="accent1"/>
+          </a:fillRef>
+          <a:effectRef idx="0">
+            <a:schemeClr val="accent1"/>
+          </a:effectRef>
+          <a:fontRef idx="minor">
+            <a:schemeClr val="lt1"/>
+          </a:fontRef>
+        </p:style>
+        <p:txBody>
+          <a:bodyPr rtlCol="0" anchor="ctr"/>
+          <a:lstStyle/>
+          <a:p>
+            <a:pPr algn="ctr"/>
+            <a:r>
+              <a:rPr lang="en-US" sz="2000" dirty="0" smtClean="0">
+                <a:latin typeface="Calibri (Corps)"/>
+                <a:cs typeface="Segoe UI Light" panose="020B0502040204020203" pitchFamily="34" charset="0"/>
+              </a:rPr>
+              <a:t>true</a:t>
+            </a:r>
+            <a:endParaRPr lang="en-US" sz="2000" dirty="0">
+              <a:latin typeface="Calibri (Corps)"/>
+              <a:cs typeface="Segoe UI Light" panose="020B0502040204020203" pitchFamily="34" charset="0"/>
+            </a:endParaRPr>
+          </a:p>
+        </p:txBody>
+      </p:sp>
+      <p:sp>
+        <p:nvSpPr>
+          <p:cNvPr id="20" name="Rectangle 19"/>
+          <p:cNvSpPr/>
+          <p:nvPr/>
+        </p:nvSpPr>
+        <p:spPr>
+          <a:xfrm>
+            <a:off x="489527" y="3299520"/>
+            <a:ext cx="5502199" cy="689080"/>
+          </a:xfrm>
+          <a:prstGeom prst="rect">
+            <a:avLst/>
+          </a:prstGeom>
+          <a:solidFill>
+            <a:srgbClr val="660066"/>
+          </a:solidFill>
+          <a:ln>
+            <a:noFill/>
+          </a:ln>
+        </p:spPr>
+        <p:style>
+          <a:lnRef idx="2">
+            <a:schemeClr val="accent1">
+              <a:shade val="50000"/>
+            </a:schemeClr>
+          </a:lnRef>
+          <a:fillRef idx="1">
+            <a:schemeClr val="accent1"/>
+          </a:fillRef>
+          <a:effectRef idx="0">
+            <a:schemeClr val="accent1"/>
+          </a:effectRef>
+          <a:fontRef idx="minor">
+            <a:schemeClr val="lt1"/>
+          </a:fontRef>
+        </p:style>
+        <p:txBody>
+          <a:bodyPr rtlCol="0" anchor="ctr"/>
+          <a:lstStyle/>
+          <a:p>
+            <a:pPr algn="ctr"/>
+            <a:r>
+              <a:rPr lang="en-US" sz="2000" b="1" dirty="0" smtClean="0">
+                <a:latin typeface="Calibri (Corps)"/>
+                <a:cs typeface="Segoe UI Light" panose="020B0502040204020203" pitchFamily="34" charset="0"/>
+              </a:rPr>
+              <a:t>“” (empty string)</a:t>
+            </a:r>
+            <a:endParaRPr lang="en-US" sz="2000" b="1" dirty="0">
+              <a:latin typeface="Calibri (Corps)"/>
+              <a:cs typeface="Segoe UI Light" panose="020B0502040204020203" pitchFamily="34" charset="0"/>
+            </a:endParaRPr>
+          </a:p>
+        </p:txBody>
+      </p:sp>
+      <p:sp>
+        <p:nvSpPr>
+          <p:cNvPr id="21" name="Flèche droite 20"/>
+          <p:cNvSpPr/>
+          <p:nvPr/>
+        </p:nvSpPr>
+        <p:spPr>
+          <a:xfrm>
+            <a:off x="6497053" y="3299520"/>
+            <a:ext cx="1171379" cy="689080"/>
+          </a:xfrm>
+          <a:prstGeom prst="rightArrow">
+            <a:avLst/>
+          </a:prstGeom>
+          <a:solidFill>
+            <a:schemeClr val="accent2"/>
+          </a:solidFill>
+          <a:ln w="28575">
+            <a:solidFill>
+              <a:schemeClr val="tx1"/>
+            </a:solidFill>
+          </a:ln>
+        </p:spPr>
+        <p:style>
+          <a:lnRef idx="2">
+            <a:schemeClr val="accent1">
+              <a:shade val="50000"/>
+            </a:schemeClr>
+          </a:lnRef>
+          <a:fillRef idx="1">
+            <a:schemeClr val="accent1"/>
+          </a:fillRef>
+          <a:effectRef idx="0">
+            <a:schemeClr val="accent1"/>
+          </a:effectRef>
+          <a:fontRef idx="minor">
+            <a:schemeClr val="lt1"/>
+          </a:fontRef>
+        </p:style>
+        <p:txBody>
+          <a:bodyPr rtlCol="0" anchor="ctr"/>
+          <a:lstStyle/>
+          <a:p>
+            <a:pPr algn="ctr"/>
+            <a:endParaRPr lang="en-US" b="1" dirty="0"/>
+          </a:p>
+        </p:txBody>
+      </p:sp>
+      <p:sp>
+        <p:nvSpPr>
+          <p:cNvPr id="22" name="Rectangle 21"/>
+          <p:cNvSpPr/>
+          <p:nvPr/>
+        </p:nvSpPr>
+        <p:spPr>
+          <a:xfrm>
+            <a:off x="8173759" y="5817324"/>
+            <a:ext cx="2871294" cy="689080"/>
+          </a:xfrm>
+          <a:prstGeom prst="rect">
+            <a:avLst/>
+          </a:prstGeom>
+          <a:solidFill>
+            <a:schemeClr val="accent2">
+              <a:lumMod val="50000"/>
+            </a:schemeClr>
+          </a:solidFill>
+          <a:ln>
+            <a:solidFill>
+              <a:schemeClr val="tx1"/>
+            </a:solidFill>
+          </a:ln>
+        </p:spPr>
+        <p:style>
+          <a:lnRef idx="2">
+            <a:schemeClr val="accent1">
+              <a:shade val="50000"/>
+            </a:schemeClr>
+          </a:lnRef>
+          <a:fillRef idx="1">
+            <a:schemeClr val="accent1"/>
+          </a:fillRef>
+          <a:effectRef idx="0">
+            <a:schemeClr val="accent1"/>
+          </a:effectRef>
+          <a:fontRef idx="minor">
+            <a:schemeClr val="lt1"/>
+          </a:fontRef>
+        </p:style>
+        <p:txBody>
+          <a:bodyPr rtlCol="0" anchor="ctr"/>
+          <a:lstStyle/>
+          <a:p>
+            <a:pPr algn="ctr"/>
+            <a:r>
+              <a:rPr lang="en-US" sz="2000" dirty="0" smtClean="0">
+                <a:latin typeface="Calibri (Corps)"/>
+                <a:cs typeface="Segoe UI Light" panose="020B0502040204020203" pitchFamily="34" charset="0"/>
+              </a:rPr>
+              <a:t>false</a:t>
+            </a:r>
+            <a:endParaRPr lang="en-US" sz="2000" dirty="0">
+              <a:latin typeface="Calibri (Corps)"/>
+              <a:cs typeface="Segoe UI Light" panose="020B0502040204020203" pitchFamily="34" charset="0"/>
+            </a:endParaRPr>
+          </a:p>
+        </p:txBody>
+      </p:sp>
+      <p:sp>
+        <p:nvSpPr>
+          <p:cNvPr id="23" name="Flèche droite 22"/>
+          <p:cNvSpPr/>
+          <p:nvPr/>
+        </p:nvSpPr>
+        <p:spPr>
+          <a:xfrm>
+            <a:off x="6497052" y="4138788"/>
+            <a:ext cx="1171379" cy="689080"/>
+          </a:xfrm>
+          <a:prstGeom prst="rightArrow">
+            <a:avLst/>
+          </a:prstGeom>
+          <a:solidFill>
+            <a:schemeClr val="accent2"/>
+          </a:solidFill>
+          <a:ln w="28575">
+            <a:solidFill>
+              <a:schemeClr val="tx1"/>
+            </a:solidFill>
+          </a:ln>
+        </p:spPr>
+        <p:style>
+          <a:lnRef idx="2">
+            <a:schemeClr val="accent1">
+              <a:shade val="50000"/>
+            </a:schemeClr>
+          </a:lnRef>
+          <a:fillRef idx="1">
+            <a:schemeClr val="accent1"/>
+          </a:fillRef>
+          <a:effectRef idx="0">
+            <a:schemeClr val="accent1"/>
+          </a:effectRef>
+          <a:fontRef idx="minor">
+            <a:schemeClr val="lt1"/>
+          </a:fontRef>
+        </p:style>
+        <p:txBody>
+          <a:bodyPr rtlCol="0" anchor="ctr"/>
+          <a:lstStyle/>
+          <a:p>
+            <a:pPr algn="ctr"/>
+            <a:endParaRPr lang="en-US" b="1" dirty="0"/>
+          </a:p>
+        </p:txBody>
+      </p:sp>
+      <p:sp>
+        <p:nvSpPr>
+          <p:cNvPr id="24" name="Rectangle 23"/>
+          <p:cNvSpPr/>
+          <p:nvPr/>
+        </p:nvSpPr>
+        <p:spPr>
+          <a:xfrm>
+            <a:off x="489527" y="4138788"/>
+            <a:ext cx="5502199" cy="689080"/>
+          </a:xfrm>
+          <a:prstGeom prst="rect">
+            <a:avLst/>
+          </a:prstGeom>
+          <a:solidFill>
+            <a:srgbClr val="660066"/>
+          </a:solidFill>
+          <a:ln>
+            <a:noFill/>
+          </a:ln>
+        </p:spPr>
+        <p:style>
+          <a:lnRef idx="2">
+            <a:schemeClr val="accent1">
+              <a:shade val="50000"/>
+            </a:schemeClr>
+          </a:lnRef>
+          <a:fillRef idx="1">
+            <a:schemeClr val="accent1"/>
+          </a:fillRef>
+          <a:effectRef idx="0">
+            <a:schemeClr val="accent1"/>
+          </a:effectRef>
+          <a:fontRef idx="minor">
+            <a:schemeClr val="lt1"/>
+          </a:fontRef>
+        </p:style>
+        <p:txBody>
+          <a:bodyPr rtlCol="0" anchor="ctr"/>
+          <a:lstStyle/>
+          <a:p>
+            <a:pPr algn="ctr"/>
+            <a:r>
+              <a:rPr lang="en-US" sz="2000" b="1" dirty="0" smtClean="0">
+                <a:latin typeface="Calibri (Corps)"/>
+                <a:cs typeface="Segoe UI Light" panose="020B0502040204020203" pitchFamily="34" charset="0"/>
+              </a:rPr>
+              <a:t>ANY other non-empty string (incl. “false”)</a:t>
+            </a:r>
+            <a:endParaRPr lang="en-US" sz="2000" b="1" dirty="0">
+              <a:latin typeface="Calibri (Corps)"/>
+              <a:cs typeface="Segoe UI Light" panose="020B0502040204020203" pitchFamily="34" charset="0"/>
+            </a:endParaRPr>
+          </a:p>
+        </p:txBody>
+      </p:sp>
+      <p:sp>
+        <p:nvSpPr>
+          <p:cNvPr id="25" name="Rectangle 24"/>
+          <p:cNvSpPr/>
+          <p:nvPr/>
+        </p:nvSpPr>
+        <p:spPr>
+          <a:xfrm>
+            <a:off x="8173759" y="4138788"/>
+            <a:ext cx="2871294" cy="689080"/>
+          </a:xfrm>
+          <a:prstGeom prst="rect">
+            <a:avLst/>
+          </a:prstGeom>
+          <a:solidFill>
+            <a:schemeClr val="accent6"/>
+          </a:solidFill>
+          <a:ln>
+            <a:solidFill>
+              <a:schemeClr val="tx1"/>
+            </a:solidFill>
+          </a:ln>
+        </p:spPr>
+        <p:style>
+          <a:lnRef idx="2">
+            <a:schemeClr val="accent1">
+              <a:shade val="50000"/>
+            </a:schemeClr>
+          </a:lnRef>
+          <a:fillRef idx="1">
+            <a:schemeClr val="accent1"/>
+          </a:fillRef>
+          <a:effectRef idx="0">
+            <a:schemeClr val="accent1"/>
+          </a:effectRef>
+          <a:fontRef idx="minor">
+            <a:schemeClr val="lt1"/>
+          </a:fontRef>
+        </p:style>
+        <p:txBody>
+          <a:bodyPr rtlCol="0" anchor="ctr"/>
+          <a:lstStyle/>
+          <a:p>
+            <a:pPr algn="ctr"/>
+            <a:r>
+              <a:rPr lang="en-US" sz="2000" dirty="0" smtClean="0">
+                <a:latin typeface="Calibri (Corps)"/>
+                <a:cs typeface="Segoe UI Light" panose="020B0502040204020203" pitchFamily="34" charset="0"/>
+              </a:rPr>
+              <a:t>true</a:t>
+            </a:r>
+            <a:endParaRPr lang="en-US" sz="2000" dirty="0">
+              <a:latin typeface="Calibri (Corps)"/>
+              <a:cs typeface="Segoe UI Light" panose="020B0502040204020203" pitchFamily="34" charset="0"/>
+            </a:endParaRPr>
+          </a:p>
+        </p:txBody>
+      </p:sp>
+      <p:sp>
+        <p:nvSpPr>
+          <p:cNvPr id="26" name="Flèche droite 25"/>
+          <p:cNvSpPr/>
+          <p:nvPr/>
+        </p:nvSpPr>
+        <p:spPr>
+          <a:xfrm>
+            <a:off x="6497052" y="4978056"/>
+            <a:ext cx="1171379" cy="689080"/>
+          </a:xfrm>
+          <a:prstGeom prst="rightArrow">
+            <a:avLst/>
+          </a:prstGeom>
+          <a:solidFill>
+            <a:schemeClr val="accent2"/>
+          </a:solidFill>
+          <a:ln w="28575">
+            <a:solidFill>
+              <a:schemeClr val="tx1"/>
+            </a:solidFill>
+          </a:ln>
+        </p:spPr>
+        <p:style>
+          <a:lnRef idx="2">
+            <a:schemeClr val="accent1">
+              <a:shade val="50000"/>
+            </a:schemeClr>
+          </a:lnRef>
+          <a:fillRef idx="1">
+            <a:schemeClr val="accent1"/>
+          </a:fillRef>
+          <a:effectRef idx="0">
+            <a:schemeClr val="accent1"/>
+          </a:effectRef>
+          <a:fontRef idx="minor">
+            <a:schemeClr val="lt1"/>
+          </a:fontRef>
+        </p:style>
+        <p:txBody>
+          <a:bodyPr rtlCol="0" anchor="ctr"/>
+          <a:lstStyle/>
+          <a:p>
+            <a:pPr algn="ctr"/>
+            <a:endParaRPr lang="en-US" b="1" dirty="0"/>
+          </a:p>
+        </p:txBody>
+      </p:sp>
+      <p:sp>
+        <p:nvSpPr>
+          <p:cNvPr id="27" name="Rectangle 26"/>
+          <p:cNvSpPr/>
+          <p:nvPr/>
+        </p:nvSpPr>
+        <p:spPr>
+          <a:xfrm>
+            <a:off x="489527" y="4978056"/>
+            <a:ext cx="5502199" cy="689080"/>
+          </a:xfrm>
+          <a:prstGeom prst="rect">
+            <a:avLst/>
+          </a:prstGeom>
+          <a:solidFill>
+            <a:srgbClr val="660066"/>
+          </a:solidFill>
+          <a:ln>
+            <a:noFill/>
+          </a:ln>
+        </p:spPr>
+        <p:style>
+          <a:lnRef idx="2">
+            <a:schemeClr val="accent1">
+              <a:shade val="50000"/>
+            </a:schemeClr>
+          </a:lnRef>
+          <a:fillRef idx="1">
+            <a:schemeClr val="accent1"/>
+          </a:fillRef>
+          <a:effectRef idx="0">
+            <a:schemeClr val="accent1"/>
+          </a:effectRef>
+          <a:fontRef idx="minor">
+            <a:schemeClr val="lt1"/>
+          </a:fontRef>
+        </p:style>
+        <p:txBody>
+          <a:bodyPr rtlCol="0" anchor="ctr"/>
+          <a:lstStyle/>
+          <a:p>
+            <a:pPr algn="ctr"/>
+            <a:r>
+              <a:rPr lang="en-US" sz="2000" b="1" dirty="0" smtClean="0">
+                <a:latin typeface="Calibri (Corps)"/>
+                <a:cs typeface="Segoe UI Light" panose="020B0502040204020203" pitchFamily="34" charset="0"/>
+              </a:rPr>
+              <a:t>ANY other number (incl. negative numbers)</a:t>
+            </a:r>
+            <a:endParaRPr lang="en-US" sz="2000" b="1" dirty="0">
+              <a:latin typeface="Calibri (Corps)"/>
+              <a:cs typeface="Segoe UI Light" panose="020B0502040204020203" pitchFamily="34" charset="0"/>
+            </a:endParaRPr>
+          </a:p>
+        </p:txBody>
+      </p:sp>
+      <p:sp>
+        <p:nvSpPr>
+          <p:cNvPr id="28" name="Rectangle 27"/>
+          <p:cNvSpPr/>
+          <p:nvPr/>
+        </p:nvSpPr>
+        <p:spPr>
+          <a:xfrm>
+            <a:off x="8173759" y="4978056"/>
+            <a:ext cx="2871294" cy="689080"/>
+          </a:xfrm>
+          <a:prstGeom prst="rect">
+            <a:avLst/>
+          </a:prstGeom>
+          <a:solidFill>
+            <a:schemeClr val="accent6"/>
+          </a:solidFill>
+          <a:ln>
+            <a:solidFill>
+              <a:schemeClr val="tx1"/>
+            </a:solidFill>
+          </a:ln>
+        </p:spPr>
+        <p:style>
+          <a:lnRef idx="2">
+            <a:schemeClr val="accent1">
+              <a:shade val="50000"/>
+            </a:schemeClr>
+          </a:lnRef>
+          <a:fillRef idx="1">
+            <a:schemeClr val="accent1"/>
+          </a:fillRef>
+          <a:effectRef idx="0">
+            <a:schemeClr val="accent1"/>
+          </a:effectRef>
+          <a:fontRef idx="minor">
+            <a:schemeClr val="lt1"/>
+          </a:fontRef>
+        </p:style>
+        <p:txBody>
+          <a:bodyPr rtlCol="0" anchor="ctr"/>
+          <a:lstStyle/>
+          <a:p>
+            <a:pPr algn="ctr"/>
+            <a:r>
+              <a:rPr lang="en-US" sz="2000" dirty="0" smtClean="0">
+                <a:latin typeface="Calibri (Corps)"/>
+                <a:cs typeface="Segoe UI Light" panose="020B0502040204020203" pitchFamily="34" charset="0"/>
+              </a:rPr>
+              <a:t>true</a:t>
+            </a:r>
+            <a:endParaRPr lang="en-US" sz="2000" dirty="0">
+              <a:latin typeface="Calibri (Corps)"/>
+              <a:cs typeface="Segoe UI Light" panose="020B0502040204020203" pitchFamily="34" charset="0"/>
+            </a:endParaRPr>
+          </a:p>
+        </p:txBody>
+      </p:sp>
+      <p:sp>
+        <p:nvSpPr>
+          <p:cNvPr id="29" name="Flèche droite 28"/>
+          <p:cNvSpPr/>
+          <p:nvPr/>
+        </p:nvSpPr>
+        <p:spPr>
+          <a:xfrm>
+            <a:off x="6497052" y="5817324"/>
+            <a:ext cx="1171379" cy="689080"/>
+          </a:xfrm>
+          <a:prstGeom prst="rightArrow">
+            <a:avLst/>
+          </a:prstGeom>
+          <a:solidFill>
+            <a:schemeClr val="accent2"/>
+          </a:solidFill>
+          <a:ln w="28575">
+            <a:solidFill>
+              <a:schemeClr val="tx1"/>
+            </a:solidFill>
+          </a:ln>
+        </p:spPr>
+        <p:style>
+          <a:lnRef idx="2">
+            <a:schemeClr val="accent1">
+              <a:shade val="50000"/>
+            </a:schemeClr>
+          </a:lnRef>
+          <a:fillRef idx="1">
+            <a:schemeClr val="accent1"/>
+          </a:fillRef>
+          <a:effectRef idx="0">
+            <a:schemeClr val="accent1"/>
+          </a:effectRef>
+          <a:fontRef idx="minor">
+            <a:schemeClr val="lt1"/>
+          </a:fontRef>
+        </p:style>
+        <p:txBody>
+          <a:bodyPr rtlCol="0" anchor="ctr"/>
+          <a:lstStyle/>
+          <a:p>
+            <a:pPr algn="ctr"/>
+            <a:endParaRPr lang="en-US" b="1" dirty="0"/>
+          </a:p>
+        </p:txBody>
+      </p:sp>
+      <p:sp>
+        <p:nvSpPr>
+          <p:cNvPr id="30" name="Rectangle 29"/>
+          <p:cNvSpPr/>
+          <p:nvPr/>
+        </p:nvSpPr>
+        <p:spPr>
+          <a:xfrm>
+            <a:off x="489527" y="5817324"/>
+            <a:ext cx="5502199" cy="689080"/>
+          </a:xfrm>
+          <a:prstGeom prst="rect">
+            <a:avLst/>
+          </a:prstGeom>
+          <a:solidFill>
+            <a:srgbClr val="660066"/>
+          </a:solidFill>
+          <a:ln>
+            <a:noFill/>
+          </a:ln>
+        </p:spPr>
+        <p:style>
+          <a:lnRef idx="2">
+            <a:schemeClr val="accent1">
+              <a:shade val="50000"/>
+            </a:schemeClr>
+          </a:lnRef>
+          <a:fillRef idx="1">
+            <a:schemeClr val="accent1"/>
+          </a:fillRef>
+          <a:effectRef idx="0">
+            <a:schemeClr val="accent1"/>
+          </a:effectRef>
+          <a:fontRef idx="minor">
+            <a:schemeClr val="lt1"/>
+          </a:fontRef>
+        </p:style>
+        <p:txBody>
+          <a:bodyPr rtlCol="0" anchor="ctr"/>
+          <a:lstStyle/>
+          <a:p>
+            <a:pPr algn="ctr"/>
+            <a:r>
+              <a:rPr lang="en-US" sz="2000" b="1" dirty="0" smtClean="0">
+                <a:latin typeface="Calibri (Corps)"/>
+                <a:cs typeface="Segoe UI Light" panose="020B0502040204020203" pitchFamily="34" charset="0"/>
+              </a:rPr>
+              <a:t>ANY other number (incl. negative numbers)</a:t>
+            </a:r>
+            <a:endParaRPr lang="en-US" sz="2000" b="1" dirty="0">
+              <a:latin typeface="Calibri (Corps)"/>
+              <a:cs typeface="Segoe UI Light" panose="020B0502040204020203" pitchFamily="34" charset="0"/>
+            </a:endParaRPr>
+          </a:p>
+        </p:txBody>
+      </p:sp>
+      <p:sp>
+        <p:nvSpPr>
+          <p:cNvPr id="33" name="Rectangle 32"/>
+          <p:cNvSpPr/>
+          <p:nvPr/>
+        </p:nvSpPr>
+        <p:spPr>
+          <a:xfrm>
+            <a:off x="8173759" y="3299520"/>
+            <a:ext cx="2871294" cy="689080"/>
+          </a:xfrm>
+          <a:prstGeom prst="rect">
+            <a:avLst/>
+          </a:prstGeom>
+          <a:solidFill>
+            <a:schemeClr val="accent2">
+              <a:lumMod val="50000"/>
+            </a:schemeClr>
+          </a:solidFill>
+          <a:ln>
+            <a:solidFill>
+              <a:schemeClr val="tx1"/>
+            </a:solidFill>
+          </a:ln>
+        </p:spPr>
+        <p:style>
+          <a:lnRef idx="2">
+            <a:schemeClr val="accent1">
+              <a:shade val="50000"/>
+            </a:schemeClr>
+          </a:lnRef>
+          <a:fillRef idx="1">
+            <a:schemeClr val="accent1"/>
+          </a:fillRef>
+          <a:effectRef idx="0">
+            <a:schemeClr val="accent1"/>
+          </a:effectRef>
+          <a:fontRef idx="minor">
+            <a:schemeClr val="lt1"/>
+          </a:fontRef>
+        </p:style>
+        <p:txBody>
+          <a:bodyPr rtlCol="0" anchor="ctr"/>
+          <a:lstStyle/>
+          <a:p>
+            <a:pPr algn="ctr"/>
+            <a:r>
+              <a:rPr lang="en-US" sz="2000" dirty="0" smtClean="0">
+                <a:latin typeface="Calibri (Corps)"/>
+                <a:cs typeface="Segoe UI Light" panose="020B0502040204020203" pitchFamily="34" charset="0"/>
+              </a:rPr>
+              <a:t>false</a:t>
+            </a:r>
+            <a:endParaRPr lang="en-US" sz="2000" dirty="0">
+              <a:latin typeface="Calibri (Corps)"/>
+              <a:cs typeface="Segoe UI Light" panose="020B0502040204020203" pitchFamily="34" charset="0"/>
+            </a:endParaRPr>
+          </a:p>
+        </p:txBody>
+      </p:sp>
+      <p:sp>
+        <p:nvSpPr>
+          <p:cNvPr id="34" name="Rectangle 33"/>
+          <p:cNvSpPr/>
+          <p:nvPr/>
+        </p:nvSpPr>
+        <p:spPr>
+          <a:xfrm>
+            <a:off x="489527" y="2461948"/>
+            <a:ext cx="5502199" cy="689080"/>
+          </a:xfrm>
+          <a:prstGeom prst="rect">
+            <a:avLst/>
+          </a:prstGeom>
+          <a:solidFill>
+            <a:srgbClr val="660066"/>
+          </a:solidFill>
+          <a:ln>
+            <a:noFill/>
+          </a:ln>
+        </p:spPr>
+        <p:style>
+          <a:lnRef idx="2">
+            <a:schemeClr val="accent1">
+              <a:shade val="50000"/>
+            </a:schemeClr>
+          </a:lnRef>
+          <a:fillRef idx="1">
+            <a:schemeClr val="accent1"/>
+          </a:fillRef>
+          <a:effectRef idx="0">
+            <a:schemeClr val="accent1"/>
+          </a:effectRef>
+          <a:fontRef idx="minor">
+            <a:schemeClr val="lt1"/>
+          </a:fontRef>
+        </p:style>
+        <p:txBody>
+          <a:bodyPr rtlCol="0" anchor="ctr"/>
+          <a:lstStyle/>
+          <a:p>
+            <a:r>
+              <a:rPr lang="en-US" sz="2000" b="1" dirty="0" smtClean="0">
+                <a:latin typeface="Calibri (Corps)"/>
+                <a:cs typeface="Segoe UI Light" panose="020B0502040204020203" pitchFamily="34" charset="0"/>
+              </a:rPr>
+              <a:t>ANY other number (incl. negative numbers)</a:t>
+            </a:r>
+            <a:endParaRPr lang="en-US" sz="2000" b="1" dirty="0">
+              <a:latin typeface="Calibri (Corps)"/>
+              <a:cs typeface="Segoe UI Light" panose="020B0502040204020203" pitchFamily="34" charset="0"/>
+            </a:endParaRPr>
+          </a:p>
+        </p:txBody>
+      </p:sp>
+      <p:sp>
+        <p:nvSpPr>
+          <p:cNvPr id="35" name="Rectangle 34"/>
+          <p:cNvSpPr/>
+          <p:nvPr/>
+        </p:nvSpPr>
+        <p:spPr>
+          <a:xfrm>
+            <a:off x="489527" y="3301216"/>
+            <a:ext cx="5502199" cy="689080"/>
+          </a:xfrm>
+          <a:prstGeom prst="rect">
+            <a:avLst/>
+          </a:prstGeom>
+          <a:solidFill>
+            <a:srgbClr val="660066"/>
+          </a:solidFill>
+          <a:ln>
+            <a:noFill/>
+          </a:ln>
+        </p:spPr>
+        <p:style>
+          <a:lnRef idx="2">
+            <a:schemeClr val="accent1">
+              <a:shade val="50000"/>
+            </a:schemeClr>
+          </a:lnRef>
+          <a:fillRef idx="1">
+            <a:schemeClr val="accent1"/>
+          </a:fillRef>
+          <a:effectRef idx="0">
+            <a:schemeClr val="accent1"/>
+          </a:effectRef>
+          <a:fontRef idx="minor">
+            <a:schemeClr val="lt1"/>
+          </a:fontRef>
+        </p:style>
+        <p:txBody>
+          <a:bodyPr rtlCol="0" anchor="ctr"/>
+          <a:lstStyle/>
+          <a:p>
+            <a:pPr algn="ctr"/>
+            <a:r>
+              <a:rPr lang="en-US" sz="2000" b="1" dirty="0" smtClean="0">
+                <a:latin typeface="Calibri (Corps)"/>
+                <a:cs typeface="Segoe UI Light" panose="020B0502040204020203" pitchFamily="34" charset="0"/>
+              </a:rPr>
+              <a:t>“” (empty string)</a:t>
+            </a:r>
+            <a:endParaRPr lang="en-US" sz="2000" b="1" dirty="0">
+              <a:latin typeface="Calibri (Corps)"/>
+              <a:cs typeface="Segoe UI Light" panose="020B0502040204020203" pitchFamily="34" charset="0"/>
+            </a:endParaRPr>
+          </a:p>
+        </p:txBody>
+      </p:sp>
+      <p:sp>
+        <p:nvSpPr>
+          <p:cNvPr id="36" name="Rectangle 35"/>
+          <p:cNvSpPr/>
+          <p:nvPr/>
+        </p:nvSpPr>
+        <p:spPr>
+          <a:xfrm>
+            <a:off x="489527" y="4140484"/>
+            <a:ext cx="5502199" cy="689080"/>
+          </a:xfrm>
+          <a:prstGeom prst="rect">
+            <a:avLst/>
+          </a:prstGeom>
+          <a:solidFill>
+            <a:srgbClr val="660066"/>
+          </a:solidFill>
+          <a:ln>
+            <a:noFill/>
+          </a:ln>
+        </p:spPr>
+        <p:style>
+          <a:lnRef idx="2">
+            <a:schemeClr val="accent1">
+              <a:shade val="50000"/>
+            </a:schemeClr>
+          </a:lnRef>
+          <a:fillRef idx="1">
+            <a:schemeClr val="accent1"/>
+          </a:fillRef>
+          <a:effectRef idx="0">
+            <a:schemeClr val="accent1"/>
+          </a:effectRef>
+          <a:fontRef idx="minor">
+            <a:schemeClr val="lt1"/>
+          </a:fontRef>
+        </p:style>
+        <p:txBody>
+          <a:bodyPr rtlCol="0" anchor="ctr"/>
+          <a:lstStyle/>
+          <a:p>
+            <a:pPr algn="ctr"/>
+            <a:r>
+              <a:rPr lang="en-US" sz="2000" b="1" dirty="0" smtClean="0">
+                <a:latin typeface="Calibri (Corps)"/>
+                <a:cs typeface="Segoe UI Light" panose="020B0502040204020203" pitchFamily="34" charset="0"/>
+              </a:rPr>
+              <a:t>ANY other non-empty string (incl. “false”)</a:t>
+            </a:r>
+            <a:endParaRPr lang="en-US" sz="2000" b="1" dirty="0">
+              <a:latin typeface="Calibri (Corps)"/>
+              <a:cs typeface="Segoe UI Light" panose="020B0502040204020203" pitchFamily="34" charset="0"/>
+            </a:endParaRPr>
+          </a:p>
+        </p:txBody>
+      </p:sp>
+      <p:sp>
+        <p:nvSpPr>
+          <p:cNvPr id="37" name="Rectangle 36"/>
+          <p:cNvSpPr/>
+          <p:nvPr/>
+        </p:nvSpPr>
+        <p:spPr>
+          <a:xfrm>
+            <a:off x="489527" y="4979752"/>
+            <a:ext cx="5502199" cy="689080"/>
+          </a:xfrm>
+          <a:prstGeom prst="rect">
+            <a:avLst/>
+          </a:prstGeom>
+          <a:solidFill>
+            <a:srgbClr val="660066"/>
+          </a:solidFill>
+          <a:ln>
+            <a:noFill/>
+          </a:ln>
+        </p:spPr>
+        <p:style>
+          <a:lnRef idx="2">
+            <a:schemeClr val="accent1">
+              <a:shade val="50000"/>
+            </a:schemeClr>
+          </a:lnRef>
+          <a:fillRef idx="1">
+            <a:schemeClr val="accent1"/>
+          </a:fillRef>
+          <a:effectRef idx="0">
+            <a:schemeClr val="accent1"/>
+          </a:effectRef>
+          <a:fontRef idx="minor">
+            <a:schemeClr val="lt1"/>
+          </a:fontRef>
+        </p:style>
+        <p:txBody>
+          <a:bodyPr rtlCol="0" anchor="ctr"/>
+          <a:lstStyle/>
+          <a:p>
+            <a:pPr algn="ctr"/>
+            <a:r>
+              <a:rPr lang="en-US" sz="2000" b="1" dirty="0" smtClean="0">
+                <a:latin typeface="Calibri (Corps)"/>
+                <a:cs typeface="Segoe UI Light" panose="020B0502040204020203" pitchFamily="34" charset="0"/>
+              </a:rPr>
+              <a:t>{}, [] &amp; all other objects or arrays</a:t>
+            </a:r>
+            <a:endParaRPr lang="en-US" sz="2000" b="1" dirty="0">
+              <a:latin typeface="Calibri (Corps)"/>
+              <a:cs typeface="Segoe UI Light" panose="020B0502040204020203" pitchFamily="34" charset="0"/>
+            </a:endParaRPr>
+          </a:p>
+        </p:txBody>
+      </p:sp>
+      <p:sp>
+        <p:nvSpPr>
+          <p:cNvPr id="38" name="Rectangle 37"/>
+          <p:cNvSpPr/>
+          <p:nvPr/>
+        </p:nvSpPr>
+        <p:spPr>
+          <a:xfrm>
+            <a:off x="489527" y="5819020"/>
+            <a:ext cx="5502199" cy="689080"/>
+          </a:xfrm>
+          <a:prstGeom prst="rect">
+            <a:avLst/>
+          </a:prstGeom>
+          <a:solidFill>
+            <a:srgbClr val="660066"/>
+          </a:solidFill>
+          <a:ln>
+            <a:noFill/>
+          </a:ln>
+        </p:spPr>
+        <p:style>
+          <a:lnRef idx="2">
+            <a:schemeClr val="accent1">
+              <a:shade val="50000"/>
+            </a:schemeClr>
+          </a:lnRef>
+          <a:fillRef idx="1">
+            <a:schemeClr val="accent1"/>
+          </a:fillRef>
+          <a:effectRef idx="0">
+            <a:schemeClr val="accent1"/>
+          </a:effectRef>
+          <a:fontRef idx="minor">
+            <a:schemeClr val="lt1"/>
+          </a:fontRef>
+        </p:style>
+        <p:txBody>
+          <a:bodyPr rtlCol="0" anchor="ctr"/>
+          <a:lstStyle/>
+          <a:p>
+            <a:pPr algn="ctr"/>
+            <a:r>
+              <a:rPr lang="en-US" sz="2000" b="1" dirty="0" smtClean="0">
+                <a:latin typeface="Calibri (Corps)"/>
+                <a:cs typeface="Segoe UI Light" panose="020B0502040204020203" pitchFamily="34" charset="0"/>
+              </a:rPr>
+              <a:t>Null, undefined, </a:t>
+            </a:r>
+            <a:r>
+              <a:rPr lang="en-US" sz="2000" b="1" dirty="0" err="1" smtClean="0">
+                <a:latin typeface="Calibri (Corps)"/>
+                <a:cs typeface="Segoe UI Light" panose="020B0502040204020203" pitchFamily="34" charset="0"/>
+              </a:rPr>
+              <a:t>NaN</a:t>
+            </a:r>
+            <a:endParaRPr lang="en-US" sz="2000" b="1" dirty="0">
+              <a:latin typeface="Calibri (Corps)"/>
+              <a:cs typeface="Segoe UI Light" panose="020B0502040204020203" pitchFamily="34" charset="0"/>
+            </a:endParaRPr>
+          </a:p>
+        </p:txBody>
+      </p:sp>
+    </p:spTree>
+    <p:extLst>
+      <p:ext uri="{BB962C8B-B14F-4D97-AF65-F5344CB8AC3E}">
+        <p14:creationId xmlns:p14="http://schemas.microsoft.com/office/powerpoint/2010/main" val="1629042476"/>
       </p:ext>
     </p:extLst>
   </p:cSld>

</xml_diff>

<commit_message>
23. Introducing the Ternary Operator
</commit_message>
<xml_diff>
--- a/4. Working with Control Structures (if Statements, Loops, Error Handling)/docs/Introduction.pptx
+++ b/4. Working with Control Structures (if Statements, Loops, Error Handling)/docs/Introduction.pptx
@@ -13,6 +13,7 @@
     <p:sldId id="264" r:id="rId7"/>
     <p:sldId id="263" r:id="rId8"/>
     <p:sldId id="265" r:id="rId9"/>
+    <p:sldId id="266" r:id="rId10"/>
   </p:sldIdLst>
   <p:sldSz cx="12192000" cy="6858000"/>
   <p:notesSz cx="6858000" cy="9144000"/>
@@ -124,6 +125,7 @@
             <p14:sldId id="264"/>
             <p14:sldId id="263"/>
             <p14:sldId id="265"/>
+            <p14:sldId id="266"/>
           </p14:sldIdLst>
         </p14:section>
       </p14:sectionLst>
@@ -9844,14 +9846,7 @@
                 <a:latin typeface="Calibri (Corps)"/>
                 <a:cs typeface="Segoe UI Light" panose="020B0502040204020203" pitchFamily="34" charset="0"/>
               </a:rPr>
-              <a:t>Null, undefined, </a:t>
-            </a:r>
-            <a:r>
-              <a:rPr lang="en-US" sz="2000" b="1" dirty="0" err="1" smtClean="0">
-                <a:latin typeface="Calibri (Corps)"/>
-                <a:cs typeface="Segoe UI Light" panose="020B0502040204020203" pitchFamily="34" charset="0"/>
-              </a:rPr>
-              <a:t>NaN</a:t>
+              <a:t>Null, undefined, NaN</a:t>
             </a:r>
             <a:endParaRPr lang="en-US" sz="2000" b="1" dirty="0">
               <a:latin typeface="Calibri (Corps)"/>
@@ -9864,6 +9859,905 @@
     <p:extLst>
       <p:ext uri="{BB962C8B-B14F-4D97-AF65-F5344CB8AC3E}">
         <p14:creationId xmlns:p14="http://schemas.microsoft.com/office/powerpoint/2010/main" val="1629042476"/>
+      </p:ext>
+    </p:extLst>
+  </p:cSld>
+  <p:clrMapOvr>
+    <a:masterClrMapping/>
+  </p:clrMapOvr>
+</p:sld>
+</file>
+
+<file path=ppt/slides/slide9.xml><?xml version="1.0" encoding="utf-8"?>
+<p:sld xmlns:a="http://schemas.openxmlformats.org/drawingml/2006/main" xmlns:r="http://schemas.openxmlformats.org/officeDocument/2006/relationships" xmlns:p="http://schemas.openxmlformats.org/presentationml/2006/main">
+  <p:cSld>
+    <p:spTree>
+      <p:nvGrpSpPr>
+        <p:cNvPr id="1" name=""/>
+        <p:cNvGrpSpPr/>
+        <p:nvPr/>
+      </p:nvGrpSpPr>
+      <p:grpSpPr>
+        <a:xfrm>
+          <a:off x="0" y="0"/>
+          <a:ext cx="0" cy="0"/>
+          <a:chOff x="0" y="0"/>
+          <a:chExt cx="0" cy="0"/>
+        </a:xfrm>
+      </p:grpSpPr>
+      <p:sp>
+        <p:nvSpPr>
+          <p:cNvPr id="16" name="Rectangle 15"/>
+          <p:cNvSpPr/>
+          <p:nvPr/>
+        </p:nvSpPr>
+        <p:spPr>
+          <a:xfrm>
+            <a:off x="1165648" y="5247362"/>
+            <a:ext cx="3201815" cy="879373"/>
+          </a:xfrm>
+          <a:prstGeom prst="rect">
+            <a:avLst/>
+          </a:prstGeom>
+          <a:solidFill>
+            <a:schemeClr val="accent2"/>
+          </a:solidFill>
+          <a:ln w="28575">
+            <a:solidFill>
+              <a:schemeClr val="tx1"/>
+            </a:solidFill>
+          </a:ln>
+        </p:spPr>
+        <p:style>
+          <a:lnRef idx="2">
+            <a:schemeClr val="accent1">
+              <a:shade val="50000"/>
+            </a:schemeClr>
+          </a:lnRef>
+          <a:fillRef idx="1">
+            <a:schemeClr val="accent1"/>
+          </a:fillRef>
+          <a:effectRef idx="0">
+            <a:schemeClr val="accent1"/>
+          </a:effectRef>
+          <a:fontRef idx="minor">
+            <a:schemeClr val="lt1"/>
+          </a:fontRef>
+        </p:style>
+        <p:txBody>
+          <a:bodyPr rtlCol="0" anchor="ctr"/>
+          <a:lstStyle/>
+          <a:p>
+            <a:pPr algn="ctr"/>
+            <a:r>
+              <a:rPr lang="en-US" sz="2000" dirty="0" smtClean="0"/>
+              <a:t>Condition (can be written </a:t>
+            </a:r>
+          </a:p>
+          <a:p>
+            <a:pPr algn="ctr"/>
+            <a:r>
+              <a:rPr lang="en-US" sz="2000" dirty="0" smtClean="0"/>
+              <a:t>exactly like in if statements)</a:t>
+            </a:r>
+            <a:endParaRPr lang="en-US" sz="2000" dirty="0"/>
+          </a:p>
+        </p:txBody>
+      </p:sp>
+      <p:grpSp>
+        <p:nvGrpSpPr>
+          <p:cNvPr id="3" name="Groupe 2"/>
+          <p:cNvGrpSpPr/>
+          <p:nvPr/>
+        </p:nvGrpSpPr>
+        <p:grpSpPr>
+          <a:xfrm>
+            <a:off x="128695" y="1493989"/>
+            <a:ext cx="5604471" cy="2443918"/>
+            <a:chOff x="152642" y="4218004"/>
+            <a:chExt cx="6187999" cy="897596"/>
+          </a:xfrm>
+        </p:grpSpPr>
+        <p:sp>
+          <p:nvSpPr>
+            <p:cNvPr id="11" name="Rectangle 10"/>
+            <p:cNvSpPr/>
+            <p:nvPr/>
+          </p:nvSpPr>
+          <p:spPr>
+            <a:xfrm>
+              <a:off x="152643" y="4218004"/>
+              <a:ext cx="6187998" cy="275706"/>
+            </a:xfrm>
+            <a:prstGeom prst="rect">
+              <a:avLst/>
+            </a:prstGeom>
+            <a:solidFill>
+              <a:srgbClr val="660066"/>
+            </a:solidFill>
+            <a:ln w="28575">
+              <a:solidFill>
+                <a:srgbClr val="660066"/>
+              </a:solidFill>
+            </a:ln>
+          </p:spPr>
+          <p:style>
+            <a:lnRef idx="2">
+              <a:schemeClr val="accent1">
+                <a:shade val="50000"/>
+              </a:schemeClr>
+            </a:lnRef>
+            <a:fillRef idx="1">
+              <a:schemeClr val="accent1"/>
+            </a:fillRef>
+            <a:effectRef idx="0">
+              <a:schemeClr val="accent1"/>
+            </a:effectRef>
+            <a:fontRef idx="minor">
+              <a:schemeClr val="lt1"/>
+            </a:fontRef>
+          </p:style>
+          <p:txBody>
+            <a:bodyPr rtlCol="0" anchor="ctr"/>
+            <a:lstStyle/>
+            <a:p>
+              <a:pPr algn="ctr"/>
+              <a:r>
+                <a:rPr lang="en-US" sz="2400" dirty="0" smtClean="0">
+                  <a:latin typeface="Calibri (Corps)"/>
+                  <a:cs typeface="Segoe UI Light" panose="020B0502040204020203" pitchFamily="34" charset="0"/>
+                </a:rPr>
+                <a:t>This will NOT work!</a:t>
+              </a:r>
+              <a:endParaRPr lang="en-US" sz="2400" dirty="0">
+                <a:latin typeface="Calibri (Corps)"/>
+                <a:cs typeface="Segoe UI Light" panose="020B0502040204020203" pitchFamily="34" charset="0"/>
+              </a:endParaRPr>
+            </a:p>
+          </p:txBody>
+        </p:sp>
+        <p:sp>
+          <p:nvSpPr>
+            <p:cNvPr id="19" name="Rectangle 18"/>
+            <p:cNvSpPr/>
+            <p:nvPr/>
+          </p:nvSpPr>
+          <p:spPr>
+            <a:xfrm>
+              <a:off x="152642" y="4501990"/>
+              <a:ext cx="6187999" cy="613610"/>
+            </a:xfrm>
+            <a:prstGeom prst="rect">
+              <a:avLst/>
+            </a:prstGeom>
+            <a:solidFill>
+              <a:srgbClr val="CC3399">
+                <a:alpha val="29020"/>
+              </a:srgbClr>
+            </a:solidFill>
+            <a:ln w="28575">
+              <a:solidFill>
+                <a:srgbClr val="660066"/>
+              </a:solidFill>
+            </a:ln>
+          </p:spPr>
+          <p:style>
+            <a:lnRef idx="2">
+              <a:schemeClr val="accent1">
+                <a:shade val="50000"/>
+              </a:schemeClr>
+            </a:lnRef>
+            <a:fillRef idx="1">
+              <a:schemeClr val="accent1"/>
+            </a:fillRef>
+            <a:effectRef idx="0">
+              <a:schemeClr val="accent1"/>
+            </a:effectRef>
+            <a:fontRef idx="minor">
+              <a:schemeClr val="lt1"/>
+            </a:fontRef>
+          </p:style>
+          <p:txBody>
+            <a:bodyPr rtlCol="0" anchor="ctr"/>
+            <a:lstStyle/>
+            <a:p>
+              <a:r>
+                <a:rPr lang="en-US" sz="2000" dirty="0" smtClean="0">
+                  <a:solidFill>
+                    <a:srgbClr val="660066"/>
+                  </a:solidFill>
+                  <a:latin typeface="Calibri (Corps)"/>
+                  <a:cs typeface="Segoe UI Light" panose="020B0502040204020203" pitchFamily="34" charset="0"/>
+                </a:rPr>
+                <a:t>Const userName = if (isLogin) {</a:t>
+              </a:r>
+            </a:p>
+            <a:p>
+              <a:r>
+                <a:rPr lang="en-US" sz="2000" dirty="0" smtClean="0">
+                  <a:solidFill>
+                    <a:srgbClr val="660066"/>
+                  </a:solidFill>
+                  <a:latin typeface="Calibri (Corps)"/>
+                  <a:cs typeface="Segoe UI Light" panose="020B0502040204020203" pitchFamily="34" charset="0"/>
+                </a:rPr>
+                <a:t>Return ‘Max’</a:t>
+              </a:r>
+              <a:endParaRPr lang="en-US" sz="2000" dirty="0" smtClean="0">
+                <a:solidFill>
+                  <a:srgbClr val="660066"/>
+                </a:solidFill>
+                <a:latin typeface="Calibri (Corps)"/>
+                <a:cs typeface="Segoe UI Light" panose="020B0502040204020203" pitchFamily="34" charset="0"/>
+              </a:endParaRPr>
+            </a:p>
+            <a:p>
+              <a:r>
+                <a:rPr lang="en-US" sz="2000" dirty="0" smtClean="0">
+                  <a:solidFill>
+                    <a:srgbClr val="660066"/>
+                  </a:solidFill>
+                  <a:latin typeface="Calibri (Corps)"/>
+                  <a:cs typeface="Segoe UI Light" panose="020B0502040204020203" pitchFamily="34" charset="0"/>
+                </a:rPr>
+                <a:t>} else {</a:t>
+              </a:r>
+            </a:p>
+            <a:p>
+              <a:r>
+                <a:rPr lang="en-US" sz="2000" dirty="0" smtClean="0">
+                  <a:solidFill>
+                    <a:srgbClr val="660066"/>
+                  </a:solidFill>
+                  <a:latin typeface="Calibri (Corps)"/>
+                  <a:cs typeface="Segoe UI Light" panose="020B0502040204020203" pitchFamily="34" charset="0"/>
+                </a:rPr>
+                <a:t>return null;</a:t>
+              </a:r>
+              <a:endParaRPr lang="en-US" sz="2000" dirty="0">
+                <a:solidFill>
+                  <a:srgbClr val="660066"/>
+                </a:solidFill>
+                <a:latin typeface="Calibri (Corps)"/>
+                <a:cs typeface="Segoe UI Light" panose="020B0502040204020203" pitchFamily="34" charset="0"/>
+              </a:endParaRPr>
+            </a:p>
+            <a:p>
+              <a:r>
+                <a:rPr lang="en-US" sz="2000" dirty="0" smtClean="0">
+                  <a:solidFill>
+                    <a:srgbClr val="660066"/>
+                  </a:solidFill>
+                  <a:latin typeface="Calibri (Corps)"/>
+                  <a:cs typeface="Segoe UI Light" panose="020B0502040204020203" pitchFamily="34" charset="0"/>
+                </a:rPr>
+                <a:t>}</a:t>
+              </a:r>
+              <a:endParaRPr lang="en-US" sz="2000" dirty="0">
+                <a:solidFill>
+                  <a:srgbClr val="660066"/>
+                </a:solidFill>
+                <a:latin typeface="Calibri (Corps)"/>
+                <a:cs typeface="Segoe UI Light" panose="020B0502040204020203" pitchFamily="34" charset="0"/>
+              </a:endParaRPr>
+            </a:p>
+          </p:txBody>
+        </p:sp>
+      </p:grpSp>
+      <p:sp>
+        <p:nvSpPr>
+          <p:cNvPr id="23" name="Rectangle 22"/>
+          <p:cNvSpPr/>
+          <p:nvPr/>
+        </p:nvSpPr>
+        <p:spPr>
+          <a:xfrm>
+            <a:off x="2032513" y="715919"/>
+            <a:ext cx="7858507" cy="622947"/>
+          </a:xfrm>
+          <a:prstGeom prst="rect">
+            <a:avLst/>
+          </a:prstGeom>
+          <a:solidFill>
+            <a:srgbClr val="FCF600">
+              <a:alpha val="29020"/>
+            </a:srgbClr>
+          </a:solidFill>
+          <a:ln w="28575">
+            <a:solidFill>
+              <a:schemeClr val="tx1"/>
+            </a:solidFill>
+          </a:ln>
+        </p:spPr>
+        <p:style>
+          <a:lnRef idx="2">
+            <a:schemeClr val="accent1">
+              <a:shade val="50000"/>
+            </a:schemeClr>
+          </a:lnRef>
+          <a:fillRef idx="1">
+            <a:schemeClr val="accent1"/>
+          </a:fillRef>
+          <a:effectRef idx="0">
+            <a:schemeClr val="accent1"/>
+          </a:effectRef>
+          <a:fontRef idx="minor">
+            <a:schemeClr val="lt1"/>
+          </a:fontRef>
+        </p:style>
+        <p:txBody>
+          <a:bodyPr rtlCol="0" anchor="ctr"/>
+          <a:lstStyle/>
+          <a:p>
+            <a:pPr algn="ctr"/>
+            <a:r>
+              <a:rPr lang="en-US" sz="2000" dirty="0" smtClean="0">
+                <a:solidFill>
+                  <a:sysClr val="windowText" lastClr="000000"/>
+                </a:solidFill>
+                <a:latin typeface="Calibri (Corps)"/>
+                <a:cs typeface="Segoe UI Light" panose="020B0502040204020203" pitchFamily="34" charset="0"/>
+              </a:rPr>
+              <a:t>If statements return no values!</a:t>
+            </a:r>
+            <a:endParaRPr lang="en-US" sz="2000" dirty="0">
+              <a:solidFill>
+                <a:sysClr val="windowText" lastClr="000000"/>
+              </a:solidFill>
+              <a:latin typeface="Calibri (Corps)"/>
+              <a:cs typeface="Segoe UI Light" panose="020B0502040204020203" pitchFamily="34" charset="0"/>
+            </a:endParaRPr>
+          </a:p>
+        </p:txBody>
+      </p:sp>
+      <p:sp>
+        <p:nvSpPr>
+          <p:cNvPr id="25" name="ZoneTexte 24"/>
+          <p:cNvSpPr txBox="1"/>
+          <p:nvPr/>
+        </p:nvSpPr>
+        <p:spPr>
+          <a:xfrm>
+            <a:off x="242876" y="37576"/>
+            <a:ext cx="7441289" cy="523220"/>
+          </a:xfrm>
+          <a:prstGeom prst="rect">
+            <a:avLst/>
+          </a:prstGeom>
+          <a:noFill/>
+        </p:spPr>
+        <p:txBody>
+          <a:bodyPr wrap="square" rtlCol="0">
+            <a:spAutoFit/>
+          </a:bodyPr>
+          <a:lstStyle/>
+          <a:p>
+            <a:r>
+              <a:rPr lang="en-US" sz="2800" b="1" dirty="0" smtClean="0">
+                <a:ea typeface="Segoe UI Black" panose="020B0A02040204020203" pitchFamily="34" charset="0"/>
+                <a:cs typeface="Segoe UI Semibold" panose="020B0702040204020203" pitchFamily="34" charset="0"/>
+              </a:rPr>
+              <a:t>Conditional Expressions / Ternary Operator </a:t>
+            </a:r>
+            <a:endParaRPr lang="en-US" sz="2800" b="1" dirty="0" smtClean="0">
+              <a:ea typeface="Segoe UI Black" panose="020B0A02040204020203" pitchFamily="34" charset="0"/>
+              <a:cs typeface="Segoe UI Semibold" panose="020B0702040204020203" pitchFamily="34" charset="0"/>
+            </a:endParaRPr>
+          </a:p>
+        </p:txBody>
+      </p:sp>
+      <p:grpSp>
+        <p:nvGrpSpPr>
+          <p:cNvPr id="26" name="Groupe 25"/>
+          <p:cNvGrpSpPr/>
+          <p:nvPr/>
+        </p:nvGrpSpPr>
+        <p:grpSpPr>
+          <a:xfrm>
+            <a:off x="5961766" y="1493988"/>
+            <a:ext cx="5604471" cy="2443918"/>
+            <a:chOff x="152642" y="4226284"/>
+            <a:chExt cx="6187999" cy="897596"/>
+          </a:xfrm>
+        </p:grpSpPr>
+        <p:sp>
+          <p:nvSpPr>
+            <p:cNvPr id="27" name="Rectangle 26"/>
+            <p:cNvSpPr/>
+            <p:nvPr/>
+          </p:nvSpPr>
+          <p:spPr>
+            <a:xfrm>
+              <a:off x="152643" y="4226284"/>
+              <a:ext cx="6187998" cy="275706"/>
+            </a:xfrm>
+            <a:prstGeom prst="rect">
+              <a:avLst/>
+            </a:prstGeom>
+            <a:solidFill>
+              <a:srgbClr val="660066"/>
+            </a:solidFill>
+            <a:ln w="28575">
+              <a:solidFill>
+                <a:srgbClr val="660066"/>
+              </a:solidFill>
+            </a:ln>
+          </p:spPr>
+          <p:style>
+            <a:lnRef idx="2">
+              <a:schemeClr val="accent1">
+                <a:shade val="50000"/>
+              </a:schemeClr>
+            </a:lnRef>
+            <a:fillRef idx="1">
+              <a:schemeClr val="accent1"/>
+            </a:fillRef>
+            <a:effectRef idx="0">
+              <a:schemeClr val="accent1"/>
+            </a:effectRef>
+            <a:fontRef idx="minor">
+              <a:schemeClr val="lt1"/>
+            </a:fontRef>
+          </p:style>
+          <p:txBody>
+            <a:bodyPr rtlCol="0" anchor="ctr"/>
+            <a:lstStyle/>
+            <a:p>
+              <a:pPr algn="ctr"/>
+              <a:r>
+                <a:rPr lang="en-US" sz="2400" dirty="0" smtClean="0">
+                  <a:latin typeface="Calibri (Corps)"/>
+                  <a:cs typeface="Segoe UI Light" panose="020B0502040204020203" pitchFamily="34" charset="0"/>
+                </a:rPr>
+                <a:t>Use the ternary operator in such cases</a:t>
+              </a:r>
+              <a:endParaRPr lang="en-US" sz="2400" dirty="0">
+                <a:latin typeface="Calibri (Corps)"/>
+                <a:cs typeface="Segoe UI Light" panose="020B0502040204020203" pitchFamily="34" charset="0"/>
+              </a:endParaRPr>
+            </a:p>
+          </p:txBody>
+        </p:sp>
+        <p:sp>
+          <p:nvSpPr>
+            <p:cNvPr id="28" name="Rectangle 27"/>
+            <p:cNvSpPr/>
+            <p:nvPr/>
+          </p:nvSpPr>
+          <p:spPr>
+            <a:xfrm>
+              <a:off x="152642" y="4501990"/>
+              <a:ext cx="6187999" cy="621890"/>
+            </a:xfrm>
+            <a:prstGeom prst="rect">
+              <a:avLst/>
+            </a:prstGeom>
+            <a:solidFill>
+              <a:srgbClr val="CC3399">
+                <a:alpha val="29020"/>
+              </a:srgbClr>
+            </a:solidFill>
+            <a:ln w="28575">
+              <a:solidFill>
+                <a:srgbClr val="660066"/>
+              </a:solidFill>
+            </a:ln>
+          </p:spPr>
+          <p:style>
+            <a:lnRef idx="2">
+              <a:schemeClr val="accent1">
+                <a:shade val="50000"/>
+              </a:schemeClr>
+            </a:lnRef>
+            <a:fillRef idx="1">
+              <a:schemeClr val="accent1"/>
+            </a:fillRef>
+            <a:effectRef idx="0">
+              <a:schemeClr val="accent1"/>
+            </a:effectRef>
+            <a:fontRef idx="minor">
+              <a:schemeClr val="lt1"/>
+            </a:fontRef>
+          </p:style>
+          <p:txBody>
+            <a:bodyPr rtlCol="0" anchor="ctr"/>
+            <a:lstStyle/>
+            <a:p>
+              <a:r>
+                <a:rPr lang="en-US" sz="2000" dirty="0" smtClean="0">
+                  <a:solidFill>
+                    <a:srgbClr val="660066"/>
+                  </a:solidFill>
+                  <a:latin typeface="Calibri (Corps)"/>
+                  <a:cs typeface="Segoe UI Light" panose="020B0502040204020203" pitchFamily="34" charset="0"/>
+                </a:rPr>
+                <a:t>Const userName = isLogin ? ‘Max’  : null</a:t>
+              </a:r>
+              <a:endParaRPr lang="en-US" sz="2000" dirty="0">
+                <a:solidFill>
+                  <a:srgbClr val="660066"/>
+                </a:solidFill>
+                <a:latin typeface="Calibri (Corps)"/>
+                <a:cs typeface="Segoe UI Light" panose="020B0502040204020203" pitchFamily="34" charset="0"/>
+              </a:endParaRPr>
+            </a:p>
+          </p:txBody>
+        </p:sp>
+      </p:grpSp>
+      <p:sp>
+        <p:nvSpPr>
+          <p:cNvPr id="29" name="Rectangle 28"/>
+          <p:cNvSpPr/>
+          <p:nvPr/>
+        </p:nvSpPr>
+        <p:spPr>
+          <a:xfrm>
+            <a:off x="4758609" y="5247361"/>
+            <a:ext cx="2713002" cy="879373"/>
+          </a:xfrm>
+          <a:prstGeom prst="rect">
+            <a:avLst/>
+          </a:prstGeom>
+          <a:solidFill>
+            <a:schemeClr val="accent2"/>
+          </a:solidFill>
+          <a:ln w="28575">
+            <a:solidFill>
+              <a:schemeClr val="tx1"/>
+            </a:solidFill>
+          </a:ln>
+        </p:spPr>
+        <p:style>
+          <a:lnRef idx="2">
+            <a:schemeClr val="accent1">
+              <a:shade val="50000"/>
+            </a:schemeClr>
+          </a:lnRef>
+          <a:fillRef idx="1">
+            <a:schemeClr val="accent1"/>
+          </a:fillRef>
+          <a:effectRef idx="0">
+            <a:schemeClr val="accent1"/>
+          </a:effectRef>
+          <a:fontRef idx="minor">
+            <a:schemeClr val="lt1"/>
+          </a:fontRef>
+        </p:style>
+        <p:txBody>
+          <a:bodyPr rtlCol="0" anchor="ctr"/>
+          <a:lstStyle/>
+          <a:p>
+            <a:pPr algn="ctr"/>
+            <a:r>
+              <a:rPr lang="en-US" sz="2000" dirty="0" smtClean="0"/>
+              <a:t>Value if condition is </a:t>
+            </a:r>
+          </a:p>
+          <a:p>
+            <a:pPr algn="ctr"/>
+            <a:r>
+              <a:rPr lang="en-US" sz="2000" dirty="0" smtClean="0"/>
+              <a:t>true / truthy</a:t>
+            </a:r>
+            <a:endParaRPr lang="en-US" sz="2000" dirty="0"/>
+          </a:p>
+        </p:txBody>
+      </p:sp>
+      <p:sp>
+        <p:nvSpPr>
+          <p:cNvPr id="30" name="Rectangle 29"/>
+          <p:cNvSpPr/>
+          <p:nvPr/>
+        </p:nvSpPr>
+        <p:spPr>
+          <a:xfrm>
+            <a:off x="7862757" y="5247360"/>
+            <a:ext cx="2713002" cy="879373"/>
+          </a:xfrm>
+          <a:prstGeom prst="rect">
+            <a:avLst/>
+          </a:prstGeom>
+          <a:solidFill>
+            <a:schemeClr val="accent2"/>
+          </a:solidFill>
+          <a:ln w="28575">
+            <a:solidFill>
+              <a:schemeClr val="tx1"/>
+            </a:solidFill>
+          </a:ln>
+        </p:spPr>
+        <p:style>
+          <a:lnRef idx="2">
+            <a:schemeClr val="accent1">
+              <a:shade val="50000"/>
+            </a:schemeClr>
+          </a:lnRef>
+          <a:fillRef idx="1">
+            <a:schemeClr val="accent1"/>
+          </a:fillRef>
+          <a:effectRef idx="0">
+            <a:schemeClr val="accent1"/>
+          </a:effectRef>
+          <a:fontRef idx="minor">
+            <a:schemeClr val="lt1"/>
+          </a:fontRef>
+        </p:style>
+        <p:txBody>
+          <a:bodyPr rtlCol="0" anchor="ctr"/>
+          <a:lstStyle/>
+          <a:p>
+            <a:pPr algn="ctr"/>
+            <a:r>
+              <a:rPr lang="en-US" sz="2000" dirty="0" smtClean="0"/>
+              <a:t>Value if condition is false / falsy</a:t>
+            </a:r>
+            <a:endParaRPr lang="en-US" sz="2000" dirty="0"/>
+          </a:p>
+        </p:txBody>
+      </p:sp>
+      <p:sp>
+        <p:nvSpPr>
+          <p:cNvPr id="2" name="Rectangle 1"/>
+          <p:cNvSpPr/>
+          <p:nvPr/>
+        </p:nvSpPr>
+        <p:spPr>
+          <a:xfrm>
+            <a:off x="8217569" y="2847945"/>
+            <a:ext cx="866273" cy="445168"/>
+          </a:xfrm>
+          <a:prstGeom prst="rect">
+            <a:avLst/>
+          </a:prstGeom>
+          <a:noFill/>
+          <a:ln w="38100">
+            <a:solidFill>
+              <a:schemeClr val="accent2"/>
+            </a:solidFill>
+          </a:ln>
+        </p:spPr>
+        <p:style>
+          <a:lnRef idx="2">
+            <a:schemeClr val="accent1">
+              <a:shade val="50000"/>
+            </a:schemeClr>
+          </a:lnRef>
+          <a:fillRef idx="1">
+            <a:schemeClr val="accent1"/>
+          </a:fillRef>
+          <a:effectRef idx="0">
+            <a:schemeClr val="accent1"/>
+          </a:effectRef>
+          <a:fontRef idx="minor">
+            <a:schemeClr val="lt1"/>
+          </a:fontRef>
+        </p:style>
+        <p:txBody>
+          <a:bodyPr rtlCol="0" anchor="ctr"/>
+          <a:lstStyle/>
+          <a:p>
+            <a:pPr algn="ctr"/>
+            <a:endParaRPr lang="en-US"/>
+          </a:p>
+        </p:txBody>
+      </p:sp>
+      <p:sp>
+        <p:nvSpPr>
+          <p:cNvPr id="31" name="Rectangle 30"/>
+          <p:cNvSpPr/>
+          <p:nvPr/>
+        </p:nvSpPr>
+        <p:spPr>
+          <a:xfrm>
+            <a:off x="9314386" y="2847945"/>
+            <a:ext cx="673769" cy="448144"/>
+          </a:xfrm>
+          <a:prstGeom prst="rect">
+            <a:avLst/>
+          </a:prstGeom>
+          <a:noFill/>
+          <a:ln w="38100">
+            <a:solidFill>
+              <a:schemeClr val="accent2"/>
+            </a:solidFill>
+          </a:ln>
+        </p:spPr>
+        <p:style>
+          <a:lnRef idx="2">
+            <a:schemeClr val="accent1">
+              <a:shade val="50000"/>
+            </a:schemeClr>
+          </a:lnRef>
+          <a:fillRef idx="1">
+            <a:schemeClr val="accent1"/>
+          </a:fillRef>
+          <a:effectRef idx="0">
+            <a:schemeClr val="accent1"/>
+          </a:effectRef>
+          <a:fontRef idx="minor">
+            <a:schemeClr val="lt1"/>
+          </a:fontRef>
+        </p:style>
+        <p:txBody>
+          <a:bodyPr rtlCol="0" anchor="ctr"/>
+          <a:lstStyle/>
+          <a:p>
+            <a:pPr algn="ctr"/>
+            <a:endParaRPr lang="en-US"/>
+          </a:p>
+        </p:txBody>
+      </p:sp>
+      <p:sp>
+        <p:nvSpPr>
+          <p:cNvPr id="32" name="Rectangle 31"/>
+          <p:cNvSpPr/>
+          <p:nvPr/>
+        </p:nvSpPr>
+        <p:spPr>
+          <a:xfrm>
+            <a:off x="10144563" y="2844406"/>
+            <a:ext cx="673769" cy="448144"/>
+          </a:xfrm>
+          <a:prstGeom prst="rect">
+            <a:avLst/>
+          </a:prstGeom>
+          <a:noFill/>
+          <a:ln w="38100">
+            <a:solidFill>
+              <a:schemeClr val="accent2"/>
+            </a:solidFill>
+          </a:ln>
+        </p:spPr>
+        <p:style>
+          <a:lnRef idx="2">
+            <a:schemeClr val="accent1">
+              <a:shade val="50000"/>
+            </a:schemeClr>
+          </a:lnRef>
+          <a:fillRef idx="1">
+            <a:schemeClr val="accent1"/>
+          </a:fillRef>
+          <a:effectRef idx="0">
+            <a:schemeClr val="accent1"/>
+          </a:effectRef>
+          <a:fontRef idx="minor">
+            <a:schemeClr val="lt1"/>
+          </a:fontRef>
+        </p:style>
+        <p:txBody>
+          <a:bodyPr rtlCol="0" anchor="ctr"/>
+          <a:lstStyle/>
+          <a:p>
+            <a:pPr algn="ctr"/>
+            <a:endParaRPr lang="en-US"/>
+          </a:p>
+        </p:txBody>
+      </p:sp>
+      <p:cxnSp>
+        <p:nvCxnSpPr>
+          <p:cNvPr id="5" name="Connecteur en angle 4"/>
+          <p:cNvCxnSpPr>
+            <a:stCxn id="2" idx="2"/>
+            <a:endCxn id="16" idx="0"/>
+          </p:cNvCxnSpPr>
+          <p:nvPr/>
+        </p:nvCxnSpPr>
+        <p:spPr>
+          <a:xfrm rot="5400000">
+            <a:off x="4731507" y="1328162"/>
+            <a:ext cx="1954249" cy="5884150"/>
+          </a:xfrm>
+          <a:prstGeom prst="bentConnector3">
+            <a:avLst/>
+          </a:prstGeom>
+          <a:ln w="38100">
+            <a:solidFill>
+              <a:schemeClr val="accent2"/>
+            </a:solidFill>
+            <a:tailEnd type="triangle"/>
+          </a:ln>
+        </p:spPr>
+        <p:style>
+          <a:lnRef idx="1">
+            <a:schemeClr val="accent1"/>
+          </a:lnRef>
+          <a:fillRef idx="0">
+            <a:schemeClr val="accent1"/>
+          </a:fillRef>
+          <a:effectRef idx="0">
+            <a:schemeClr val="accent1"/>
+          </a:effectRef>
+          <a:fontRef idx="minor">
+            <a:schemeClr val="tx1"/>
+          </a:fontRef>
+        </p:style>
+      </p:cxnSp>
+      <p:cxnSp>
+        <p:nvCxnSpPr>
+          <p:cNvPr id="33" name="Connecteur en angle 32"/>
+          <p:cNvCxnSpPr>
+            <a:stCxn id="31" idx="2"/>
+            <a:endCxn id="29" idx="0"/>
+          </p:cNvCxnSpPr>
+          <p:nvPr/>
+        </p:nvCxnSpPr>
+        <p:spPr>
+          <a:xfrm rot="5400000">
+            <a:off x="6907555" y="2503645"/>
+            <a:ext cx="1951272" cy="3536161"/>
+          </a:xfrm>
+          <a:prstGeom prst="bentConnector3">
+            <a:avLst>
+              <a:gd name="adj1" fmla="val 57399"/>
+            </a:avLst>
+          </a:prstGeom>
+          <a:ln w="38100">
+            <a:solidFill>
+              <a:schemeClr val="accent2"/>
+            </a:solidFill>
+            <a:tailEnd type="triangle"/>
+          </a:ln>
+        </p:spPr>
+        <p:style>
+          <a:lnRef idx="1">
+            <a:schemeClr val="accent1"/>
+          </a:lnRef>
+          <a:fillRef idx="0">
+            <a:schemeClr val="accent1"/>
+          </a:fillRef>
+          <a:effectRef idx="0">
+            <a:schemeClr val="accent1"/>
+          </a:effectRef>
+          <a:fontRef idx="minor">
+            <a:schemeClr val="tx1"/>
+          </a:fontRef>
+        </p:style>
+      </p:cxnSp>
+      <p:cxnSp>
+        <p:nvCxnSpPr>
+          <p:cNvPr id="35" name="Connecteur en angle 34"/>
+          <p:cNvCxnSpPr>
+            <a:stCxn id="32" idx="2"/>
+            <a:endCxn id="30" idx="0"/>
+          </p:cNvCxnSpPr>
+          <p:nvPr/>
+        </p:nvCxnSpPr>
+        <p:spPr>
+          <a:xfrm rot="5400000">
+            <a:off x="8872948" y="3638860"/>
+            <a:ext cx="1954810" cy="1262190"/>
+          </a:xfrm>
+          <a:prstGeom prst="bentConnector3">
+            <a:avLst>
+              <a:gd name="adj1" fmla="val 78928"/>
+            </a:avLst>
+          </a:prstGeom>
+          <a:ln w="38100">
+            <a:solidFill>
+              <a:schemeClr val="accent2"/>
+            </a:solidFill>
+            <a:tailEnd type="triangle"/>
+          </a:ln>
+        </p:spPr>
+        <p:style>
+          <a:lnRef idx="1">
+            <a:schemeClr val="accent1"/>
+          </a:lnRef>
+          <a:fillRef idx="0">
+            <a:schemeClr val="accent1"/>
+          </a:fillRef>
+          <a:effectRef idx="0">
+            <a:schemeClr val="accent1"/>
+          </a:effectRef>
+          <a:fontRef idx="minor">
+            <a:schemeClr val="tx1"/>
+          </a:fontRef>
+        </p:style>
+      </p:cxnSp>
+    </p:spTree>
+    <p:extLst>
+      <p:ext uri="{BB962C8B-B14F-4D97-AF65-F5344CB8AC3E}">
+        <p14:creationId xmlns:p14="http://schemas.microsoft.com/office/powerpoint/2010/main" val="810948680"/>
       </p:ext>
     </p:extLst>
   </p:cSld>

</xml_diff>

<commit_message>
24. A Bit of Theory Statements vs Expressions 25. Logical Operator Tricks & Shorthands
</commit_message>
<xml_diff>
--- a/4. Working with Control Structures (if Statements, Loops, Error Handling)/docs/Introduction.pptx
+++ b/4. Working with Control Structures (if Statements, Loops, Error Handling)/docs/Introduction.pptx
@@ -14,6 +14,7 @@
     <p:sldId id="263" r:id="rId8"/>
     <p:sldId id="265" r:id="rId9"/>
     <p:sldId id="266" r:id="rId10"/>
+    <p:sldId id="267" r:id="rId11"/>
   </p:sldIdLst>
   <p:sldSz cx="12192000" cy="6858000"/>
   <p:notesSz cx="6858000" cy="9144000"/>
@@ -126,6 +127,7 @@
             <p14:sldId id="263"/>
             <p14:sldId id="265"/>
             <p14:sldId id="266"/>
+            <p14:sldId id="267"/>
           </p14:sldIdLst>
         </p14:section>
       </p14:sectionLst>
@@ -3235,6 +3237,806 @@
     <p:extLst>
       <p:ext uri="{BB962C8B-B14F-4D97-AF65-F5344CB8AC3E}">
         <p14:creationId xmlns:p14="http://schemas.microsoft.com/office/powerpoint/2010/main" val="1136779204"/>
+      </p:ext>
+    </p:extLst>
+  </p:cSld>
+  <p:clrMapOvr>
+    <a:masterClrMapping/>
+  </p:clrMapOvr>
+</p:sld>
+</file>
+
+<file path=ppt/slides/slide10.xml><?xml version="1.0" encoding="utf-8"?>
+<p:sld xmlns:a="http://schemas.openxmlformats.org/drawingml/2006/main" xmlns:r="http://schemas.openxmlformats.org/officeDocument/2006/relationships" xmlns:p="http://schemas.openxmlformats.org/presentationml/2006/main">
+  <p:cSld>
+    <p:spTree>
+      <p:nvGrpSpPr>
+        <p:cNvPr id="1" name=""/>
+        <p:cNvGrpSpPr/>
+        <p:nvPr/>
+      </p:nvGrpSpPr>
+      <p:grpSpPr>
+        <a:xfrm>
+          <a:off x="0" y="0"/>
+          <a:ext cx="0" cy="0"/>
+          <a:chOff x="0" y="0"/>
+          <a:chExt cx="0" cy="0"/>
+        </a:xfrm>
+      </p:grpSpPr>
+      <p:sp>
+        <p:nvSpPr>
+          <p:cNvPr id="2" name="Rectangle 1"/>
+          <p:cNvSpPr/>
+          <p:nvPr/>
+        </p:nvSpPr>
+        <p:spPr>
+          <a:xfrm>
+            <a:off x="237227" y="990030"/>
+            <a:ext cx="4433062" cy="1235812"/>
+          </a:xfrm>
+          <a:prstGeom prst="rect">
+            <a:avLst/>
+          </a:prstGeom>
+          <a:solidFill>
+            <a:srgbClr val="660066"/>
+          </a:solidFill>
+          <a:ln>
+            <a:noFill/>
+          </a:ln>
+        </p:spPr>
+        <p:style>
+          <a:lnRef idx="2">
+            <a:schemeClr val="accent1">
+              <a:shade val="50000"/>
+            </a:schemeClr>
+          </a:lnRef>
+          <a:fillRef idx="1">
+            <a:schemeClr val="accent1"/>
+          </a:fillRef>
+          <a:effectRef idx="0">
+            <a:schemeClr val="accent1"/>
+          </a:effectRef>
+          <a:fontRef idx="minor">
+            <a:schemeClr val="lt1"/>
+          </a:fontRef>
+        </p:style>
+        <p:txBody>
+          <a:bodyPr rtlCol="0" anchor="ctr"/>
+          <a:lstStyle/>
+          <a:p>
+            <a:pPr algn="ctr"/>
+            <a:r>
+              <a:rPr lang="en-US" sz="2400" b="1" dirty="0" smtClean="0">
+                <a:latin typeface="Calibri (Corps)"/>
+                <a:cs typeface="Segoe UI Light" panose="020B0502040204020203" pitchFamily="34" charset="0"/>
+              </a:rPr>
+              <a:t>Boolean Coercion via double NOT (double bang </a:t>
+            </a:r>
+            <a:r>
+              <a:rPr lang="en-US" sz="2400" b="1" dirty="0" smtClean="0">
+                <a:latin typeface="Calibri (Corps)"/>
+                <a:cs typeface="Segoe UI Light" panose="020B0502040204020203" pitchFamily="34" charset="0"/>
+              </a:rPr>
+              <a:t>operator</a:t>
+            </a:r>
+            <a:r>
+              <a:rPr lang="en-US" sz="2400" b="1" dirty="0" smtClean="0">
+                <a:latin typeface="Calibri (Corps)"/>
+                <a:cs typeface="Segoe UI Light" panose="020B0502040204020203" pitchFamily="34" charset="0"/>
+              </a:rPr>
+              <a:t>)</a:t>
+            </a:r>
+            <a:endParaRPr lang="en-US" sz="2400" b="1" dirty="0">
+              <a:latin typeface="Calibri (Corps)"/>
+              <a:cs typeface="Segoe UI Light" panose="020B0502040204020203" pitchFamily="34" charset="0"/>
+            </a:endParaRPr>
+          </a:p>
+        </p:txBody>
+      </p:sp>
+      <p:sp>
+        <p:nvSpPr>
+          <p:cNvPr id="3" name="ZoneTexte 2"/>
+          <p:cNvSpPr txBox="1"/>
+          <p:nvPr/>
+        </p:nvSpPr>
+        <p:spPr>
+          <a:xfrm>
+            <a:off x="489527" y="193964"/>
+            <a:ext cx="6909894" cy="523220"/>
+          </a:xfrm>
+          <a:prstGeom prst="rect">
+            <a:avLst/>
+          </a:prstGeom>
+          <a:noFill/>
+        </p:spPr>
+        <p:txBody>
+          <a:bodyPr wrap="square" rtlCol="0">
+            <a:spAutoFit/>
+          </a:bodyPr>
+          <a:lstStyle/>
+          <a:p>
+            <a:r>
+              <a:rPr lang="en-US" sz="2800" b="1" dirty="0" smtClean="0">
+                <a:ea typeface="Segoe UI Black" panose="020B0A02040204020203" pitchFamily="34" charset="0"/>
+                <a:cs typeface="Segoe UI Semibold" panose="020B0702040204020203" pitchFamily="34" charset="0"/>
+              </a:rPr>
+              <a:t>“Boolean Tricks” with Logical Operators</a:t>
+            </a:r>
+            <a:endParaRPr lang="en-US" sz="2800" b="1" dirty="0">
+              <a:ea typeface="Segoe UI Black" panose="020B0A02040204020203" pitchFamily="34" charset="0"/>
+              <a:cs typeface="Segoe UI Semibold" panose="020B0702040204020203" pitchFamily="34" charset="0"/>
+            </a:endParaRPr>
+          </a:p>
+        </p:txBody>
+      </p:sp>
+      <p:sp>
+        <p:nvSpPr>
+          <p:cNvPr id="19" name="Rectangle 18"/>
+          <p:cNvSpPr/>
+          <p:nvPr/>
+        </p:nvSpPr>
+        <p:spPr>
+          <a:xfrm>
+            <a:off x="4817133" y="990027"/>
+            <a:ext cx="794603" cy="1235813"/>
+          </a:xfrm>
+          <a:prstGeom prst="rect">
+            <a:avLst/>
+          </a:prstGeom>
+          <a:solidFill>
+            <a:srgbClr val="CC3399">
+              <a:alpha val="29020"/>
+            </a:srgbClr>
+          </a:solidFill>
+          <a:ln w="28575">
+            <a:solidFill>
+              <a:srgbClr val="660066"/>
+            </a:solidFill>
+          </a:ln>
+        </p:spPr>
+        <p:style>
+          <a:lnRef idx="2">
+            <a:schemeClr val="accent1">
+              <a:shade val="50000"/>
+            </a:schemeClr>
+          </a:lnRef>
+          <a:fillRef idx="1">
+            <a:schemeClr val="accent1"/>
+          </a:fillRef>
+          <a:effectRef idx="0">
+            <a:schemeClr val="accent1"/>
+          </a:effectRef>
+          <a:fontRef idx="minor">
+            <a:schemeClr val="lt1"/>
+          </a:fontRef>
+        </p:style>
+        <p:txBody>
+          <a:bodyPr rtlCol="0" anchor="ctr"/>
+          <a:lstStyle/>
+          <a:p>
+            <a:pPr algn="ctr"/>
+            <a:r>
+              <a:rPr lang="en-US" sz="2800" dirty="0" smtClean="0">
+                <a:solidFill>
+                  <a:srgbClr val="660066"/>
+                </a:solidFill>
+                <a:latin typeface="Calibri (Corps)"/>
+                <a:cs typeface="Segoe UI Light" panose="020B0502040204020203" pitchFamily="34" charset="0"/>
+              </a:rPr>
+              <a:t>!!</a:t>
+            </a:r>
+            <a:endParaRPr lang="en-US" sz="2800" dirty="0">
+              <a:solidFill>
+                <a:srgbClr val="660066"/>
+              </a:solidFill>
+              <a:latin typeface="Calibri (Corps)"/>
+              <a:cs typeface="Segoe UI Light" panose="020B0502040204020203" pitchFamily="34" charset="0"/>
+            </a:endParaRPr>
+          </a:p>
+        </p:txBody>
+      </p:sp>
+      <p:sp>
+        <p:nvSpPr>
+          <p:cNvPr id="29" name="Rectangle 28"/>
+          <p:cNvSpPr/>
+          <p:nvPr/>
+        </p:nvSpPr>
+        <p:spPr>
+          <a:xfrm>
+            <a:off x="9136899" y="990027"/>
+            <a:ext cx="2914174" cy="1235813"/>
+          </a:xfrm>
+          <a:prstGeom prst="rect">
+            <a:avLst/>
+          </a:prstGeom>
+          <a:solidFill>
+            <a:schemeClr val="accent2"/>
+          </a:solidFill>
+          <a:ln w="28575">
+            <a:solidFill>
+              <a:schemeClr val="tx1"/>
+            </a:solidFill>
+          </a:ln>
+        </p:spPr>
+        <p:style>
+          <a:lnRef idx="2">
+            <a:schemeClr val="accent1">
+              <a:shade val="50000"/>
+            </a:schemeClr>
+          </a:lnRef>
+          <a:fillRef idx="1">
+            <a:schemeClr val="accent1"/>
+          </a:fillRef>
+          <a:effectRef idx="0">
+            <a:schemeClr val="accent1"/>
+          </a:effectRef>
+          <a:fontRef idx="minor">
+            <a:schemeClr val="lt1"/>
+          </a:fontRef>
+        </p:style>
+        <p:txBody>
+          <a:bodyPr rtlCol="0" anchor="ctr"/>
+          <a:lstStyle/>
+          <a:p>
+            <a:pPr algn="ctr"/>
+            <a:r>
+              <a:rPr lang="en-US" sz="2400" dirty="0" smtClean="0"/>
+              <a:t>False, true</a:t>
+            </a:r>
+            <a:endParaRPr lang="en-US" sz="2400" dirty="0"/>
+          </a:p>
+        </p:txBody>
+      </p:sp>
+      <p:sp>
+        <p:nvSpPr>
+          <p:cNvPr id="11" name="Rectangle 10"/>
+          <p:cNvSpPr/>
+          <p:nvPr/>
+        </p:nvSpPr>
+        <p:spPr>
+          <a:xfrm>
+            <a:off x="5758580" y="990027"/>
+            <a:ext cx="3144788" cy="1235813"/>
+          </a:xfrm>
+          <a:prstGeom prst="rect">
+            <a:avLst/>
+          </a:prstGeom>
+          <a:solidFill>
+            <a:srgbClr val="CC3399">
+              <a:alpha val="29020"/>
+            </a:srgbClr>
+          </a:solidFill>
+          <a:ln w="28575">
+            <a:solidFill>
+              <a:srgbClr val="660066"/>
+            </a:solidFill>
+          </a:ln>
+        </p:spPr>
+        <p:style>
+          <a:lnRef idx="2">
+            <a:schemeClr val="accent1">
+              <a:shade val="50000"/>
+            </a:schemeClr>
+          </a:lnRef>
+          <a:fillRef idx="1">
+            <a:schemeClr val="accent1"/>
+          </a:fillRef>
+          <a:effectRef idx="0">
+            <a:schemeClr val="accent1"/>
+          </a:effectRef>
+          <a:fontRef idx="minor">
+            <a:schemeClr val="lt1"/>
+          </a:fontRef>
+        </p:style>
+        <p:txBody>
+          <a:bodyPr rtlCol="0" anchor="ctr"/>
+          <a:lstStyle/>
+          <a:p>
+            <a:pPr algn="ctr"/>
+            <a:r>
+              <a:rPr lang="en-US" sz="2400" dirty="0" smtClean="0">
+                <a:solidFill>
+                  <a:srgbClr val="660066"/>
+                </a:solidFill>
+                <a:latin typeface="Calibri (Corps)"/>
+                <a:cs typeface="Segoe UI Light" panose="020B0502040204020203" pitchFamily="34" charset="0"/>
+              </a:rPr>
+              <a:t>e.g. !!’’, e.g. !!1</a:t>
+            </a:r>
+            <a:endParaRPr lang="en-US" sz="2400" dirty="0">
+              <a:solidFill>
+                <a:srgbClr val="660066"/>
+              </a:solidFill>
+              <a:latin typeface="Calibri (Corps)"/>
+              <a:cs typeface="Segoe UI Light" panose="020B0502040204020203" pitchFamily="34" charset="0"/>
+            </a:endParaRPr>
+          </a:p>
+        </p:txBody>
+      </p:sp>
+      <p:sp>
+        <p:nvSpPr>
+          <p:cNvPr id="12" name="Rectangle 11"/>
+          <p:cNvSpPr/>
+          <p:nvPr/>
+        </p:nvSpPr>
+        <p:spPr>
+          <a:xfrm>
+            <a:off x="237227" y="2788446"/>
+            <a:ext cx="4433062" cy="1235812"/>
+          </a:xfrm>
+          <a:prstGeom prst="rect">
+            <a:avLst/>
+          </a:prstGeom>
+          <a:solidFill>
+            <a:srgbClr val="660066"/>
+          </a:solidFill>
+          <a:ln>
+            <a:noFill/>
+          </a:ln>
+        </p:spPr>
+        <p:style>
+          <a:lnRef idx="2">
+            <a:schemeClr val="accent1">
+              <a:shade val="50000"/>
+            </a:schemeClr>
+          </a:lnRef>
+          <a:fillRef idx="1">
+            <a:schemeClr val="accent1"/>
+          </a:fillRef>
+          <a:effectRef idx="0">
+            <a:schemeClr val="accent1"/>
+          </a:effectRef>
+          <a:fontRef idx="minor">
+            <a:schemeClr val="lt1"/>
+          </a:fontRef>
+        </p:style>
+        <p:txBody>
+          <a:bodyPr rtlCol="0" anchor="ctr"/>
+          <a:lstStyle/>
+          <a:p>
+            <a:pPr algn="ctr"/>
+            <a:r>
+              <a:rPr lang="en-US" sz="2400" b="1" dirty="0" smtClean="0">
+                <a:latin typeface="Calibri (Corps)"/>
+                <a:cs typeface="Segoe UI Light" panose="020B0502040204020203" pitchFamily="34" charset="0"/>
+              </a:rPr>
+              <a:t>Default value assignment via OR operator</a:t>
+            </a:r>
+            <a:endParaRPr lang="en-US" sz="2400" b="1" dirty="0">
+              <a:latin typeface="Calibri (Corps)"/>
+              <a:cs typeface="Segoe UI Light" panose="020B0502040204020203" pitchFamily="34" charset="0"/>
+            </a:endParaRPr>
+          </a:p>
+        </p:txBody>
+      </p:sp>
+      <p:sp>
+        <p:nvSpPr>
+          <p:cNvPr id="13" name="Rectangle 12"/>
+          <p:cNvSpPr/>
+          <p:nvPr/>
+        </p:nvSpPr>
+        <p:spPr>
+          <a:xfrm>
+            <a:off x="4817133" y="2788445"/>
+            <a:ext cx="794603" cy="1235813"/>
+          </a:xfrm>
+          <a:prstGeom prst="rect">
+            <a:avLst/>
+          </a:prstGeom>
+          <a:solidFill>
+            <a:srgbClr val="CC3399">
+              <a:alpha val="29020"/>
+            </a:srgbClr>
+          </a:solidFill>
+          <a:ln w="28575">
+            <a:solidFill>
+              <a:srgbClr val="660066"/>
+            </a:solidFill>
+          </a:ln>
+        </p:spPr>
+        <p:style>
+          <a:lnRef idx="2">
+            <a:schemeClr val="accent1">
+              <a:shade val="50000"/>
+            </a:schemeClr>
+          </a:lnRef>
+          <a:fillRef idx="1">
+            <a:schemeClr val="accent1"/>
+          </a:fillRef>
+          <a:effectRef idx="0">
+            <a:schemeClr val="accent1"/>
+          </a:effectRef>
+          <a:fontRef idx="minor">
+            <a:schemeClr val="lt1"/>
+          </a:fontRef>
+        </p:style>
+        <p:txBody>
+          <a:bodyPr rtlCol="0" anchor="ctr"/>
+          <a:lstStyle/>
+          <a:p>
+            <a:pPr algn="ctr"/>
+            <a:r>
+              <a:rPr lang="en-US" sz="2800" dirty="0" smtClean="0">
+                <a:solidFill>
+                  <a:srgbClr val="660066"/>
+                </a:solidFill>
+                <a:latin typeface="Calibri (Corps)"/>
+                <a:cs typeface="Segoe UI Light" panose="020B0502040204020203" pitchFamily="34" charset="0"/>
+              </a:rPr>
+              <a:t>||</a:t>
+            </a:r>
+            <a:endParaRPr lang="en-US" sz="2800" dirty="0">
+              <a:solidFill>
+                <a:srgbClr val="660066"/>
+              </a:solidFill>
+              <a:latin typeface="Calibri (Corps)"/>
+              <a:cs typeface="Segoe UI Light" panose="020B0502040204020203" pitchFamily="34" charset="0"/>
+            </a:endParaRPr>
+          </a:p>
+        </p:txBody>
+      </p:sp>
+      <p:sp>
+        <p:nvSpPr>
+          <p:cNvPr id="14" name="Rectangle 13"/>
+          <p:cNvSpPr/>
+          <p:nvPr/>
+        </p:nvSpPr>
+        <p:spPr>
+          <a:xfrm>
+            <a:off x="5758580" y="2788445"/>
+            <a:ext cx="3144788" cy="1235813"/>
+          </a:xfrm>
+          <a:prstGeom prst="rect">
+            <a:avLst/>
+          </a:prstGeom>
+          <a:solidFill>
+            <a:srgbClr val="CC3399">
+              <a:alpha val="29020"/>
+            </a:srgbClr>
+          </a:solidFill>
+          <a:ln w="28575">
+            <a:solidFill>
+              <a:srgbClr val="660066"/>
+            </a:solidFill>
+          </a:ln>
+        </p:spPr>
+        <p:style>
+          <a:lnRef idx="2">
+            <a:schemeClr val="accent1">
+              <a:shade val="50000"/>
+            </a:schemeClr>
+          </a:lnRef>
+          <a:fillRef idx="1">
+            <a:schemeClr val="accent1"/>
+          </a:fillRef>
+          <a:effectRef idx="0">
+            <a:schemeClr val="accent1"/>
+          </a:effectRef>
+          <a:fontRef idx="minor">
+            <a:schemeClr val="lt1"/>
+          </a:fontRef>
+        </p:style>
+        <p:txBody>
+          <a:bodyPr rtlCol="0" anchor="ctr"/>
+          <a:lstStyle/>
+          <a:p>
+            <a:pPr algn="ctr"/>
+            <a:r>
+              <a:rPr lang="en-US" sz="2400" dirty="0" smtClean="0">
+                <a:solidFill>
+                  <a:srgbClr val="660066"/>
+                </a:solidFill>
+                <a:latin typeface="Calibri (Corps)"/>
+                <a:cs typeface="Segoe UI Light" panose="020B0502040204020203" pitchFamily="34" charset="0"/>
+              </a:rPr>
+              <a:t>e.g. const name = someInput || ‘MAX’</a:t>
+            </a:r>
+            <a:endParaRPr lang="en-US" sz="2400" dirty="0">
+              <a:solidFill>
+                <a:srgbClr val="660066"/>
+              </a:solidFill>
+              <a:latin typeface="Calibri (Corps)"/>
+              <a:cs typeface="Segoe UI Light" panose="020B0502040204020203" pitchFamily="34" charset="0"/>
+            </a:endParaRPr>
+          </a:p>
+        </p:txBody>
+      </p:sp>
+      <p:sp>
+        <p:nvSpPr>
+          <p:cNvPr id="15" name="Rectangle 14"/>
+          <p:cNvSpPr/>
+          <p:nvPr/>
+        </p:nvSpPr>
+        <p:spPr>
+          <a:xfrm>
+            <a:off x="9136899" y="2788445"/>
+            <a:ext cx="2914174" cy="1235813"/>
+          </a:xfrm>
+          <a:prstGeom prst="rect">
+            <a:avLst/>
+          </a:prstGeom>
+          <a:solidFill>
+            <a:schemeClr val="accent2"/>
+          </a:solidFill>
+          <a:ln w="28575">
+            <a:solidFill>
+              <a:schemeClr val="tx1"/>
+            </a:solidFill>
+          </a:ln>
+        </p:spPr>
+        <p:style>
+          <a:lnRef idx="2">
+            <a:schemeClr val="accent1">
+              <a:shade val="50000"/>
+            </a:schemeClr>
+          </a:lnRef>
+          <a:fillRef idx="1">
+            <a:schemeClr val="accent1"/>
+          </a:fillRef>
+          <a:effectRef idx="0">
+            <a:schemeClr val="accent1"/>
+          </a:effectRef>
+          <a:fontRef idx="minor">
+            <a:schemeClr val="lt1"/>
+          </a:fontRef>
+        </p:style>
+        <p:txBody>
+          <a:bodyPr rtlCol="0" anchor="ctr"/>
+          <a:lstStyle/>
+          <a:p>
+            <a:pPr algn="ctr"/>
+            <a:r>
+              <a:rPr lang="en-US" sz="2400" dirty="0" smtClean="0"/>
+              <a:t>someInput if not falsy, ‘Max’ otherwise</a:t>
+            </a:r>
+            <a:endParaRPr lang="en-US" sz="2400" dirty="0"/>
+          </a:p>
+        </p:txBody>
+      </p:sp>
+      <p:sp>
+        <p:nvSpPr>
+          <p:cNvPr id="16" name="Rectangle 15"/>
+          <p:cNvSpPr/>
+          <p:nvPr/>
+        </p:nvSpPr>
+        <p:spPr>
+          <a:xfrm>
+            <a:off x="237227" y="4586862"/>
+            <a:ext cx="4433062" cy="1235812"/>
+          </a:xfrm>
+          <a:prstGeom prst="rect">
+            <a:avLst/>
+          </a:prstGeom>
+          <a:solidFill>
+            <a:srgbClr val="660066"/>
+          </a:solidFill>
+          <a:ln>
+            <a:noFill/>
+          </a:ln>
+        </p:spPr>
+        <p:style>
+          <a:lnRef idx="2">
+            <a:schemeClr val="accent1">
+              <a:shade val="50000"/>
+            </a:schemeClr>
+          </a:lnRef>
+          <a:fillRef idx="1">
+            <a:schemeClr val="accent1"/>
+          </a:fillRef>
+          <a:effectRef idx="0">
+            <a:schemeClr val="accent1"/>
+          </a:effectRef>
+          <a:fontRef idx="minor">
+            <a:schemeClr val="lt1"/>
+          </a:fontRef>
+        </p:style>
+        <p:txBody>
+          <a:bodyPr rtlCol="0" anchor="ctr"/>
+          <a:lstStyle/>
+          <a:p>
+            <a:pPr algn="ctr"/>
+            <a:r>
+              <a:rPr lang="en-US" sz="2400" b="1" dirty="0" smtClean="0">
+                <a:latin typeface="Calibri (Corps)"/>
+                <a:cs typeface="Segoe UI Light" panose="020B0502040204020203" pitchFamily="34" charset="0"/>
+              </a:rPr>
+              <a:t>Use value if condition is true via AND operator</a:t>
+            </a:r>
+            <a:endParaRPr lang="en-US" sz="2400" b="1" dirty="0">
+              <a:latin typeface="Calibri (Corps)"/>
+              <a:cs typeface="Segoe UI Light" panose="020B0502040204020203" pitchFamily="34" charset="0"/>
+            </a:endParaRPr>
+          </a:p>
+        </p:txBody>
+      </p:sp>
+      <p:sp>
+        <p:nvSpPr>
+          <p:cNvPr id="17" name="Rectangle 16"/>
+          <p:cNvSpPr/>
+          <p:nvPr/>
+        </p:nvSpPr>
+        <p:spPr>
+          <a:xfrm>
+            <a:off x="4817133" y="4586862"/>
+            <a:ext cx="794603" cy="1235813"/>
+          </a:xfrm>
+          <a:prstGeom prst="rect">
+            <a:avLst/>
+          </a:prstGeom>
+          <a:solidFill>
+            <a:srgbClr val="CC3399">
+              <a:alpha val="29020"/>
+            </a:srgbClr>
+          </a:solidFill>
+          <a:ln w="28575">
+            <a:solidFill>
+              <a:srgbClr val="660066"/>
+            </a:solidFill>
+          </a:ln>
+        </p:spPr>
+        <p:style>
+          <a:lnRef idx="2">
+            <a:schemeClr val="accent1">
+              <a:shade val="50000"/>
+            </a:schemeClr>
+          </a:lnRef>
+          <a:fillRef idx="1">
+            <a:schemeClr val="accent1"/>
+          </a:fillRef>
+          <a:effectRef idx="0">
+            <a:schemeClr val="accent1"/>
+          </a:effectRef>
+          <a:fontRef idx="minor">
+            <a:schemeClr val="lt1"/>
+          </a:fontRef>
+        </p:style>
+        <p:txBody>
+          <a:bodyPr rtlCol="0" anchor="ctr"/>
+          <a:lstStyle/>
+          <a:p>
+            <a:pPr algn="ctr"/>
+            <a:r>
+              <a:rPr lang="en-US" sz="2800" dirty="0" smtClean="0">
+                <a:solidFill>
+                  <a:srgbClr val="660066"/>
+                </a:solidFill>
+                <a:latin typeface="Calibri (Corps)"/>
+                <a:cs typeface="Segoe UI Light" panose="020B0502040204020203" pitchFamily="34" charset="0"/>
+              </a:rPr>
+              <a:t>&amp;&amp;</a:t>
+            </a:r>
+            <a:endParaRPr lang="en-US" sz="2800" dirty="0">
+              <a:solidFill>
+                <a:srgbClr val="660066"/>
+              </a:solidFill>
+              <a:latin typeface="Calibri (Corps)"/>
+              <a:cs typeface="Segoe UI Light" panose="020B0502040204020203" pitchFamily="34" charset="0"/>
+            </a:endParaRPr>
+          </a:p>
+        </p:txBody>
+      </p:sp>
+      <p:sp>
+        <p:nvSpPr>
+          <p:cNvPr id="20" name="Rectangle 19"/>
+          <p:cNvSpPr/>
+          <p:nvPr/>
+        </p:nvSpPr>
+        <p:spPr>
+          <a:xfrm>
+            <a:off x="5758580" y="4586862"/>
+            <a:ext cx="3144788" cy="1235813"/>
+          </a:xfrm>
+          <a:prstGeom prst="rect">
+            <a:avLst/>
+          </a:prstGeom>
+          <a:solidFill>
+            <a:srgbClr val="CC3399">
+              <a:alpha val="29020"/>
+            </a:srgbClr>
+          </a:solidFill>
+          <a:ln w="28575">
+            <a:solidFill>
+              <a:srgbClr val="660066"/>
+            </a:solidFill>
+          </a:ln>
+        </p:spPr>
+        <p:style>
+          <a:lnRef idx="2">
+            <a:schemeClr val="accent1">
+              <a:shade val="50000"/>
+            </a:schemeClr>
+          </a:lnRef>
+          <a:fillRef idx="1">
+            <a:schemeClr val="accent1"/>
+          </a:fillRef>
+          <a:effectRef idx="0">
+            <a:schemeClr val="accent1"/>
+          </a:effectRef>
+          <a:fontRef idx="minor">
+            <a:schemeClr val="lt1"/>
+          </a:fontRef>
+        </p:style>
+        <p:txBody>
+          <a:bodyPr rtlCol="0" anchor="ctr"/>
+          <a:lstStyle/>
+          <a:p>
+            <a:pPr algn="ctr"/>
+            <a:r>
+              <a:rPr lang="en-US" sz="2400" dirty="0" smtClean="0">
+                <a:solidFill>
+                  <a:srgbClr val="660066"/>
+                </a:solidFill>
+                <a:latin typeface="Calibri (Corps)"/>
+                <a:cs typeface="Segoe UI Light" panose="020B0502040204020203" pitchFamily="34" charset="0"/>
+              </a:rPr>
+              <a:t>e.g. const name = someInput &amp;&amp; ‘MAX’</a:t>
+            </a:r>
+            <a:endParaRPr lang="en-US" sz="2400" dirty="0">
+              <a:solidFill>
+                <a:srgbClr val="660066"/>
+              </a:solidFill>
+              <a:latin typeface="Calibri (Corps)"/>
+              <a:cs typeface="Segoe UI Light" panose="020B0502040204020203" pitchFamily="34" charset="0"/>
+            </a:endParaRPr>
+          </a:p>
+        </p:txBody>
+      </p:sp>
+      <p:sp>
+        <p:nvSpPr>
+          <p:cNvPr id="21" name="Rectangle 20"/>
+          <p:cNvSpPr/>
+          <p:nvPr/>
+        </p:nvSpPr>
+        <p:spPr>
+          <a:xfrm>
+            <a:off x="9136899" y="4586862"/>
+            <a:ext cx="2914174" cy="1235813"/>
+          </a:xfrm>
+          <a:prstGeom prst="rect">
+            <a:avLst/>
+          </a:prstGeom>
+          <a:solidFill>
+            <a:schemeClr val="accent2"/>
+          </a:solidFill>
+          <a:ln w="28575">
+            <a:solidFill>
+              <a:schemeClr val="tx1"/>
+            </a:solidFill>
+          </a:ln>
+        </p:spPr>
+        <p:style>
+          <a:lnRef idx="2">
+            <a:schemeClr val="accent1">
+              <a:shade val="50000"/>
+            </a:schemeClr>
+          </a:lnRef>
+          <a:fillRef idx="1">
+            <a:schemeClr val="accent1"/>
+          </a:fillRef>
+          <a:effectRef idx="0">
+            <a:schemeClr val="accent1"/>
+          </a:effectRef>
+          <a:fontRef idx="minor">
+            <a:schemeClr val="lt1"/>
+          </a:fontRef>
+        </p:style>
+        <p:txBody>
+          <a:bodyPr rtlCol="0" anchor="ctr"/>
+          <a:lstStyle/>
+          <a:p>
+            <a:pPr algn="ctr"/>
+            <a:r>
+              <a:rPr lang="en-US" sz="2400" dirty="0" smtClean="0"/>
+              <a:t>‘Max’ is set if isLoggedIn is true, false otherwise</a:t>
+            </a:r>
+            <a:endParaRPr lang="en-US" sz="2400" dirty="0"/>
+          </a:p>
+        </p:txBody>
+      </p:sp>
+    </p:spTree>
+    <p:extLst>
+      <p:ext uri="{BB962C8B-B14F-4D97-AF65-F5344CB8AC3E}">
+        <p14:creationId xmlns:p14="http://schemas.microsoft.com/office/powerpoint/2010/main" val="3968708302"/>
       </p:ext>
     </p:extLst>
   </p:cSld>

</xml_diff>

<commit_message>
40. Error Handling with try-catch - An Introduction
</commit_message>
<xml_diff>
--- a/4. Working with Control Structures (if Statements, Loops, Error Handling)/docs/Introduction.pptx
+++ b/4. Working with Control Structures (if Statements, Loops, Error Handling)/docs/Introduction.pptx
@@ -16,6 +16,7 @@
     <p:sldId id="266" r:id="rId10"/>
     <p:sldId id="267" r:id="rId11"/>
     <p:sldId id="268" r:id="rId12"/>
+    <p:sldId id="269" r:id="rId13"/>
   </p:sldIdLst>
   <p:sldSz cx="12192000" cy="6858000"/>
   <p:notesSz cx="6858000" cy="9144000"/>
@@ -130,6 +131,7 @@
             <p14:sldId id="266"/>
             <p14:sldId id="267"/>
             <p14:sldId id="268"/>
+            <p14:sldId id="269"/>
           </p14:sldIdLst>
         </p14:section>
       </p14:sectionLst>
@@ -5159,6 +5161,687 @@
     <p:extLst>
       <p:ext uri="{BB962C8B-B14F-4D97-AF65-F5344CB8AC3E}">
         <p14:creationId xmlns:p14="http://schemas.microsoft.com/office/powerpoint/2010/main" val="533362927"/>
+      </p:ext>
+    </p:extLst>
+  </p:cSld>
+  <p:clrMapOvr>
+    <a:masterClrMapping/>
+  </p:clrMapOvr>
+</p:sld>
+</file>
+
+<file path=ppt/slides/slide12.xml><?xml version="1.0" encoding="utf-8"?>
+<p:sld xmlns:a="http://schemas.openxmlformats.org/drawingml/2006/main" xmlns:r="http://schemas.openxmlformats.org/officeDocument/2006/relationships" xmlns:p="http://schemas.openxmlformats.org/presentationml/2006/main">
+  <p:cSld>
+    <p:spTree>
+      <p:nvGrpSpPr>
+        <p:cNvPr id="1" name=""/>
+        <p:cNvGrpSpPr/>
+        <p:nvPr/>
+      </p:nvGrpSpPr>
+      <p:grpSpPr>
+        <a:xfrm>
+          <a:off x="0" y="0"/>
+          <a:ext cx="0" cy="0"/>
+          <a:chOff x="0" y="0"/>
+          <a:chExt cx="0" cy="0"/>
+        </a:xfrm>
+      </p:grpSpPr>
+      <p:sp>
+        <p:nvSpPr>
+          <p:cNvPr id="2" name="Rectangle 1"/>
+          <p:cNvSpPr/>
+          <p:nvPr/>
+        </p:nvSpPr>
+        <p:spPr>
+          <a:xfrm>
+            <a:off x="2458755" y="573130"/>
+            <a:ext cx="6440299" cy="740400"/>
+          </a:xfrm>
+          <a:prstGeom prst="rect">
+            <a:avLst/>
+          </a:prstGeom>
+          <a:solidFill>
+            <a:srgbClr val="660066"/>
+          </a:solidFill>
+          <a:ln>
+            <a:noFill/>
+          </a:ln>
+        </p:spPr>
+        <p:style>
+          <a:lnRef idx="2">
+            <a:schemeClr val="accent1">
+              <a:shade val="50000"/>
+            </a:schemeClr>
+          </a:lnRef>
+          <a:fillRef idx="1">
+            <a:schemeClr val="accent1"/>
+          </a:fillRef>
+          <a:effectRef idx="0">
+            <a:schemeClr val="accent1"/>
+          </a:effectRef>
+          <a:fontRef idx="minor">
+            <a:schemeClr val="lt1"/>
+          </a:fontRef>
+        </p:style>
+        <p:txBody>
+          <a:bodyPr rtlCol="0" anchor="ctr"/>
+          <a:lstStyle/>
+          <a:p>
+            <a:pPr algn="ctr"/>
+            <a:r>
+              <a:rPr lang="en-US" sz="2000" b="1" dirty="0" smtClean="0">
+                <a:latin typeface="Calibri (Corps)"/>
+                <a:cs typeface="Segoe UI Light" panose="020B0502040204020203" pitchFamily="34" charset="0"/>
+              </a:rPr>
+              <a:t>Some errors can’t be avoided (beyond your control as a developer)</a:t>
+            </a:r>
+            <a:endParaRPr lang="en-US" sz="2000" b="1" dirty="0">
+              <a:latin typeface="Calibri (Corps)"/>
+              <a:cs typeface="Segoe UI Light" panose="020B0502040204020203" pitchFamily="34" charset="0"/>
+            </a:endParaRPr>
+          </a:p>
+        </p:txBody>
+      </p:sp>
+      <p:sp>
+        <p:nvSpPr>
+          <p:cNvPr id="3" name="ZoneTexte 2"/>
+          <p:cNvSpPr txBox="1"/>
+          <p:nvPr/>
+        </p:nvSpPr>
+        <p:spPr>
+          <a:xfrm>
+            <a:off x="254968" y="49910"/>
+            <a:ext cx="6909894" cy="523220"/>
+          </a:xfrm>
+          <a:prstGeom prst="rect">
+            <a:avLst/>
+          </a:prstGeom>
+          <a:noFill/>
+        </p:spPr>
+        <p:txBody>
+          <a:bodyPr wrap="square" rtlCol="0">
+            <a:spAutoFit/>
+          </a:bodyPr>
+          <a:lstStyle/>
+          <a:p>
+            <a:r>
+              <a:rPr lang="en-US" sz="2800" b="1" dirty="0" smtClean="0">
+                <a:ea typeface="Segoe UI Black" panose="020B0A02040204020203" pitchFamily="34" charset="0"/>
+                <a:cs typeface="Segoe UI Semibold" panose="020B0702040204020203" pitchFamily="34" charset="0"/>
+              </a:rPr>
+              <a:t>Error Handling</a:t>
+            </a:r>
+            <a:endParaRPr lang="en-US" sz="2800" b="1" dirty="0">
+              <a:ea typeface="Segoe UI Black" panose="020B0A02040204020203" pitchFamily="34" charset="0"/>
+              <a:cs typeface="Segoe UI Semibold" panose="020B0702040204020203" pitchFamily="34" charset="0"/>
+            </a:endParaRPr>
+          </a:p>
+        </p:txBody>
+      </p:sp>
+      <p:sp>
+        <p:nvSpPr>
+          <p:cNvPr id="37" name="Rectangle 36"/>
+          <p:cNvSpPr/>
+          <p:nvPr/>
+        </p:nvSpPr>
+        <p:spPr>
+          <a:xfrm>
+            <a:off x="1167063" y="5737187"/>
+            <a:ext cx="9023684" cy="629785"/>
+          </a:xfrm>
+          <a:prstGeom prst="rect">
+            <a:avLst/>
+          </a:prstGeom>
+          <a:solidFill>
+            <a:srgbClr val="CC3399">
+              <a:alpha val="29020"/>
+            </a:srgbClr>
+          </a:solidFill>
+          <a:ln w="28575">
+            <a:solidFill>
+              <a:srgbClr val="660066"/>
+            </a:solidFill>
+          </a:ln>
+        </p:spPr>
+        <p:style>
+          <a:lnRef idx="2">
+            <a:schemeClr val="accent1">
+              <a:shade val="50000"/>
+            </a:schemeClr>
+          </a:lnRef>
+          <a:fillRef idx="1">
+            <a:schemeClr val="accent1"/>
+          </a:fillRef>
+          <a:effectRef idx="0">
+            <a:schemeClr val="accent1"/>
+          </a:effectRef>
+          <a:fontRef idx="minor">
+            <a:schemeClr val="lt1"/>
+          </a:fontRef>
+        </p:style>
+        <p:txBody>
+          <a:bodyPr rtlCol="0" anchor="ctr"/>
+          <a:lstStyle/>
+          <a:p>
+            <a:pPr algn="ctr"/>
+            <a:r>
+              <a:rPr lang="en-US" sz="2400" b="1" dirty="0" smtClean="0">
+                <a:solidFill>
+                  <a:srgbClr val="660066"/>
+                </a:solidFill>
+                <a:latin typeface="Calibri (Corps)"/>
+                <a:cs typeface="Segoe UI Light" panose="020B0502040204020203" pitchFamily="34" charset="0"/>
+              </a:rPr>
+              <a:t>Try</a:t>
+            </a:r>
+            <a:r>
+              <a:rPr lang="en-US" sz="2400" dirty="0" smtClean="0">
+                <a:solidFill>
+                  <a:srgbClr val="660066"/>
+                </a:solidFill>
+                <a:latin typeface="Calibri (Corps)"/>
+                <a:cs typeface="Segoe UI Light" panose="020B0502040204020203" pitchFamily="34" charset="0"/>
+              </a:rPr>
+              <a:t> { … } </a:t>
+            </a:r>
+            <a:r>
+              <a:rPr lang="en-US" sz="2400" b="1" dirty="0" smtClean="0">
+                <a:solidFill>
+                  <a:srgbClr val="660066"/>
+                </a:solidFill>
+                <a:latin typeface="Calibri (Corps)"/>
+                <a:cs typeface="Segoe UI Light" panose="020B0502040204020203" pitchFamily="34" charset="0"/>
+              </a:rPr>
+              <a:t>catch</a:t>
+            </a:r>
+            <a:r>
+              <a:rPr lang="en-US" sz="2400" dirty="0" smtClean="0">
+                <a:solidFill>
+                  <a:srgbClr val="660066"/>
+                </a:solidFill>
+                <a:latin typeface="Calibri (Corps)"/>
+                <a:cs typeface="Segoe UI Light" panose="020B0502040204020203" pitchFamily="34" charset="0"/>
+              </a:rPr>
+              <a:t> (error) { … }</a:t>
+            </a:r>
+            <a:endParaRPr lang="en-US" sz="2400" dirty="0">
+              <a:solidFill>
+                <a:srgbClr val="660066"/>
+              </a:solidFill>
+              <a:latin typeface="Calibri (Corps)"/>
+              <a:cs typeface="Segoe UI Light" panose="020B0502040204020203" pitchFamily="34" charset="0"/>
+            </a:endParaRPr>
+          </a:p>
+        </p:txBody>
+      </p:sp>
+      <p:sp>
+        <p:nvSpPr>
+          <p:cNvPr id="38" name="Rectangle 37"/>
+          <p:cNvSpPr/>
+          <p:nvPr/>
+        </p:nvSpPr>
+        <p:spPr>
+          <a:xfrm>
+            <a:off x="1167063" y="4791000"/>
+            <a:ext cx="9023684" cy="617753"/>
+          </a:xfrm>
+          <a:prstGeom prst="rect">
+            <a:avLst/>
+          </a:prstGeom>
+          <a:solidFill>
+            <a:srgbClr val="FCF600">
+              <a:alpha val="29020"/>
+            </a:srgbClr>
+          </a:solidFill>
+          <a:ln w="28575">
+            <a:solidFill>
+              <a:schemeClr val="tx1"/>
+            </a:solidFill>
+          </a:ln>
+        </p:spPr>
+        <p:style>
+          <a:lnRef idx="2">
+            <a:schemeClr val="accent1">
+              <a:shade val="50000"/>
+            </a:schemeClr>
+          </a:lnRef>
+          <a:fillRef idx="1">
+            <a:schemeClr val="accent1"/>
+          </a:fillRef>
+          <a:effectRef idx="0">
+            <a:schemeClr val="accent1"/>
+          </a:effectRef>
+          <a:fontRef idx="minor">
+            <a:schemeClr val="lt1"/>
+          </a:fontRef>
+        </p:style>
+        <p:txBody>
+          <a:bodyPr rtlCol="0" anchor="ctr"/>
+          <a:lstStyle/>
+          <a:p>
+            <a:pPr algn="ctr"/>
+            <a:r>
+              <a:rPr lang="en-US" sz="2400" dirty="0" smtClean="0">
+                <a:solidFill>
+                  <a:sysClr val="windowText" lastClr="000000"/>
+                </a:solidFill>
+                <a:latin typeface="Calibri (Corps)"/>
+                <a:cs typeface="Segoe UI Light" panose="020B0502040204020203" pitchFamily="34" charset="0"/>
+              </a:rPr>
+              <a:t>Throw and catch errors to fail gracefully or recovery if possible</a:t>
+            </a:r>
+            <a:endParaRPr lang="en-US" sz="2400" dirty="0">
+              <a:solidFill>
+                <a:sysClr val="windowText" lastClr="000000"/>
+              </a:solidFill>
+              <a:latin typeface="Calibri (Corps)"/>
+              <a:cs typeface="Segoe UI Light" panose="020B0502040204020203" pitchFamily="34" charset="0"/>
+            </a:endParaRPr>
+          </a:p>
+        </p:txBody>
+      </p:sp>
+      <p:sp>
+        <p:nvSpPr>
+          <p:cNvPr id="19" name="Rectangle 18"/>
+          <p:cNvSpPr/>
+          <p:nvPr/>
+        </p:nvSpPr>
+        <p:spPr>
+          <a:xfrm>
+            <a:off x="7748333" y="2145909"/>
+            <a:ext cx="3662998" cy="655351"/>
+          </a:xfrm>
+          <a:prstGeom prst="rect">
+            <a:avLst/>
+          </a:prstGeom>
+          <a:solidFill>
+            <a:schemeClr val="accent2"/>
+          </a:solidFill>
+          <a:ln w="28575">
+            <a:solidFill>
+              <a:schemeClr val="tx1"/>
+            </a:solidFill>
+          </a:ln>
+        </p:spPr>
+        <p:style>
+          <a:lnRef idx="2">
+            <a:schemeClr val="accent1">
+              <a:shade val="50000"/>
+            </a:schemeClr>
+          </a:lnRef>
+          <a:fillRef idx="1">
+            <a:schemeClr val="accent1"/>
+          </a:fillRef>
+          <a:effectRef idx="0">
+            <a:schemeClr val="accent1"/>
+          </a:effectRef>
+          <a:fontRef idx="minor">
+            <a:schemeClr val="lt1"/>
+          </a:fontRef>
+        </p:style>
+        <p:txBody>
+          <a:bodyPr rtlCol="0" anchor="ctr"/>
+          <a:lstStyle/>
+          <a:p>
+            <a:pPr algn="ctr"/>
+            <a:r>
+              <a:rPr lang="en-US" sz="2400" dirty="0" smtClean="0"/>
+              <a:t>…</a:t>
+            </a:r>
+            <a:endParaRPr lang="en-US" sz="2400" dirty="0"/>
+          </a:p>
+        </p:txBody>
+      </p:sp>
+      <p:sp>
+        <p:nvSpPr>
+          <p:cNvPr id="20" name="Rectangle 19"/>
+          <p:cNvSpPr/>
+          <p:nvPr/>
+        </p:nvSpPr>
+        <p:spPr>
+          <a:xfrm>
+            <a:off x="3847408" y="2145909"/>
+            <a:ext cx="3662998" cy="655351"/>
+          </a:xfrm>
+          <a:prstGeom prst="rect">
+            <a:avLst/>
+          </a:prstGeom>
+          <a:solidFill>
+            <a:schemeClr val="accent2"/>
+          </a:solidFill>
+          <a:ln w="28575">
+            <a:solidFill>
+              <a:schemeClr val="tx1"/>
+            </a:solidFill>
+          </a:ln>
+        </p:spPr>
+        <p:style>
+          <a:lnRef idx="2">
+            <a:schemeClr val="accent1">
+              <a:shade val="50000"/>
+            </a:schemeClr>
+          </a:lnRef>
+          <a:fillRef idx="1">
+            <a:schemeClr val="accent1"/>
+          </a:fillRef>
+          <a:effectRef idx="0">
+            <a:schemeClr val="accent1"/>
+          </a:effectRef>
+          <a:fontRef idx="minor">
+            <a:schemeClr val="lt1"/>
+          </a:fontRef>
+        </p:style>
+        <p:txBody>
+          <a:bodyPr rtlCol="0" anchor="ctr"/>
+          <a:lstStyle/>
+          <a:p>
+            <a:pPr algn="ctr"/>
+            <a:r>
+              <a:rPr lang="en-US" sz="2400" dirty="0" smtClean="0"/>
+              <a:t>Network Errors</a:t>
+            </a:r>
+            <a:endParaRPr lang="en-US" sz="2400" dirty="0"/>
+          </a:p>
+        </p:txBody>
+      </p:sp>
+      <p:sp>
+        <p:nvSpPr>
+          <p:cNvPr id="21" name="Rectangle 20"/>
+          <p:cNvSpPr/>
+          <p:nvPr/>
+        </p:nvSpPr>
+        <p:spPr>
+          <a:xfrm>
+            <a:off x="46917" y="2145909"/>
+            <a:ext cx="3662998" cy="655351"/>
+          </a:xfrm>
+          <a:prstGeom prst="rect">
+            <a:avLst/>
+          </a:prstGeom>
+          <a:solidFill>
+            <a:schemeClr val="accent2"/>
+          </a:solidFill>
+          <a:ln w="28575">
+            <a:solidFill>
+              <a:schemeClr val="tx1"/>
+            </a:solidFill>
+          </a:ln>
+        </p:spPr>
+        <p:style>
+          <a:lnRef idx="2">
+            <a:schemeClr val="accent1">
+              <a:shade val="50000"/>
+            </a:schemeClr>
+          </a:lnRef>
+          <a:fillRef idx="1">
+            <a:schemeClr val="accent1"/>
+          </a:fillRef>
+          <a:effectRef idx="0">
+            <a:schemeClr val="accent1"/>
+          </a:effectRef>
+          <a:fontRef idx="minor">
+            <a:schemeClr val="lt1"/>
+          </a:fontRef>
+        </p:style>
+        <p:txBody>
+          <a:bodyPr rtlCol="0" anchor="ctr"/>
+          <a:lstStyle/>
+          <a:p>
+            <a:pPr algn="ctr"/>
+            <a:r>
+              <a:rPr lang="en-US" sz="2400" dirty="0" smtClean="0"/>
+              <a:t>User Input Errors</a:t>
+            </a:r>
+            <a:endParaRPr lang="en-US" sz="2400" dirty="0"/>
+          </a:p>
+        </p:txBody>
+      </p:sp>
+      <p:sp>
+        <p:nvSpPr>
+          <p:cNvPr id="22" name="Rectangle 21"/>
+          <p:cNvSpPr/>
+          <p:nvPr/>
+        </p:nvSpPr>
+        <p:spPr>
+          <a:xfrm>
+            <a:off x="147000" y="3020937"/>
+            <a:ext cx="3662998" cy="655351"/>
+          </a:xfrm>
+          <a:prstGeom prst="rect">
+            <a:avLst/>
+          </a:prstGeom>
+          <a:solidFill>
+            <a:srgbClr val="ED7D31">
+              <a:alpha val="29020"/>
+            </a:srgbClr>
+          </a:solidFill>
+          <a:ln w="28575">
+            <a:solidFill>
+              <a:srgbClr val="ED7D31"/>
+            </a:solidFill>
+          </a:ln>
+        </p:spPr>
+        <p:style>
+          <a:lnRef idx="2">
+            <a:schemeClr val="accent2"/>
+          </a:lnRef>
+          <a:fillRef idx="1">
+            <a:schemeClr val="lt1"/>
+          </a:fillRef>
+          <a:effectRef idx="0">
+            <a:schemeClr val="accent2"/>
+          </a:effectRef>
+          <a:fontRef idx="minor">
+            <a:schemeClr val="dk1"/>
+          </a:fontRef>
+        </p:style>
+        <p:txBody>
+          <a:bodyPr rtlCol="0" anchor="ctr"/>
+          <a:lstStyle/>
+          <a:p>
+            <a:pPr algn="ctr"/>
+            <a:r>
+              <a:rPr lang="en-US" sz="2000" dirty="0" smtClean="0">
+                <a:solidFill>
+                  <a:schemeClr val="accent2"/>
+                </a:solidFill>
+              </a:rPr>
+              <a:t>e.g. user enters text like ‘hi’ instead of a number</a:t>
+            </a:r>
+            <a:endParaRPr lang="en-US" sz="2000" dirty="0">
+              <a:solidFill>
+                <a:schemeClr val="accent2"/>
+              </a:solidFill>
+            </a:endParaRPr>
+          </a:p>
+        </p:txBody>
+      </p:sp>
+      <p:sp>
+        <p:nvSpPr>
+          <p:cNvPr id="23" name="Rectangle 22"/>
+          <p:cNvSpPr/>
+          <p:nvPr/>
+        </p:nvSpPr>
+        <p:spPr>
+          <a:xfrm>
+            <a:off x="4265809" y="3020936"/>
+            <a:ext cx="3662998" cy="655351"/>
+          </a:xfrm>
+          <a:prstGeom prst="rect">
+            <a:avLst/>
+          </a:prstGeom>
+          <a:solidFill>
+            <a:srgbClr val="ED7D31">
+              <a:alpha val="29020"/>
+            </a:srgbClr>
+          </a:solidFill>
+          <a:ln w="28575">
+            <a:solidFill>
+              <a:srgbClr val="ED7D31"/>
+            </a:solidFill>
+          </a:ln>
+        </p:spPr>
+        <p:style>
+          <a:lnRef idx="2">
+            <a:schemeClr val="accent2"/>
+          </a:lnRef>
+          <a:fillRef idx="1">
+            <a:schemeClr val="lt1"/>
+          </a:fillRef>
+          <a:effectRef idx="0">
+            <a:schemeClr val="accent2"/>
+          </a:effectRef>
+          <a:fontRef idx="minor">
+            <a:schemeClr val="dk1"/>
+          </a:fontRef>
+        </p:style>
+        <p:txBody>
+          <a:bodyPr rtlCol="0" anchor="ctr"/>
+          <a:lstStyle/>
+          <a:p>
+            <a:pPr algn="ctr"/>
+            <a:r>
+              <a:rPr lang="en-US" sz="2000" dirty="0" smtClean="0">
+                <a:solidFill>
+                  <a:schemeClr val="accent2"/>
+                </a:solidFill>
+              </a:rPr>
+              <a:t>e.g. server is offline</a:t>
+            </a:r>
+            <a:endParaRPr lang="en-US" sz="2000" dirty="0">
+              <a:solidFill>
+                <a:schemeClr val="accent2"/>
+              </a:solidFill>
+            </a:endParaRPr>
+          </a:p>
+        </p:txBody>
+      </p:sp>
+      <p:cxnSp>
+        <p:nvCxnSpPr>
+          <p:cNvPr id="5" name="Connecteur en angle 4"/>
+          <p:cNvCxnSpPr>
+            <a:stCxn id="2" idx="2"/>
+            <a:endCxn id="21" idx="0"/>
+          </p:cNvCxnSpPr>
+          <p:nvPr/>
+        </p:nvCxnSpPr>
+        <p:spPr>
+          <a:xfrm rot="5400000">
+            <a:off x="3362472" y="-170525"/>
+            <a:ext cx="832379" cy="3800489"/>
+          </a:xfrm>
+          <a:prstGeom prst="bentConnector3">
+            <a:avLst/>
+          </a:prstGeom>
+          <a:ln w="38100">
+            <a:solidFill>
+              <a:srgbClr val="660066"/>
+            </a:solidFill>
+            <a:tailEnd type="triangle"/>
+          </a:ln>
+        </p:spPr>
+        <p:style>
+          <a:lnRef idx="1">
+            <a:schemeClr val="accent1"/>
+          </a:lnRef>
+          <a:fillRef idx="0">
+            <a:schemeClr val="accent1"/>
+          </a:fillRef>
+          <a:effectRef idx="0">
+            <a:schemeClr val="accent1"/>
+          </a:effectRef>
+          <a:fontRef idx="minor">
+            <a:schemeClr val="tx1"/>
+          </a:fontRef>
+        </p:style>
+      </p:cxnSp>
+      <p:cxnSp>
+        <p:nvCxnSpPr>
+          <p:cNvPr id="29" name="Connecteur en angle 28"/>
+          <p:cNvCxnSpPr>
+            <a:stCxn id="2" idx="2"/>
+            <a:endCxn id="19" idx="0"/>
+          </p:cNvCxnSpPr>
+          <p:nvPr/>
+        </p:nvCxnSpPr>
+        <p:spPr>
+          <a:xfrm rot="16200000" flipH="1">
+            <a:off x="7213179" y="-220745"/>
+            <a:ext cx="832379" cy="3900927"/>
+          </a:xfrm>
+          <a:prstGeom prst="bentConnector3">
+            <a:avLst>
+              <a:gd name="adj1" fmla="val 50000"/>
+            </a:avLst>
+          </a:prstGeom>
+          <a:ln w="38100">
+            <a:solidFill>
+              <a:srgbClr val="660066"/>
+            </a:solidFill>
+            <a:tailEnd type="triangle"/>
+          </a:ln>
+        </p:spPr>
+        <p:style>
+          <a:lnRef idx="1">
+            <a:schemeClr val="accent1"/>
+          </a:lnRef>
+          <a:fillRef idx="0">
+            <a:schemeClr val="accent1"/>
+          </a:fillRef>
+          <a:effectRef idx="0">
+            <a:schemeClr val="accent1"/>
+          </a:effectRef>
+          <a:fontRef idx="minor">
+            <a:schemeClr val="tx1"/>
+          </a:fontRef>
+        </p:style>
+      </p:cxnSp>
+      <p:cxnSp>
+        <p:nvCxnSpPr>
+          <p:cNvPr id="33" name="Connecteur en angle 32"/>
+          <p:cNvCxnSpPr>
+            <a:stCxn id="2" idx="2"/>
+            <a:endCxn id="20" idx="0"/>
+          </p:cNvCxnSpPr>
+          <p:nvPr/>
+        </p:nvCxnSpPr>
+        <p:spPr>
+          <a:xfrm rot="16200000" flipH="1">
+            <a:off x="5262717" y="1729718"/>
+            <a:ext cx="832379" cy="2"/>
+          </a:xfrm>
+          <a:prstGeom prst="bentConnector3">
+            <a:avLst>
+              <a:gd name="adj1" fmla="val 50000"/>
+            </a:avLst>
+          </a:prstGeom>
+          <a:ln w="38100">
+            <a:solidFill>
+              <a:srgbClr val="660066"/>
+            </a:solidFill>
+            <a:tailEnd type="triangle"/>
+          </a:ln>
+        </p:spPr>
+        <p:style>
+          <a:lnRef idx="1">
+            <a:schemeClr val="accent1"/>
+          </a:lnRef>
+          <a:fillRef idx="0">
+            <a:schemeClr val="accent1"/>
+          </a:fillRef>
+          <a:effectRef idx="0">
+            <a:schemeClr val="accent1"/>
+          </a:effectRef>
+          <a:fontRef idx="minor">
+            <a:schemeClr val="tx1"/>
+          </a:fontRef>
+        </p:style>
+      </p:cxnSp>
+    </p:spTree>
+    <p:extLst>
+      <p:ext uri="{BB962C8B-B14F-4D97-AF65-F5344CB8AC3E}">
+        <p14:creationId xmlns:p14="http://schemas.microsoft.com/office/powerpoint/2010/main" val="3403823345"/>
       </p:ext>
     </p:extLst>
   </p:cSld>

</xml_diff>